<commit_message>
added node selector example
</commit_message>
<xml_diff>
--- a/kubernetes/11_administration.pptx
+++ b/kubernetes/11_administration.pptx
@@ -5,10 +5,10 @@
     <p:sldMasterId id="2147483733" r:id="rId1"/>
   </p:sldMasterIdLst>
   <p:notesMasterIdLst>
-    <p:notesMasterId r:id="rId22"/>
+    <p:notesMasterId r:id="rId23"/>
   </p:notesMasterIdLst>
   <p:handoutMasterIdLst>
-    <p:handoutMasterId r:id="rId23"/>
+    <p:handoutMasterId r:id="rId24"/>
   </p:handoutMasterIdLst>
   <p:sldIdLst>
     <p:sldId id="433" r:id="rId2"/>
@@ -25,12 +25,13 @@
     <p:sldId id="458" r:id="rId13"/>
     <p:sldId id="445" r:id="rId14"/>
     <p:sldId id="450" r:id="rId15"/>
-    <p:sldId id="457" r:id="rId16"/>
-    <p:sldId id="456" r:id="rId17"/>
-    <p:sldId id="449" r:id="rId18"/>
-    <p:sldId id="460" r:id="rId19"/>
-    <p:sldId id="461" r:id="rId20"/>
-    <p:sldId id="265" r:id="rId21"/>
+    <p:sldId id="462" r:id="rId16"/>
+    <p:sldId id="457" r:id="rId17"/>
+    <p:sldId id="456" r:id="rId18"/>
+    <p:sldId id="449" r:id="rId19"/>
+    <p:sldId id="460" r:id="rId20"/>
+    <p:sldId id="461" r:id="rId21"/>
+    <p:sldId id="265" r:id="rId22"/>
   </p:sldIdLst>
   <p:sldSz cx="12195175" cy="6858000"/>
   <p:notesSz cx="6858000" cy="9144000"/>
@@ -1254,7 +1255,7 @@
             <a:fld id="{7D8C2C35-2B8A-446E-BEC0-FD36716C29AC}" type="slidenum">
               <a:rPr lang="de-DE" smtClean="0"/>
               <a:pPr/>
-              <a:t>15</a:t>
+              <a:t>16</a:t>
             </a:fld>
             <a:endParaRPr lang="de-DE" dirty="0"/>
           </a:p>
@@ -1412,7 +1413,7 @@
             <a:fld id="{7D8C2C35-2B8A-446E-BEC0-FD36716C29AC}" type="slidenum">
               <a:rPr lang="de-DE" smtClean="0"/>
               <a:pPr/>
-              <a:t>16</a:t>
+              <a:t>17</a:t>
             </a:fld>
             <a:endParaRPr lang="de-DE" dirty="0"/>
           </a:p>
@@ -1530,7 +1531,7 @@
             <a:fld id="{7D8C2C35-2B8A-446E-BEC0-FD36716C29AC}" type="slidenum">
               <a:rPr lang="de-DE" smtClean="0"/>
               <a:pPr/>
-              <a:t>17</a:t>
+              <a:t>18</a:t>
             </a:fld>
             <a:endParaRPr lang="de-DE" dirty="0"/>
           </a:p>
@@ -1618,7 +1619,7 @@
             <a:fld id="{7D8C2C35-2B8A-446E-BEC0-FD36716C29AC}" type="slidenum">
               <a:rPr lang="en-US" smtClean="0"/>
               <a:pPr/>
-              <a:t>18</a:t>
+              <a:t>19</a:t>
             </a:fld>
             <a:endParaRPr lang="en-US" dirty="0"/>
           </a:p>
@@ -1711,7 +1712,7 @@
             <a:fld id="{7D8C2C35-2B8A-446E-BEC0-FD36716C29AC}" type="slidenum">
               <a:rPr lang="de-DE" smtClean="0"/>
               <a:pPr/>
-              <a:t>19</a:t>
+              <a:t>20</a:t>
             </a:fld>
             <a:endParaRPr lang="de-DE" dirty="0"/>
           </a:p>
@@ -1765,7 +1766,7 @@
             <a:fld id="{7D8C2C35-2B8A-446E-BEC0-FD36716C29AC}" type="slidenum">
               <a:rPr lang="en-US" smtClean="0"/>
               <a:pPr/>
-              <a:t>20</a:t>
+              <a:t>21</a:t>
             </a:fld>
             <a:endParaRPr lang="en-US" dirty="0"/>
           </a:p>
@@ -22173,7 +22174,13 @@
       </p:grpSpPr>
       <p:sp>
         <p:nvSpPr>
-          <p:cNvPr id="3" name="Title 2"/>
+          <p:cNvPr id="3" name="Title 2">
+            <a:extLst>
+              <a:ext uri="{FF2B5EF4-FFF2-40B4-BE49-F238E27FC236}">
+                <a16:creationId xmlns:a16="http://schemas.microsoft.com/office/drawing/2014/main" id="{4B5B3171-6747-4BE9-86AF-A5644F76A623}"/>
+              </a:ext>
+            </a:extLst>
+          </p:cNvPr>
           <p:cNvSpPr>
             <a:spLocks noGrp="1"/>
           </p:cNvSpPr>
@@ -22188,95 +22195,50 @@
           <a:p>
             <a:r>
               <a:rPr lang="en-US" dirty="0"/>
-              <a:t>Sometimes working with </a:t>
+              <a:t>Example: </a:t>
             </a:r>
             <a:r>
               <a:rPr lang="en-US" dirty="0" err="1"/>
-              <a:t>kubernetes</a:t>
-            </a:r>
-            <a:r>
-              <a:rPr lang="en-US" dirty="0"/>
-              <a:t> is like …</a:t>
-            </a:r>
+              <a:t>NodeSelector</a:t>
+            </a:r>
+            <a:endParaRPr lang="en-US" dirty="0"/>
           </a:p>
         </p:txBody>
       </p:sp>
       <p:pic>
         <p:nvPicPr>
-          <p:cNvPr id="1028" name="Picture 4" descr="The Important Field"/>
+          <p:cNvPr id="4" name="Picture 3">
+            <a:extLst>
+              <a:ext uri="{FF2B5EF4-FFF2-40B4-BE49-F238E27FC236}">
+                <a16:creationId xmlns:a16="http://schemas.microsoft.com/office/drawing/2014/main" id="{63572B24-95A9-44B1-ADEF-F45AE37D5E46}"/>
+              </a:ext>
+            </a:extLst>
+          </p:cNvPr>
           <p:cNvPicPr>
-            <a:picLocks noChangeAspect="1" noChangeArrowheads="1"/>
+            <a:picLocks noChangeAspect="1"/>
           </p:cNvPicPr>
           <p:nvPr/>
         </p:nvPicPr>
         <p:blipFill>
-          <a:blip r:embed="rId3">
-            <a:extLst>
-              <a:ext uri="{28A0092B-C50C-407E-A947-70E740481C1C}">
-                <a14:useLocalDpi xmlns:a14="http://schemas.microsoft.com/office/drawing/2010/main" val="0"/>
-              </a:ext>
-            </a:extLst>
-          </a:blip>
-          <a:srcRect/>
+          <a:blip r:embed="rId2"/>
           <a:stretch>
             <a:fillRect/>
           </a:stretch>
         </p:blipFill>
-        <p:spPr bwMode="auto">
-          <a:xfrm>
-            <a:off x="1258388" y="1370845"/>
-            <a:ext cx="9753039" cy="4239116"/>
-          </a:xfrm>
-          <a:prstGeom prst="rect">
-            <a:avLst/>
-          </a:prstGeom>
-          <a:noFill/>
-          <a:extLst>
-            <a:ext uri="{909E8E84-426E-40DD-AFC4-6F175D3DCCD1}">
-              <a14:hiddenFill xmlns:a14="http://schemas.microsoft.com/office/drawing/2010/main">
-                <a:solidFill>
-                  <a:srgbClr val="FFFFFF"/>
-                </a:solidFill>
-              </a14:hiddenFill>
-            </a:ext>
-          </a:extLst>
-        </p:spPr>
-      </p:pic>
-      <p:sp>
-        <p:nvSpPr>
-          <p:cNvPr id="5" name="Rectangle 4"/>
-          <p:cNvSpPr/>
-          <p:nvPr/>
-        </p:nvSpPr>
         <p:spPr>
           <a:xfrm>
-            <a:off x="4732922" y="5691976"/>
-            <a:ext cx="2803973" cy="415498"/>
+            <a:off x="1839050" y="1611085"/>
+            <a:ext cx="8516377" cy="4055938"/>
           </a:xfrm>
           <a:prstGeom prst="rect">
             <a:avLst/>
           </a:prstGeom>
         </p:spPr>
-        <p:txBody>
-          <a:bodyPr wrap="none">
-            <a:spAutoFit/>
-          </a:bodyPr>
-          <a:lstStyle/>
-          <a:p>
-            <a:r>
-              <a:rPr lang="en-US" dirty="0">
-                <a:hlinkClick r:id="rId4"/>
-              </a:rPr>
-              <a:t>https://xkcd.com/970/</a:t>
-            </a:r>
-            <a:endParaRPr lang="en-US" dirty="0"/>
-          </a:p>
-        </p:txBody>
-      </p:sp>
+      </p:pic>
     </p:spTree>
     <p:extLst>
       <p:ext uri="{BB962C8B-B14F-4D97-AF65-F5344CB8AC3E}">
-        <p14:creationId xmlns:p14="http://schemas.microsoft.com/office/powerpoint/2010/main" val="822933932"/>
+        <p14:creationId xmlns:p14="http://schemas.microsoft.com/office/powerpoint/2010/main" val="3881617192"/>
       </p:ext>
     </p:extLst>
   </p:cSld>
@@ -22320,6 +22282,138 @@
           <a:p>
             <a:r>
               <a:rPr lang="en-US" dirty="0"/>
+              <a:t>Sometimes working with </a:t>
+            </a:r>
+            <a:r>
+              <a:rPr lang="en-US" dirty="0" err="1"/>
+              <a:t>kubernetes</a:t>
+            </a:r>
+            <a:r>
+              <a:rPr lang="en-US" dirty="0"/>
+              <a:t> is like …</a:t>
+            </a:r>
+          </a:p>
+        </p:txBody>
+      </p:sp>
+      <p:pic>
+        <p:nvPicPr>
+          <p:cNvPr id="1028" name="Picture 4" descr="The Important Field"/>
+          <p:cNvPicPr>
+            <a:picLocks noChangeAspect="1" noChangeArrowheads="1"/>
+          </p:cNvPicPr>
+          <p:nvPr/>
+        </p:nvPicPr>
+        <p:blipFill>
+          <a:blip r:embed="rId3">
+            <a:extLst>
+              <a:ext uri="{28A0092B-C50C-407E-A947-70E740481C1C}">
+                <a14:useLocalDpi xmlns:a14="http://schemas.microsoft.com/office/drawing/2010/main" val="0"/>
+              </a:ext>
+            </a:extLst>
+          </a:blip>
+          <a:srcRect/>
+          <a:stretch>
+            <a:fillRect/>
+          </a:stretch>
+        </p:blipFill>
+        <p:spPr bwMode="auto">
+          <a:xfrm>
+            <a:off x="1258388" y="1370845"/>
+            <a:ext cx="9753039" cy="4239116"/>
+          </a:xfrm>
+          <a:prstGeom prst="rect">
+            <a:avLst/>
+          </a:prstGeom>
+          <a:noFill/>
+          <a:extLst>
+            <a:ext uri="{909E8E84-426E-40DD-AFC4-6F175D3DCCD1}">
+              <a14:hiddenFill xmlns:a14="http://schemas.microsoft.com/office/drawing/2010/main">
+                <a:solidFill>
+                  <a:srgbClr val="FFFFFF"/>
+                </a:solidFill>
+              </a14:hiddenFill>
+            </a:ext>
+          </a:extLst>
+        </p:spPr>
+      </p:pic>
+      <p:sp>
+        <p:nvSpPr>
+          <p:cNvPr id="5" name="Rectangle 4"/>
+          <p:cNvSpPr/>
+          <p:nvPr/>
+        </p:nvSpPr>
+        <p:spPr>
+          <a:xfrm>
+            <a:off x="4732922" y="5691976"/>
+            <a:ext cx="2803973" cy="415498"/>
+          </a:xfrm>
+          <a:prstGeom prst="rect">
+            <a:avLst/>
+          </a:prstGeom>
+        </p:spPr>
+        <p:txBody>
+          <a:bodyPr wrap="none">
+            <a:spAutoFit/>
+          </a:bodyPr>
+          <a:lstStyle/>
+          <a:p>
+            <a:r>
+              <a:rPr lang="en-US" dirty="0">
+                <a:hlinkClick r:id="rId4"/>
+              </a:rPr>
+              <a:t>https://xkcd.com/970/</a:t>
+            </a:r>
+            <a:endParaRPr lang="en-US" dirty="0"/>
+          </a:p>
+        </p:txBody>
+      </p:sp>
+    </p:spTree>
+    <p:extLst>
+      <p:ext uri="{BB962C8B-B14F-4D97-AF65-F5344CB8AC3E}">
+        <p14:creationId xmlns:p14="http://schemas.microsoft.com/office/powerpoint/2010/main" val="822933932"/>
+      </p:ext>
+    </p:extLst>
+  </p:cSld>
+  <p:clrMapOvr>
+    <a:masterClrMapping/>
+  </p:clrMapOvr>
+</p:sld>
+</file>
+
+<file path=ppt/slides/slide17.xml><?xml version="1.0" encoding="utf-8"?>
+<p:sld xmlns:a="http://schemas.openxmlformats.org/drawingml/2006/main" xmlns:r="http://schemas.openxmlformats.org/officeDocument/2006/relationships" xmlns:p="http://schemas.openxmlformats.org/presentationml/2006/main">
+  <p:cSld>
+    <p:spTree>
+      <p:nvGrpSpPr>
+        <p:cNvPr id="1" name=""/>
+        <p:cNvGrpSpPr/>
+        <p:nvPr/>
+      </p:nvGrpSpPr>
+      <p:grpSpPr>
+        <a:xfrm>
+          <a:off x="0" y="0"/>
+          <a:ext cx="0" cy="0"/>
+          <a:chOff x="0" y="0"/>
+          <a:chExt cx="0" cy="0"/>
+        </a:xfrm>
+      </p:grpSpPr>
+      <p:sp>
+        <p:nvSpPr>
+          <p:cNvPr id="3" name="Title 2"/>
+          <p:cNvSpPr>
+            <a:spLocks noGrp="1"/>
+          </p:cNvSpPr>
+          <p:nvPr>
+            <p:ph type="title"/>
+          </p:nvPr>
+        </p:nvSpPr>
+        <p:spPr/>
+        <p:txBody>
+          <a:bodyPr/>
+          <a:lstStyle/>
+          <a:p>
+            <a:r>
+              <a:rPr lang="en-US" dirty="0"/>
               <a:t> K8s Dashboard</a:t>
             </a:r>
           </a:p>
@@ -22362,7 +22456,7 @@
 </p:sld>
 </file>
 
-<file path=ppt/slides/slide17.xml><?xml version="1.0" encoding="utf-8"?>
+<file path=ppt/slides/slide18.xml><?xml version="1.0" encoding="utf-8"?>
 <p:sld xmlns:a="http://schemas.openxmlformats.org/drawingml/2006/main" xmlns:r="http://schemas.openxmlformats.org/officeDocument/2006/relationships" xmlns:p="http://schemas.openxmlformats.org/presentationml/2006/main">
   <p:cSld>
     <p:spTree>
@@ -23030,7 +23124,7 @@
 </p:sld>
 </file>
 
-<file path=ppt/slides/slide18.xml><?xml version="1.0" encoding="utf-8"?>
+<file path=ppt/slides/slide19.xml><?xml version="1.0" encoding="utf-8"?>
 <p:sld xmlns:a="http://schemas.openxmlformats.org/drawingml/2006/main" xmlns:r="http://schemas.openxmlformats.org/officeDocument/2006/relationships" xmlns:p="http://schemas.openxmlformats.org/presentationml/2006/main">
   <p:cSld>
     <p:spTree>
@@ -25153,7 +25247,662 @@
 </p:sld>
 </file>
 
-<file path=ppt/slides/slide19.xml><?xml version="1.0" encoding="utf-8"?>
+<file path=ppt/slides/slide2.xml><?xml version="1.0" encoding="utf-8"?>
+<p:sld xmlns:a="http://schemas.openxmlformats.org/drawingml/2006/main" xmlns:r="http://schemas.openxmlformats.org/officeDocument/2006/relationships" xmlns:p="http://schemas.openxmlformats.org/presentationml/2006/main">
+  <p:cSld>
+    <p:spTree>
+      <p:nvGrpSpPr>
+        <p:cNvPr id="1" name=""/>
+        <p:cNvGrpSpPr/>
+        <p:nvPr/>
+      </p:nvGrpSpPr>
+      <p:grpSpPr>
+        <a:xfrm>
+          <a:off x="0" y="0"/>
+          <a:ext cx="0" cy="0"/>
+          <a:chOff x="0" y="0"/>
+          <a:chExt cx="0" cy="0"/>
+        </a:xfrm>
+      </p:grpSpPr>
+      <p:sp>
+        <p:nvSpPr>
+          <p:cNvPr id="13" name="Rectangle 12"/>
+          <p:cNvSpPr/>
+          <p:nvPr/>
+        </p:nvSpPr>
+        <p:spPr bwMode="gray">
+          <a:xfrm>
+            <a:off x="2171701" y="3185160"/>
+            <a:ext cx="6179820" cy="3303743"/>
+          </a:xfrm>
+          <a:prstGeom prst="rect">
+            <a:avLst/>
+          </a:prstGeom>
+          <a:ln>
+            <a:headEnd/>
+            <a:tailEnd/>
+          </a:ln>
+        </p:spPr>
+        <p:style>
+          <a:lnRef idx="2">
+            <a:schemeClr val="accent2">
+              <a:shade val="50000"/>
+            </a:schemeClr>
+          </a:lnRef>
+          <a:fillRef idx="1">
+            <a:schemeClr val="accent2"/>
+          </a:fillRef>
+          <a:effectRef idx="0">
+            <a:schemeClr val="accent2"/>
+          </a:effectRef>
+          <a:fontRef idx="minor">
+            <a:schemeClr val="lt1"/>
+          </a:fontRef>
+        </p:style>
+        <p:txBody>
+          <a:bodyPr lIns="90000" tIns="72000" rIns="90000" bIns="72000" rtlCol="0" anchor="t"/>
+          <a:lstStyle/>
+          <a:p>
+            <a:pPr marR="0" algn="ctr" defTabSz="914400" eaLnBrk="1" fontAlgn="base" latinLnBrk="0" hangingPunct="1">
+              <a:lnSpc>
+                <a:spcPct val="100000"/>
+              </a:lnSpc>
+              <a:spcBef>
+                <a:spcPct val="50000"/>
+              </a:spcBef>
+              <a:spcAft>
+                <a:spcPct val="0"/>
+              </a:spcAft>
+              <a:buClr>
+                <a:srgbClr val="F0AB00"/>
+              </a:buClr>
+              <a:buSzPct val="80000"/>
+              <a:tabLst/>
+            </a:pPr>
+            <a:r>
+              <a:rPr lang="en-US" sz="1600" b="1" kern="0" dirty="0">
+                <a:ea typeface="Arial Unicode MS" pitchFamily="34" charset="-128"/>
+                <a:cs typeface="Arial Unicode MS" pitchFamily="34" charset="-128"/>
+              </a:rPr>
+              <a:t>Namespace</a:t>
+            </a:r>
+            <a:endParaRPr kumimoji="0" lang="en-US" sz="1600" b="1" i="0" u="none" strike="noStrike" kern="0" cap="none" spc="0" normalizeH="0" baseline="0" noProof="0" dirty="0">
+              <a:ln>
+                <a:noFill/>
+              </a:ln>
+              <a:effectLst/>
+              <a:uLnTx/>
+              <a:uFillTx/>
+              <a:ea typeface="Arial Unicode MS" pitchFamily="34" charset="-128"/>
+              <a:cs typeface="Arial Unicode MS" pitchFamily="34" charset="-128"/>
+            </a:endParaRPr>
+          </a:p>
+        </p:txBody>
+      </p:sp>
+      <p:sp>
+        <p:nvSpPr>
+          <p:cNvPr id="2" name="Title 1"/>
+          <p:cNvSpPr>
+            <a:spLocks noGrp="1"/>
+          </p:cNvSpPr>
+          <p:nvPr>
+            <p:ph type="title"/>
+          </p:nvPr>
+        </p:nvSpPr>
+        <p:spPr/>
+        <p:txBody>
+          <a:bodyPr/>
+          <a:lstStyle/>
+          <a:p>
+            <a:r>
+              <a:rPr lang="en-US" dirty="0"/>
+              <a:t>Service Accounts</a:t>
+            </a:r>
+          </a:p>
+        </p:txBody>
+      </p:sp>
+      <p:sp>
+        <p:nvSpPr>
+          <p:cNvPr id="8" name="Rectangle 7"/>
+          <p:cNvSpPr/>
+          <p:nvPr/>
+        </p:nvSpPr>
+        <p:spPr>
+          <a:xfrm>
+            <a:off x="504000" y="1223190"/>
+            <a:ext cx="10918380" cy="1708160"/>
+          </a:xfrm>
+          <a:prstGeom prst="rect">
+            <a:avLst/>
+          </a:prstGeom>
+        </p:spPr>
+        <p:txBody>
+          <a:bodyPr wrap="square">
+            <a:spAutoFit/>
+          </a:bodyPr>
+          <a:lstStyle/>
+          <a:p>
+            <a:pPr marL="342900" indent="-342900">
+              <a:buFont typeface="Wingdings" panose="05000000000000000000" pitchFamily="2" charset="2"/>
+              <a:buChar char="§"/>
+            </a:pPr>
+            <a:r>
+              <a:rPr lang="en-US" dirty="0"/>
+              <a:t>Service accounts are technical user in Kubernetes</a:t>
+            </a:r>
+          </a:p>
+          <a:p>
+            <a:pPr marL="342900" indent="-342900">
+              <a:buFont typeface="Wingdings" panose="05000000000000000000" pitchFamily="2" charset="2"/>
+              <a:buChar char="§"/>
+            </a:pPr>
+            <a:r>
+              <a:rPr lang="en-US" dirty="0"/>
+              <a:t>Bound to a namespace</a:t>
+            </a:r>
+          </a:p>
+          <a:p>
+            <a:pPr marL="342900" indent="-342900">
+              <a:buFont typeface="Wingdings" panose="05000000000000000000" pitchFamily="2" charset="2"/>
+              <a:buChar char="§"/>
+            </a:pPr>
+            <a:r>
+              <a:rPr lang="en-US" dirty="0"/>
+              <a:t>Allowed to communicate with the API server</a:t>
+            </a:r>
+          </a:p>
+          <a:p>
+            <a:pPr marL="342900" indent="-342900">
+              <a:buFont typeface="Wingdings" panose="05000000000000000000" pitchFamily="2" charset="2"/>
+              <a:buChar char="§"/>
+            </a:pPr>
+            <a:r>
+              <a:rPr lang="en-US" dirty="0"/>
+              <a:t>Provide identity for pods</a:t>
+            </a:r>
+          </a:p>
+          <a:p>
+            <a:pPr marL="342900" indent="-342900">
+              <a:buFont typeface="Wingdings" panose="05000000000000000000" pitchFamily="2" charset="2"/>
+              <a:buChar char="§"/>
+            </a:pPr>
+            <a:r>
+              <a:rPr lang="en-US" dirty="0"/>
+              <a:t>Pods can inherit permissions to access the API server or a registry (image pull secret)</a:t>
+            </a:r>
+          </a:p>
+        </p:txBody>
+      </p:sp>
+      <p:sp>
+        <p:nvSpPr>
+          <p:cNvPr id="7" name="Rectangle 6"/>
+          <p:cNvSpPr/>
+          <p:nvPr/>
+        </p:nvSpPr>
+        <p:spPr bwMode="gray">
+          <a:xfrm>
+            <a:off x="3169059" y="3966951"/>
+            <a:ext cx="1627931" cy="1156258"/>
+          </a:xfrm>
+          <a:prstGeom prst="rect">
+            <a:avLst/>
+          </a:prstGeom>
+          <a:ln>
+            <a:headEnd/>
+            <a:tailEnd/>
+          </a:ln>
+        </p:spPr>
+        <p:style>
+          <a:lnRef idx="2">
+            <a:schemeClr val="accent2"/>
+          </a:lnRef>
+          <a:fillRef idx="1">
+            <a:schemeClr val="lt1"/>
+          </a:fillRef>
+          <a:effectRef idx="0">
+            <a:schemeClr val="accent2"/>
+          </a:effectRef>
+          <a:fontRef idx="minor">
+            <a:schemeClr val="dk1"/>
+          </a:fontRef>
+        </p:style>
+        <p:txBody>
+          <a:bodyPr lIns="90000" tIns="72000" rIns="90000" bIns="72000" rtlCol="0" anchor="ctr"/>
+          <a:lstStyle/>
+          <a:p>
+            <a:pPr marR="0" algn="ctr" defTabSz="914400" eaLnBrk="1" fontAlgn="base" latinLnBrk="0" hangingPunct="1">
+              <a:lnSpc>
+                <a:spcPct val="100000"/>
+              </a:lnSpc>
+              <a:spcBef>
+                <a:spcPct val="50000"/>
+              </a:spcBef>
+              <a:spcAft>
+                <a:spcPct val="0"/>
+              </a:spcAft>
+              <a:buClr>
+                <a:srgbClr val="F0AB00"/>
+              </a:buClr>
+              <a:buSzPct val="80000"/>
+              <a:tabLst/>
+            </a:pPr>
+            <a:r>
+              <a:rPr lang="en-US" sz="1800" kern="0" dirty="0">
+                <a:ea typeface="Arial Unicode MS" pitchFamily="34" charset="-128"/>
+                <a:cs typeface="Arial Unicode MS" pitchFamily="34" charset="-128"/>
+              </a:rPr>
+              <a:t>service account</a:t>
+            </a:r>
+          </a:p>
+          <a:p>
+            <a:pPr marR="0" algn="ctr" defTabSz="914400" eaLnBrk="1" fontAlgn="base" latinLnBrk="0" hangingPunct="1">
+              <a:lnSpc>
+                <a:spcPct val="100000"/>
+              </a:lnSpc>
+              <a:spcBef>
+                <a:spcPct val="50000"/>
+              </a:spcBef>
+              <a:spcAft>
+                <a:spcPct val="0"/>
+              </a:spcAft>
+              <a:buClr>
+                <a:srgbClr val="F0AB00"/>
+              </a:buClr>
+              <a:buSzPct val="80000"/>
+              <a:tabLst/>
+            </a:pPr>
+            <a:r>
+              <a:rPr kumimoji="0" lang="en-US" sz="1800" b="0" i="0" u="none" strike="noStrike" kern="0" cap="none" spc="0" normalizeH="0" baseline="0" noProof="0" dirty="0">
+                <a:ln>
+                  <a:noFill/>
+                </a:ln>
+                <a:effectLst/>
+                <a:uLnTx/>
+                <a:uFillTx/>
+                <a:ea typeface="Arial Unicode MS" pitchFamily="34" charset="-128"/>
+                <a:cs typeface="Arial Unicode MS" pitchFamily="34" charset="-128"/>
+              </a:rPr>
+              <a:t>“default”</a:t>
+            </a:r>
+          </a:p>
+        </p:txBody>
+      </p:sp>
+      <p:sp>
+        <p:nvSpPr>
+          <p:cNvPr id="12" name="Rectangle 11"/>
+          <p:cNvSpPr/>
+          <p:nvPr/>
+        </p:nvSpPr>
+        <p:spPr bwMode="gray">
+          <a:xfrm>
+            <a:off x="6624394" y="3542373"/>
+            <a:ext cx="1062486" cy="806724"/>
+          </a:xfrm>
+          <a:prstGeom prst="rect">
+            <a:avLst/>
+          </a:prstGeom>
+          <a:ln>
+            <a:headEnd/>
+            <a:tailEnd/>
+          </a:ln>
+        </p:spPr>
+        <p:style>
+          <a:lnRef idx="2">
+            <a:schemeClr val="accent2"/>
+          </a:lnRef>
+          <a:fillRef idx="1">
+            <a:schemeClr val="lt1"/>
+          </a:fillRef>
+          <a:effectRef idx="0">
+            <a:schemeClr val="accent2"/>
+          </a:effectRef>
+          <a:fontRef idx="minor">
+            <a:schemeClr val="dk1"/>
+          </a:fontRef>
+        </p:style>
+        <p:txBody>
+          <a:bodyPr lIns="90000" tIns="72000" rIns="90000" bIns="72000" rtlCol="0" anchor="ctr"/>
+          <a:lstStyle/>
+          <a:p>
+            <a:pPr marR="0" algn="ctr" defTabSz="914400" eaLnBrk="1" fontAlgn="base" latinLnBrk="0" hangingPunct="1">
+              <a:lnSpc>
+                <a:spcPct val="100000"/>
+              </a:lnSpc>
+              <a:spcBef>
+                <a:spcPct val="50000"/>
+              </a:spcBef>
+              <a:spcAft>
+                <a:spcPct val="0"/>
+              </a:spcAft>
+              <a:buClr>
+                <a:srgbClr val="F0AB00"/>
+              </a:buClr>
+              <a:buSzPct val="80000"/>
+              <a:tabLst/>
+            </a:pPr>
+            <a:r>
+              <a:rPr lang="en-US" sz="1800" kern="0" noProof="0" dirty="0">
+                <a:ea typeface="Arial Unicode MS" pitchFamily="34" charset="-128"/>
+                <a:cs typeface="Arial Unicode MS" pitchFamily="34" charset="-128"/>
+              </a:rPr>
+              <a:t>Pod</a:t>
+            </a:r>
+            <a:r>
+              <a:rPr lang="en-US" sz="1800" kern="0" dirty="0">
+                <a:ea typeface="Arial Unicode MS" pitchFamily="34" charset="-128"/>
+                <a:cs typeface="Arial Unicode MS" pitchFamily="34" charset="-128"/>
+              </a:rPr>
+              <a:t> A</a:t>
+            </a:r>
+            <a:endParaRPr kumimoji="0" lang="en-US" sz="1800" b="0" i="0" u="none" strike="noStrike" kern="0" cap="none" spc="0" normalizeH="0" baseline="0" noProof="0" dirty="0">
+              <a:ln>
+                <a:noFill/>
+              </a:ln>
+              <a:effectLst/>
+              <a:uLnTx/>
+              <a:uFillTx/>
+              <a:ea typeface="Arial Unicode MS" pitchFamily="34" charset="-128"/>
+              <a:cs typeface="Arial Unicode MS" pitchFamily="34" charset="-128"/>
+            </a:endParaRPr>
+          </a:p>
+        </p:txBody>
+      </p:sp>
+      <p:sp>
+        <p:nvSpPr>
+          <p:cNvPr id="14" name="Rectangle 13"/>
+          <p:cNvSpPr/>
+          <p:nvPr/>
+        </p:nvSpPr>
+        <p:spPr bwMode="gray">
+          <a:xfrm>
+            <a:off x="6624394" y="5477853"/>
+            <a:ext cx="1062486" cy="806724"/>
+          </a:xfrm>
+          <a:prstGeom prst="rect">
+            <a:avLst/>
+          </a:prstGeom>
+          <a:ln>
+            <a:headEnd/>
+            <a:tailEnd/>
+          </a:ln>
+        </p:spPr>
+        <p:style>
+          <a:lnRef idx="2">
+            <a:schemeClr val="accent2"/>
+          </a:lnRef>
+          <a:fillRef idx="1">
+            <a:schemeClr val="lt1"/>
+          </a:fillRef>
+          <a:effectRef idx="0">
+            <a:schemeClr val="accent2"/>
+          </a:effectRef>
+          <a:fontRef idx="minor">
+            <a:schemeClr val="dk1"/>
+          </a:fontRef>
+        </p:style>
+        <p:txBody>
+          <a:bodyPr lIns="90000" tIns="72000" rIns="90000" bIns="72000" rtlCol="0" anchor="ctr"/>
+          <a:lstStyle/>
+          <a:p>
+            <a:pPr marR="0" algn="ctr" defTabSz="914400" eaLnBrk="1" fontAlgn="base" latinLnBrk="0" hangingPunct="1">
+              <a:lnSpc>
+                <a:spcPct val="100000"/>
+              </a:lnSpc>
+              <a:spcBef>
+                <a:spcPct val="50000"/>
+              </a:spcBef>
+              <a:spcAft>
+                <a:spcPct val="0"/>
+              </a:spcAft>
+              <a:buClr>
+                <a:srgbClr val="F0AB00"/>
+              </a:buClr>
+              <a:buSzPct val="80000"/>
+              <a:tabLst/>
+            </a:pPr>
+            <a:r>
+              <a:rPr lang="en-US" sz="1800" kern="0" noProof="0" dirty="0">
+                <a:ea typeface="Arial Unicode MS" pitchFamily="34" charset="-128"/>
+                <a:cs typeface="Arial Unicode MS" pitchFamily="34" charset="-128"/>
+              </a:rPr>
+              <a:t>Pod</a:t>
+            </a:r>
+            <a:r>
+              <a:rPr lang="en-US" sz="1800" kern="0" dirty="0">
+                <a:ea typeface="Arial Unicode MS" pitchFamily="34" charset="-128"/>
+                <a:cs typeface="Arial Unicode MS" pitchFamily="34" charset="-128"/>
+              </a:rPr>
+              <a:t> B</a:t>
+            </a:r>
+            <a:endParaRPr kumimoji="0" lang="en-US" sz="1800" b="0" i="0" u="none" strike="noStrike" kern="0" cap="none" spc="0" normalizeH="0" baseline="0" noProof="0" dirty="0">
+              <a:ln>
+                <a:noFill/>
+              </a:ln>
+              <a:effectLst/>
+              <a:uLnTx/>
+              <a:uFillTx/>
+              <a:ea typeface="Arial Unicode MS" pitchFamily="34" charset="-128"/>
+              <a:cs typeface="Arial Unicode MS" pitchFamily="34" charset="-128"/>
+            </a:endParaRPr>
+          </a:p>
+        </p:txBody>
+      </p:sp>
+      <p:cxnSp>
+        <p:nvCxnSpPr>
+          <p:cNvPr id="16" name="Straight Arrow Connector 15"/>
+          <p:cNvCxnSpPr>
+            <a:stCxn id="7" idx="3"/>
+            <a:endCxn id="12" idx="1"/>
+          </p:cNvCxnSpPr>
+          <p:nvPr/>
+        </p:nvCxnSpPr>
+        <p:spPr>
+          <a:xfrm flipV="1">
+            <a:off x="4796990" y="3945735"/>
+            <a:ext cx="1827404" cy="599345"/>
+          </a:xfrm>
+          <a:prstGeom prst="straightConnector1">
+            <a:avLst/>
+          </a:prstGeom>
+          <a:ln w="38100">
+            <a:solidFill>
+              <a:schemeClr val="tx2">
+                <a:lumMod val="60000"/>
+                <a:lumOff val="40000"/>
+              </a:schemeClr>
+            </a:solidFill>
+            <a:headEnd type="none" w="med" len="med"/>
+            <a:tailEnd type="triangle"/>
+          </a:ln>
+        </p:spPr>
+        <p:style>
+          <a:lnRef idx="1">
+            <a:schemeClr val="accent1"/>
+          </a:lnRef>
+          <a:fillRef idx="0">
+            <a:schemeClr val="accent1"/>
+          </a:fillRef>
+          <a:effectRef idx="0">
+            <a:schemeClr val="accent1"/>
+          </a:effectRef>
+          <a:fontRef idx="minor">
+            <a:schemeClr val="tx1"/>
+          </a:fontRef>
+        </p:style>
+      </p:cxnSp>
+      <p:cxnSp>
+        <p:nvCxnSpPr>
+          <p:cNvPr id="17" name="Straight Arrow Connector 16"/>
+          <p:cNvCxnSpPr>
+            <a:stCxn id="7" idx="3"/>
+            <a:endCxn id="14" idx="1"/>
+          </p:cNvCxnSpPr>
+          <p:nvPr/>
+        </p:nvCxnSpPr>
+        <p:spPr>
+          <a:xfrm>
+            <a:off x="4796990" y="4545080"/>
+            <a:ext cx="1827404" cy="1336135"/>
+          </a:xfrm>
+          <a:prstGeom prst="straightConnector1">
+            <a:avLst/>
+          </a:prstGeom>
+          <a:ln w="38100">
+            <a:solidFill>
+              <a:schemeClr val="tx2">
+                <a:lumMod val="60000"/>
+                <a:lumOff val="40000"/>
+              </a:schemeClr>
+            </a:solidFill>
+            <a:headEnd type="none" w="med" len="med"/>
+            <a:tailEnd type="triangle"/>
+          </a:ln>
+        </p:spPr>
+        <p:style>
+          <a:lnRef idx="1">
+            <a:schemeClr val="accent1"/>
+          </a:lnRef>
+          <a:fillRef idx="0">
+            <a:schemeClr val="accent1"/>
+          </a:fillRef>
+          <a:effectRef idx="0">
+            <a:schemeClr val="accent1"/>
+          </a:effectRef>
+          <a:fontRef idx="minor">
+            <a:schemeClr val="tx1"/>
+          </a:fontRef>
+        </p:style>
+      </p:cxnSp>
+      <p:sp>
+        <p:nvSpPr>
+          <p:cNvPr id="22" name="Cylinder 21"/>
+          <p:cNvSpPr/>
+          <p:nvPr/>
+        </p:nvSpPr>
+        <p:spPr bwMode="gray">
+          <a:xfrm>
+            <a:off x="3481540" y="5500723"/>
+            <a:ext cx="1002967" cy="812920"/>
+          </a:xfrm>
+          <a:prstGeom prst="can">
+            <a:avLst/>
+          </a:prstGeom>
+          <a:ln>
+            <a:headEnd/>
+            <a:tailEnd/>
+          </a:ln>
+        </p:spPr>
+        <p:style>
+          <a:lnRef idx="2">
+            <a:schemeClr val="accent2"/>
+          </a:lnRef>
+          <a:fillRef idx="1">
+            <a:schemeClr val="lt1"/>
+          </a:fillRef>
+          <a:effectRef idx="0">
+            <a:schemeClr val="accent2"/>
+          </a:effectRef>
+          <a:fontRef idx="minor">
+            <a:schemeClr val="dk1"/>
+          </a:fontRef>
+        </p:style>
+        <p:txBody>
+          <a:bodyPr lIns="90000" tIns="72000" rIns="90000" bIns="72000" rtlCol="0" anchor="ctr"/>
+          <a:lstStyle/>
+          <a:p>
+            <a:pPr marR="0" algn="ctr" defTabSz="914400" eaLnBrk="1" fontAlgn="base" latinLnBrk="0" hangingPunct="1">
+              <a:lnSpc>
+                <a:spcPct val="100000"/>
+              </a:lnSpc>
+              <a:spcBef>
+                <a:spcPct val="50000"/>
+              </a:spcBef>
+              <a:spcAft>
+                <a:spcPct val="0"/>
+              </a:spcAft>
+              <a:buClr>
+                <a:srgbClr val="F0AB00"/>
+              </a:buClr>
+              <a:buSzPct val="80000"/>
+              <a:tabLst/>
+            </a:pPr>
+            <a:r>
+              <a:rPr lang="en-US" sz="1800" kern="0" dirty="0">
+                <a:ea typeface="Arial Unicode MS" pitchFamily="34" charset="-128"/>
+                <a:cs typeface="Arial Unicode MS" pitchFamily="34" charset="-128"/>
+              </a:rPr>
+              <a:t>secrets</a:t>
+            </a:r>
+            <a:endParaRPr kumimoji="0" lang="en-US" sz="1800" b="0" i="0" u="none" strike="noStrike" kern="0" cap="none" spc="0" normalizeH="0" baseline="0" noProof="0" dirty="0">
+              <a:ln>
+                <a:noFill/>
+              </a:ln>
+              <a:effectLst/>
+              <a:uLnTx/>
+              <a:uFillTx/>
+              <a:ea typeface="Arial Unicode MS" pitchFamily="34" charset="-128"/>
+              <a:cs typeface="Arial Unicode MS" pitchFamily="34" charset="-128"/>
+            </a:endParaRPr>
+          </a:p>
+        </p:txBody>
+      </p:sp>
+      <p:cxnSp>
+        <p:nvCxnSpPr>
+          <p:cNvPr id="24" name="Straight Arrow Connector 23"/>
+          <p:cNvCxnSpPr>
+            <a:stCxn id="22" idx="1"/>
+            <a:endCxn id="7" idx="2"/>
+          </p:cNvCxnSpPr>
+          <p:nvPr/>
+        </p:nvCxnSpPr>
+        <p:spPr>
+          <a:xfrm flipV="1">
+            <a:off x="3983024" y="5123209"/>
+            <a:ext cx="1" cy="377514"/>
+          </a:xfrm>
+          <a:prstGeom prst="straightConnector1">
+            <a:avLst/>
+          </a:prstGeom>
+          <a:ln w="38100">
+            <a:solidFill>
+              <a:schemeClr val="tx2">
+                <a:lumMod val="60000"/>
+                <a:lumOff val="40000"/>
+              </a:schemeClr>
+            </a:solidFill>
+            <a:headEnd type="none" w="med" len="med"/>
+            <a:tailEnd type="triangle"/>
+          </a:ln>
+        </p:spPr>
+        <p:style>
+          <a:lnRef idx="1">
+            <a:schemeClr val="accent1"/>
+          </a:lnRef>
+          <a:fillRef idx="0">
+            <a:schemeClr val="accent1"/>
+          </a:fillRef>
+          <a:effectRef idx="0">
+            <a:schemeClr val="accent1"/>
+          </a:effectRef>
+          <a:fontRef idx="minor">
+            <a:schemeClr val="tx1"/>
+          </a:fontRef>
+        </p:style>
+      </p:cxnSp>
+    </p:spTree>
+    <p:extLst>
+      <p:ext uri="{BB962C8B-B14F-4D97-AF65-F5344CB8AC3E}">
+        <p14:creationId xmlns:p14="http://schemas.microsoft.com/office/powerpoint/2010/main" val="864191870"/>
+      </p:ext>
+    </p:extLst>
+  </p:cSld>
+  <p:clrMapOvr>
+    <a:masterClrMapping/>
+  </p:clrMapOvr>
+</p:sld>
+</file>
+
+<file path=ppt/slides/slide20.xml><?xml version="1.0" encoding="utf-8"?>
 <p:sld xmlns:a="http://schemas.openxmlformats.org/drawingml/2006/main" xmlns:r="http://schemas.openxmlformats.org/officeDocument/2006/relationships" xmlns:p="http://schemas.openxmlformats.org/presentationml/2006/main">
   <p:cSld>
     <p:spTree>
@@ -29292,662 +30041,7 @@
 </p:sld>
 </file>
 
-<file path=ppt/slides/slide2.xml><?xml version="1.0" encoding="utf-8"?>
-<p:sld xmlns:a="http://schemas.openxmlformats.org/drawingml/2006/main" xmlns:r="http://schemas.openxmlformats.org/officeDocument/2006/relationships" xmlns:p="http://schemas.openxmlformats.org/presentationml/2006/main">
-  <p:cSld>
-    <p:spTree>
-      <p:nvGrpSpPr>
-        <p:cNvPr id="1" name=""/>
-        <p:cNvGrpSpPr/>
-        <p:nvPr/>
-      </p:nvGrpSpPr>
-      <p:grpSpPr>
-        <a:xfrm>
-          <a:off x="0" y="0"/>
-          <a:ext cx="0" cy="0"/>
-          <a:chOff x="0" y="0"/>
-          <a:chExt cx="0" cy="0"/>
-        </a:xfrm>
-      </p:grpSpPr>
-      <p:sp>
-        <p:nvSpPr>
-          <p:cNvPr id="13" name="Rectangle 12"/>
-          <p:cNvSpPr/>
-          <p:nvPr/>
-        </p:nvSpPr>
-        <p:spPr bwMode="gray">
-          <a:xfrm>
-            <a:off x="2171701" y="3185160"/>
-            <a:ext cx="6179820" cy="3303743"/>
-          </a:xfrm>
-          <a:prstGeom prst="rect">
-            <a:avLst/>
-          </a:prstGeom>
-          <a:ln>
-            <a:headEnd/>
-            <a:tailEnd/>
-          </a:ln>
-        </p:spPr>
-        <p:style>
-          <a:lnRef idx="2">
-            <a:schemeClr val="accent2">
-              <a:shade val="50000"/>
-            </a:schemeClr>
-          </a:lnRef>
-          <a:fillRef idx="1">
-            <a:schemeClr val="accent2"/>
-          </a:fillRef>
-          <a:effectRef idx="0">
-            <a:schemeClr val="accent2"/>
-          </a:effectRef>
-          <a:fontRef idx="minor">
-            <a:schemeClr val="lt1"/>
-          </a:fontRef>
-        </p:style>
-        <p:txBody>
-          <a:bodyPr lIns="90000" tIns="72000" rIns="90000" bIns="72000" rtlCol="0" anchor="t"/>
-          <a:lstStyle/>
-          <a:p>
-            <a:pPr marR="0" algn="ctr" defTabSz="914400" eaLnBrk="1" fontAlgn="base" latinLnBrk="0" hangingPunct="1">
-              <a:lnSpc>
-                <a:spcPct val="100000"/>
-              </a:lnSpc>
-              <a:spcBef>
-                <a:spcPct val="50000"/>
-              </a:spcBef>
-              <a:spcAft>
-                <a:spcPct val="0"/>
-              </a:spcAft>
-              <a:buClr>
-                <a:srgbClr val="F0AB00"/>
-              </a:buClr>
-              <a:buSzPct val="80000"/>
-              <a:tabLst/>
-            </a:pPr>
-            <a:r>
-              <a:rPr lang="en-US" sz="1600" b="1" kern="0" dirty="0">
-                <a:ea typeface="Arial Unicode MS" pitchFamily="34" charset="-128"/>
-                <a:cs typeface="Arial Unicode MS" pitchFamily="34" charset="-128"/>
-              </a:rPr>
-              <a:t>Namespace</a:t>
-            </a:r>
-            <a:endParaRPr kumimoji="0" lang="en-US" sz="1600" b="1" i="0" u="none" strike="noStrike" kern="0" cap="none" spc="0" normalizeH="0" baseline="0" noProof="0" dirty="0">
-              <a:ln>
-                <a:noFill/>
-              </a:ln>
-              <a:effectLst/>
-              <a:uLnTx/>
-              <a:uFillTx/>
-              <a:ea typeface="Arial Unicode MS" pitchFamily="34" charset="-128"/>
-              <a:cs typeface="Arial Unicode MS" pitchFamily="34" charset="-128"/>
-            </a:endParaRPr>
-          </a:p>
-        </p:txBody>
-      </p:sp>
-      <p:sp>
-        <p:nvSpPr>
-          <p:cNvPr id="2" name="Title 1"/>
-          <p:cNvSpPr>
-            <a:spLocks noGrp="1"/>
-          </p:cNvSpPr>
-          <p:nvPr>
-            <p:ph type="title"/>
-          </p:nvPr>
-        </p:nvSpPr>
-        <p:spPr/>
-        <p:txBody>
-          <a:bodyPr/>
-          <a:lstStyle/>
-          <a:p>
-            <a:r>
-              <a:rPr lang="en-US" dirty="0"/>
-              <a:t>Service Accounts</a:t>
-            </a:r>
-          </a:p>
-        </p:txBody>
-      </p:sp>
-      <p:sp>
-        <p:nvSpPr>
-          <p:cNvPr id="8" name="Rectangle 7"/>
-          <p:cNvSpPr/>
-          <p:nvPr/>
-        </p:nvSpPr>
-        <p:spPr>
-          <a:xfrm>
-            <a:off x="504000" y="1223190"/>
-            <a:ext cx="10918380" cy="1708160"/>
-          </a:xfrm>
-          <a:prstGeom prst="rect">
-            <a:avLst/>
-          </a:prstGeom>
-        </p:spPr>
-        <p:txBody>
-          <a:bodyPr wrap="square">
-            <a:spAutoFit/>
-          </a:bodyPr>
-          <a:lstStyle/>
-          <a:p>
-            <a:pPr marL="342900" indent="-342900">
-              <a:buFont typeface="Wingdings" panose="05000000000000000000" pitchFamily="2" charset="2"/>
-              <a:buChar char="§"/>
-            </a:pPr>
-            <a:r>
-              <a:rPr lang="en-US" dirty="0"/>
-              <a:t>Service accounts are technical user in Kubernetes</a:t>
-            </a:r>
-          </a:p>
-          <a:p>
-            <a:pPr marL="342900" indent="-342900">
-              <a:buFont typeface="Wingdings" panose="05000000000000000000" pitchFamily="2" charset="2"/>
-              <a:buChar char="§"/>
-            </a:pPr>
-            <a:r>
-              <a:rPr lang="en-US" dirty="0"/>
-              <a:t>Bound to a namespace</a:t>
-            </a:r>
-          </a:p>
-          <a:p>
-            <a:pPr marL="342900" indent="-342900">
-              <a:buFont typeface="Wingdings" panose="05000000000000000000" pitchFamily="2" charset="2"/>
-              <a:buChar char="§"/>
-            </a:pPr>
-            <a:r>
-              <a:rPr lang="en-US" dirty="0"/>
-              <a:t>Allowed to communicate with the API server</a:t>
-            </a:r>
-          </a:p>
-          <a:p>
-            <a:pPr marL="342900" indent="-342900">
-              <a:buFont typeface="Wingdings" panose="05000000000000000000" pitchFamily="2" charset="2"/>
-              <a:buChar char="§"/>
-            </a:pPr>
-            <a:r>
-              <a:rPr lang="en-US" dirty="0"/>
-              <a:t>Provide identity for pods</a:t>
-            </a:r>
-          </a:p>
-          <a:p>
-            <a:pPr marL="342900" indent="-342900">
-              <a:buFont typeface="Wingdings" panose="05000000000000000000" pitchFamily="2" charset="2"/>
-              <a:buChar char="§"/>
-            </a:pPr>
-            <a:r>
-              <a:rPr lang="en-US" dirty="0"/>
-              <a:t>Pods can inherit permissions to access the API server or a registry (image pull secret)</a:t>
-            </a:r>
-          </a:p>
-        </p:txBody>
-      </p:sp>
-      <p:sp>
-        <p:nvSpPr>
-          <p:cNvPr id="7" name="Rectangle 6"/>
-          <p:cNvSpPr/>
-          <p:nvPr/>
-        </p:nvSpPr>
-        <p:spPr bwMode="gray">
-          <a:xfrm>
-            <a:off x="3169059" y="3966951"/>
-            <a:ext cx="1627931" cy="1156258"/>
-          </a:xfrm>
-          <a:prstGeom prst="rect">
-            <a:avLst/>
-          </a:prstGeom>
-          <a:ln>
-            <a:headEnd/>
-            <a:tailEnd/>
-          </a:ln>
-        </p:spPr>
-        <p:style>
-          <a:lnRef idx="2">
-            <a:schemeClr val="accent2"/>
-          </a:lnRef>
-          <a:fillRef idx="1">
-            <a:schemeClr val="lt1"/>
-          </a:fillRef>
-          <a:effectRef idx="0">
-            <a:schemeClr val="accent2"/>
-          </a:effectRef>
-          <a:fontRef idx="minor">
-            <a:schemeClr val="dk1"/>
-          </a:fontRef>
-        </p:style>
-        <p:txBody>
-          <a:bodyPr lIns="90000" tIns="72000" rIns="90000" bIns="72000" rtlCol="0" anchor="ctr"/>
-          <a:lstStyle/>
-          <a:p>
-            <a:pPr marR="0" algn="ctr" defTabSz="914400" eaLnBrk="1" fontAlgn="base" latinLnBrk="0" hangingPunct="1">
-              <a:lnSpc>
-                <a:spcPct val="100000"/>
-              </a:lnSpc>
-              <a:spcBef>
-                <a:spcPct val="50000"/>
-              </a:spcBef>
-              <a:spcAft>
-                <a:spcPct val="0"/>
-              </a:spcAft>
-              <a:buClr>
-                <a:srgbClr val="F0AB00"/>
-              </a:buClr>
-              <a:buSzPct val="80000"/>
-              <a:tabLst/>
-            </a:pPr>
-            <a:r>
-              <a:rPr lang="en-US" sz="1800" kern="0" dirty="0">
-                <a:ea typeface="Arial Unicode MS" pitchFamily="34" charset="-128"/>
-                <a:cs typeface="Arial Unicode MS" pitchFamily="34" charset="-128"/>
-              </a:rPr>
-              <a:t>service account</a:t>
-            </a:r>
-          </a:p>
-          <a:p>
-            <a:pPr marR="0" algn="ctr" defTabSz="914400" eaLnBrk="1" fontAlgn="base" latinLnBrk="0" hangingPunct="1">
-              <a:lnSpc>
-                <a:spcPct val="100000"/>
-              </a:lnSpc>
-              <a:spcBef>
-                <a:spcPct val="50000"/>
-              </a:spcBef>
-              <a:spcAft>
-                <a:spcPct val="0"/>
-              </a:spcAft>
-              <a:buClr>
-                <a:srgbClr val="F0AB00"/>
-              </a:buClr>
-              <a:buSzPct val="80000"/>
-              <a:tabLst/>
-            </a:pPr>
-            <a:r>
-              <a:rPr kumimoji="0" lang="en-US" sz="1800" b="0" i="0" u="none" strike="noStrike" kern="0" cap="none" spc="0" normalizeH="0" baseline="0" noProof="0" dirty="0">
-                <a:ln>
-                  <a:noFill/>
-                </a:ln>
-                <a:effectLst/>
-                <a:uLnTx/>
-                <a:uFillTx/>
-                <a:ea typeface="Arial Unicode MS" pitchFamily="34" charset="-128"/>
-                <a:cs typeface="Arial Unicode MS" pitchFamily="34" charset="-128"/>
-              </a:rPr>
-              <a:t>“default”</a:t>
-            </a:r>
-          </a:p>
-        </p:txBody>
-      </p:sp>
-      <p:sp>
-        <p:nvSpPr>
-          <p:cNvPr id="12" name="Rectangle 11"/>
-          <p:cNvSpPr/>
-          <p:nvPr/>
-        </p:nvSpPr>
-        <p:spPr bwMode="gray">
-          <a:xfrm>
-            <a:off x="6624394" y="3542373"/>
-            <a:ext cx="1062486" cy="806724"/>
-          </a:xfrm>
-          <a:prstGeom prst="rect">
-            <a:avLst/>
-          </a:prstGeom>
-          <a:ln>
-            <a:headEnd/>
-            <a:tailEnd/>
-          </a:ln>
-        </p:spPr>
-        <p:style>
-          <a:lnRef idx="2">
-            <a:schemeClr val="accent2"/>
-          </a:lnRef>
-          <a:fillRef idx="1">
-            <a:schemeClr val="lt1"/>
-          </a:fillRef>
-          <a:effectRef idx="0">
-            <a:schemeClr val="accent2"/>
-          </a:effectRef>
-          <a:fontRef idx="minor">
-            <a:schemeClr val="dk1"/>
-          </a:fontRef>
-        </p:style>
-        <p:txBody>
-          <a:bodyPr lIns="90000" tIns="72000" rIns="90000" bIns="72000" rtlCol="0" anchor="ctr"/>
-          <a:lstStyle/>
-          <a:p>
-            <a:pPr marR="0" algn="ctr" defTabSz="914400" eaLnBrk="1" fontAlgn="base" latinLnBrk="0" hangingPunct="1">
-              <a:lnSpc>
-                <a:spcPct val="100000"/>
-              </a:lnSpc>
-              <a:spcBef>
-                <a:spcPct val="50000"/>
-              </a:spcBef>
-              <a:spcAft>
-                <a:spcPct val="0"/>
-              </a:spcAft>
-              <a:buClr>
-                <a:srgbClr val="F0AB00"/>
-              </a:buClr>
-              <a:buSzPct val="80000"/>
-              <a:tabLst/>
-            </a:pPr>
-            <a:r>
-              <a:rPr lang="en-US" sz="1800" kern="0" noProof="0" dirty="0">
-                <a:ea typeface="Arial Unicode MS" pitchFamily="34" charset="-128"/>
-                <a:cs typeface="Arial Unicode MS" pitchFamily="34" charset="-128"/>
-              </a:rPr>
-              <a:t>Pod</a:t>
-            </a:r>
-            <a:r>
-              <a:rPr lang="en-US" sz="1800" kern="0" dirty="0">
-                <a:ea typeface="Arial Unicode MS" pitchFamily="34" charset="-128"/>
-                <a:cs typeface="Arial Unicode MS" pitchFamily="34" charset="-128"/>
-              </a:rPr>
-              <a:t> A</a:t>
-            </a:r>
-            <a:endParaRPr kumimoji="0" lang="en-US" sz="1800" b="0" i="0" u="none" strike="noStrike" kern="0" cap="none" spc="0" normalizeH="0" baseline="0" noProof="0" dirty="0">
-              <a:ln>
-                <a:noFill/>
-              </a:ln>
-              <a:effectLst/>
-              <a:uLnTx/>
-              <a:uFillTx/>
-              <a:ea typeface="Arial Unicode MS" pitchFamily="34" charset="-128"/>
-              <a:cs typeface="Arial Unicode MS" pitchFamily="34" charset="-128"/>
-            </a:endParaRPr>
-          </a:p>
-        </p:txBody>
-      </p:sp>
-      <p:sp>
-        <p:nvSpPr>
-          <p:cNvPr id="14" name="Rectangle 13"/>
-          <p:cNvSpPr/>
-          <p:nvPr/>
-        </p:nvSpPr>
-        <p:spPr bwMode="gray">
-          <a:xfrm>
-            <a:off x="6624394" y="5477853"/>
-            <a:ext cx="1062486" cy="806724"/>
-          </a:xfrm>
-          <a:prstGeom prst="rect">
-            <a:avLst/>
-          </a:prstGeom>
-          <a:ln>
-            <a:headEnd/>
-            <a:tailEnd/>
-          </a:ln>
-        </p:spPr>
-        <p:style>
-          <a:lnRef idx="2">
-            <a:schemeClr val="accent2"/>
-          </a:lnRef>
-          <a:fillRef idx="1">
-            <a:schemeClr val="lt1"/>
-          </a:fillRef>
-          <a:effectRef idx="0">
-            <a:schemeClr val="accent2"/>
-          </a:effectRef>
-          <a:fontRef idx="minor">
-            <a:schemeClr val="dk1"/>
-          </a:fontRef>
-        </p:style>
-        <p:txBody>
-          <a:bodyPr lIns="90000" tIns="72000" rIns="90000" bIns="72000" rtlCol="0" anchor="ctr"/>
-          <a:lstStyle/>
-          <a:p>
-            <a:pPr marR="0" algn="ctr" defTabSz="914400" eaLnBrk="1" fontAlgn="base" latinLnBrk="0" hangingPunct="1">
-              <a:lnSpc>
-                <a:spcPct val="100000"/>
-              </a:lnSpc>
-              <a:spcBef>
-                <a:spcPct val="50000"/>
-              </a:spcBef>
-              <a:spcAft>
-                <a:spcPct val="0"/>
-              </a:spcAft>
-              <a:buClr>
-                <a:srgbClr val="F0AB00"/>
-              </a:buClr>
-              <a:buSzPct val="80000"/>
-              <a:tabLst/>
-            </a:pPr>
-            <a:r>
-              <a:rPr lang="en-US" sz="1800" kern="0" noProof="0" dirty="0">
-                <a:ea typeface="Arial Unicode MS" pitchFamily="34" charset="-128"/>
-                <a:cs typeface="Arial Unicode MS" pitchFamily="34" charset="-128"/>
-              </a:rPr>
-              <a:t>Pod</a:t>
-            </a:r>
-            <a:r>
-              <a:rPr lang="en-US" sz="1800" kern="0" dirty="0">
-                <a:ea typeface="Arial Unicode MS" pitchFamily="34" charset="-128"/>
-                <a:cs typeface="Arial Unicode MS" pitchFamily="34" charset="-128"/>
-              </a:rPr>
-              <a:t> B</a:t>
-            </a:r>
-            <a:endParaRPr kumimoji="0" lang="en-US" sz="1800" b="0" i="0" u="none" strike="noStrike" kern="0" cap="none" spc="0" normalizeH="0" baseline="0" noProof="0" dirty="0">
-              <a:ln>
-                <a:noFill/>
-              </a:ln>
-              <a:effectLst/>
-              <a:uLnTx/>
-              <a:uFillTx/>
-              <a:ea typeface="Arial Unicode MS" pitchFamily="34" charset="-128"/>
-              <a:cs typeface="Arial Unicode MS" pitchFamily="34" charset="-128"/>
-            </a:endParaRPr>
-          </a:p>
-        </p:txBody>
-      </p:sp>
-      <p:cxnSp>
-        <p:nvCxnSpPr>
-          <p:cNvPr id="16" name="Straight Arrow Connector 15"/>
-          <p:cNvCxnSpPr>
-            <a:stCxn id="7" idx="3"/>
-            <a:endCxn id="12" idx="1"/>
-          </p:cNvCxnSpPr>
-          <p:nvPr/>
-        </p:nvCxnSpPr>
-        <p:spPr>
-          <a:xfrm flipV="1">
-            <a:off x="4796990" y="3945735"/>
-            <a:ext cx="1827404" cy="599345"/>
-          </a:xfrm>
-          <a:prstGeom prst="straightConnector1">
-            <a:avLst/>
-          </a:prstGeom>
-          <a:ln w="38100">
-            <a:solidFill>
-              <a:schemeClr val="tx2">
-                <a:lumMod val="60000"/>
-                <a:lumOff val="40000"/>
-              </a:schemeClr>
-            </a:solidFill>
-            <a:headEnd type="none" w="med" len="med"/>
-            <a:tailEnd type="triangle"/>
-          </a:ln>
-        </p:spPr>
-        <p:style>
-          <a:lnRef idx="1">
-            <a:schemeClr val="accent1"/>
-          </a:lnRef>
-          <a:fillRef idx="0">
-            <a:schemeClr val="accent1"/>
-          </a:fillRef>
-          <a:effectRef idx="0">
-            <a:schemeClr val="accent1"/>
-          </a:effectRef>
-          <a:fontRef idx="minor">
-            <a:schemeClr val="tx1"/>
-          </a:fontRef>
-        </p:style>
-      </p:cxnSp>
-      <p:cxnSp>
-        <p:nvCxnSpPr>
-          <p:cNvPr id="17" name="Straight Arrow Connector 16"/>
-          <p:cNvCxnSpPr>
-            <a:stCxn id="7" idx="3"/>
-            <a:endCxn id="14" idx="1"/>
-          </p:cNvCxnSpPr>
-          <p:nvPr/>
-        </p:nvCxnSpPr>
-        <p:spPr>
-          <a:xfrm>
-            <a:off x="4796990" y="4545080"/>
-            <a:ext cx="1827404" cy="1336135"/>
-          </a:xfrm>
-          <a:prstGeom prst="straightConnector1">
-            <a:avLst/>
-          </a:prstGeom>
-          <a:ln w="38100">
-            <a:solidFill>
-              <a:schemeClr val="tx2">
-                <a:lumMod val="60000"/>
-                <a:lumOff val="40000"/>
-              </a:schemeClr>
-            </a:solidFill>
-            <a:headEnd type="none" w="med" len="med"/>
-            <a:tailEnd type="triangle"/>
-          </a:ln>
-        </p:spPr>
-        <p:style>
-          <a:lnRef idx="1">
-            <a:schemeClr val="accent1"/>
-          </a:lnRef>
-          <a:fillRef idx="0">
-            <a:schemeClr val="accent1"/>
-          </a:fillRef>
-          <a:effectRef idx="0">
-            <a:schemeClr val="accent1"/>
-          </a:effectRef>
-          <a:fontRef idx="minor">
-            <a:schemeClr val="tx1"/>
-          </a:fontRef>
-        </p:style>
-      </p:cxnSp>
-      <p:sp>
-        <p:nvSpPr>
-          <p:cNvPr id="22" name="Cylinder 21"/>
-          <p:cNvSpPr/>
-          <p:nvPr/>
-        </p:nvSpPr>
-        <p:spPr bwMode="gray">
-          <a:xfrm>
-            <a:off x="3481540" y="5500723"/>
-            <a:ext cx="1002967" cy="812920"/>
-          </a:xfrm>
-          <a:prstGeom prst="can">
-            <a:avLst/>
-          </a:prstGeom>
-          <a:ln>
-            <a:headEnd/>
-            <a:tailEnd/>
-          </a:ln>
-        </p:spPr>
-        <p:style>
-          <a:lnRef idx="2">
-            <a:schemeClr val="accent2"/>
-          </a:lnRef>
-          <a:fillRef idx="1">
-            <a:schemeClr val="lt1"/>
-          </a:fillRef>
-          <a:effectRef idx="0">
-            <a:schemeClr val="accent2"/>
-          </a:effectRef>
-          <a:fontRef idx="minor">
-            <a:schemeClr val="dk1"/>
-          </a:fontRef>
-        </p:style>
-        <p:txBody>
-          <a:bodyPr lIns="90000" tIns="72000" rIns="90000" bIns="72000" rtlCol="0" anchor="ctr"/>
-          <a:lstStyle/>
-          <a:p>
-            <a:pPr marR="0" algn="ctr" defTabSz="914400" eaLnBrk="1" fontAlgn="base" latinLnBrk="0" hangingPunct="1">
-              <a:lnSpc>
-                <a:spcPct val="100000"/>
-              </a:lnSpc>
-              <a:spcBef>
-                <a:spcPct val="50000"/>
-              </a:spcBef>
-              <a:spcAft>
-                <a:spcPct val="0"/>
-              </a:spcAft>
-              <a:buClr>
-                <a:srgbClr val="F0AB00"/>
-              </a:buClr>
-              <a:buSzPct val="80000"/>
-              <a:tabLst/>
-            </a:pPr>
-            <a:r>
-              <a:rPr lang="en-US" sz="1800" kern="0" dirty="0">
-                <a:ea typeface="Arial Unicode MS" pitchFamily="34" charset="-128"/>
-                <a:cs typeface="Arial Unicode MS" pitchFamily="34" charset="-128"/>
-              </a:rPr>
-              <a:t>secrets</a:t>
-            </a:r>
-            <a:endParaRPr kumimoji="0" lang="en-US" sz="1800" b="0" i="0" u="none" strike="noStrike" kern="0" cap="none" spc="0" normalizeH="0" baseline="0" noProof="0" dirty="0">
-              <a:ln>
-                <a:noFill/>
-              </a:ln>
-              <a:effectLst/>
-              <a:uLnTx/>
-              <a:uFillTx/>
-              <a:ea typeface="Arial Unicode MS" pitchFamily="34" charset="-128"/>
-              <a:cs typeface="Arial Unicode MS" pitchFamily="34" charset="-128"/>
-            </a:endParaRPr>
-          </a:p>
-        </p:txBody>
-      </p:sp>
-      <p:cxnSp>
-        <p:nvCxnSpPr>
-          <p:cNvPr id="24" name="Straight Arrow Connector 23"/>
-          <p:cNvCxnSpPr>
-            <a:stCxn id="22" idx="1"/>
-            <a:endCxn id="7" idx="2"/>
-          </p:cNvCxnSpPr>
-          <p:nvPr/>
-        </p:nvCxnSpPr>
-        <p:spPr>
-          <a:xfrm flipV="1">
-            <a:off x="3983024" y="5123209"/>
-            <a:ext cx="1" cy="377514"/>
-          </a:xfrm>
-          <a:prstGeom prst="straightConnector1">
-            <a:avLst/>
-          </a:prstGeom>
-          <a:ln w="38100">
-            <a:solidFill>
-              <a:schemeClr val="tx2">
-                <a:lumMod val="60000"/>
-                <a:lumOff val="40000"/>
-              </a:schemeClr>
-            </a:solidFill>
-            <a:headEnd type="none" w="med" len="med"/>
-            <a:tailEnd type="triangle"/>
-          </a:ln>
-        </p:spPr>
-        <p:style>
-          <a:lnRef idx="1">
-            <a:schemeClr val="accent1"/>
-          </a:lnRef>
-          <a:fillRef idx="0">
-            <a:schemeClr val="accent1"/>
-          </a:fillRef>
-          <a:effectRef idx="0">
-            <a:schemeClr val="accent1"/>
-          </a:effectRef>
-          <a:fontRef idx="minor">
-            <a:schemeClr val="tx1"/>
-          </a:fontRef>
-        </p:style>
-      </p:cxnSp>
-    </p:spTree>
-    <p:extLst>
-      <p:ext uri="{BB962C8B-B14F-4D97-AF65-F5344CB8AC3E}">
-        <p14:creationId xmlns:p14="http://schemas.microsoft.com/office/powerpoint/2010/main" val="864191870"/>
-      </p:ext>
-    </p:extLst>
-  </p:cSld>
-  <p:clrMapOvr>
-    <a:masterClrMapping/>
-  </p:clrMapOvr>
-</p:sld>
-</file>
-
-<file path=ppt/slides/slide20.xml><?xml version="1.0" encoding="utf-8"?>
+<file path=ppt/slides/slide21.xml><?xml version="1.0" encoding="utf-8"?>
 <p:sld xmlns:a="http://schemas.openxmlformats.org/drawingml/2006/main" xmlns:r="http://schemas.openxmlformats.org/officeDocument/2006/relationships" xmlns:p="http://schemas.openxmlformats.org/presentationml/2006/main" show="0">
   <p:cSld>
     <p:spTree>
@@ -33403,7 +33497,7 @@
         </p:nvSpPr>
         <p:spPr bwMode="gray">
           <a:xfrm>
-            <a:off x="4612822" y="1395846"/>
+            <a:off x="4612822" y="1407135"/>
             <a:ext cx="6179820" cy="4604904"/>
           </a:xfrm>
           <a:prstGeom prst="rect">

</xml_diff>

<commit_message>
Added some sound to the slides.
</commit_message>
<xml_diff>
--- a/kubernetes/11_administration.pptx
+++ b/kubernetes/11_administration.pptx
@@ -17491,6 +17491,44 @@
           </a:p>
         </p:txBody>
       </p:sp>
+      <p:pic>
+        <p:nvPicPr>
+          <p:cNvPr id="4" name="mario">
+            <a:hlinkClick r:id="" action="ppaction://media"/>
+            <a:extLst>
+              <a:ext uri="{FF2B5EF4-FFF2-40B4-BE49-F238E27FC236}">
+                <a16:creationId xmlns:a16="http://schemas.microsoft.com/office/drawing/2014/main" id="{5EDB2663-CD61-4DD6-BC63-9F4A86D811FD}"/>
+              </a:ext>
+            </a:extLst>
+          </p:cNvPr>
+          <p:cNvPicPr>
+            <a:picLocks noChangeAspect="1"/>
+          </p:cNvPicPr>
+          <p:nvPr>
+            <a:audioFile r:link="rId2"/>
+            <p:extLst>
+              <p:ext uri="{DAA4B4D4-6D71-4841-9C94-3DE7FCFB9230}">
+                <p14:media xmlns:p14="http://schemas.microsoft.com/office/powerpoint/2010/main" r:embed="rId1"/>
+              </p:ext>
+            </p:extLst>
+          </p:nvPr>
+        </p:nvPicPr>
+        <p:blipFill>
+          <a:blip r:embed="rId5"/>
+          <a:stretch>
+            <a:fillRect/>
+          </a:stretch>
+        </p:blipFill>
+        <p:spPr>
+          <a:xfrm>
+            <a:off x="3231203" y="383866"/>
+            <a:ext cx="609600" cy="609600"/>
+          </a:xfrm>
+          <a:prstGeom prst="rect">
+            <a:avLst/>
+          </a:prstGeom>
+        </p:spPr>
+      </p:pic>
     </p:spTree>
     <p:extLst>
       <p:ext uri="{BB962C8B-B14F-4D97-AF65-F5344CB8AC3E}">
@@ -17501,6 +17539,93 @@
   <p:clrMapOvr>
     <a:masterClrMapping/>
   </p:clrMapOvr>
+  <p:timing>
+    <p:tnLst>
+      <p:par>
+        <p:cTn id="1" dur="indefinite" restart="never" nodeType="tmRoot">
+          <p:childTnLst>
+            <p:seq concurrent="1" nextAc="seek">
+              <p:cTn id="2" dur="indefinite" nodeType="mainSeq">
+                <p:childTnLst>
+                  <p:par>
+                    <p:cTn id="3" fill="hold">
+                      <p:stCondLst>
+                        <p:cond delay="indefinite"/>
+                        <p:cond evt="onBegin" delay="0">
+                          <p:tn val="2"/>
+                        </p:cond>
+                      </p:stCondLst>
+                      <p:childTnLst>
+                        <p:par>
+                          <p:cTn id="4" fill="hold">
+                            <p:stCondLst>
+                              <p:cond delay="0"/>
+                            </p:stCondLst>
+                            <p:childTnLst>
+                              <p:par>
+                                <p:cTn id="5" presetID="1" presetClass="mediacall" presetSubtype="0" fill="hold" nodeType="afterEffect">
+                                  <p:stCondLst>
+                                    <p:cond delay="0"/>
+                                  </p:stCondLst>
+                                  <p:childTnLst>
+                                    <p:cmd type="call" cmd="playFrom(0.0)">
+                                      <p:cBhvr>
+                                        <p:cTn id="6" dur="2361" fill="hold"/>
+                                        <p:tgtEl>
+                                          <p:spTgt spid="4"/>
+                                        </p:tgtEl>
+                                      </p:cBhvr>
+                                    </p:cmd>
+                                  </p:childTnLst>
+                                </p:cTn>
+                              </p:par>
+                            </p:childTnLst>
+                          </p:cTn>
+                        </p:par>
+                      </p:childTnLst>
+                    </p:cTn>
+                  </p:par>
+                </p:childTnLst>
+              </p:cTn>
+              <p:prevCondLst>
+                <p:cond evt="onPrev" delay="0">
+                  <p:tgtEl>
+                    <p:sldTgt/>
+                  </p:tgtEl>
+                </p:cond>
+              </p:prevCondLst>
+              <p:nextCondLst>
+                <p:cond evt="onNext" delay="0">
+                  <p:tgtEl>
+                    <p:sldTgt/>
+                  </p:tgtEl>
+                </p:cond>
+              </p:nextCondLst>
+            </p:seq>
+            <p:audio>
+              <p:cMediaNode vol="80000" showWhenStopped="0">
+                <p:cTn id="7" fill="hold" display="0">
+                  <p:stCondLst>
+                    <p:cond delay="indefinite"/>
+                  </p:stCondLst>
+                  <p:endCondLst>
+                    <p:cond evt="onStopAudio" delay="0">
+                      <p:tgtEl>
+                        <p:sldTgt/>
+                      </p:tgtEl>
+                    </p:cond>
+                  </p:endCondLst>
+                </p:cTn>
+                <p:tgtEl>
+                  <p:spTgt spid="4"/>
+                </p:tgtEl>
+              </p:cMediaNode>
+            </p:audio>
+          </p:childTnLst>
+        </p:cTn>
+      </p:par>
+    </p:tnLst>
+  </p:timing>
 </p:sld>
 </file>
 
@@ -19817,6 +19942,44 @@
           </a:fontRef>
         </p:style>
       </p:cxnSp>
+      <p:pic>
+        <p:nvPicPr>
+          <p:cNvPr id="5" name="mario-end">
+            <a:hlinkClick r:id="" action="ppaction://media"/>
+            <a:extLst>
+              <a:ext uri="{FF2B5EF4-FFF2-40B4-BE49-F238E27FC236}">
+                <a16:creationId xmlns:a16="http://schemas.microsoft.com/office/drawing/2014/main" id="{81106E6E-145A-4D99-B520-20556078FE9F}"/>
+              </a:ext>
+            </a:extLst>
+          </p:cNvPr>
+          <p:cNvPicPr>
+            <a:picLocks noChangeAspect="1"/>
+          </p:cNvPicPr>
+          <p:nvPr>
+            <a:audioFile r:link="rId2"/>
+            <p:extLst>
+              <p:ext uri="{DAA4B4D4-6D71-4841-9C94-3DE7FCFB9230}">
+                <p14:media xmlns:p14="http://schemas.microsoft.com/office/powerpoint/2010/main" r:embed="rId1"/>
+              </p:ext>
+            </p:extLst>
+          </p:nvPr>
+        </p:nvPicPr>
+        <p:blipFill>
+          <a:blip r:embed="rId4"/>
+          <a:stretch>
+            <a:fillRect/>
+          </a:stretch>
+        </p:blipFill>
+        <p:spPr>
+          <a:xfrm>
+            <a:off x="10930622" y="5736631"/>
+            <a:ext cx="609600" cy="609600"/>
+          </a:xfrm>
+          <a:prstGeom prst="rect">
+            <a:avLst/>
+          </a:prstGeom>
+        </p:spPr>
+      </p:pic>
     </p:spTree>
     <p:extLst>
       <p:ext uri="{BB962C8B-B14F-4D97-AF65-F5344CB8AC3E}">
@@ -19827,6 +19990,93 @@
   <p:clrMapOvr>
     <a:masterClrMapping/>
   </p:clrMapOvr>
+  <p:timing>
+    <p:tnLst>
+      <p:par>
+        <p:cTn id="1" dur="indefinite" restart="never" nodeType="tmRoot">
+          <p:childTnLst>
+            <p:seq concurrent="1" nextAc="seek">
+              <p:cTn id="2" dur="indefinite" nodeType="mainSeq">
+                <p:childTnLst>
+                  <p:par>
+                    <p:cTn id="3" fill="hold">
+                      <p:stCondLst>
+                        <p:cond delay="indefinite"/>
+                        <p:cond evt="onBegin" delay="0">
+                          <p:tn val="2"/>
+                        </p:cond>
+                      </p:stCondLst>
+                      <p:childTnLst>
+                        <p:par>
+                          <p:cTn id="4" fill="hold">
+                            <p:stCondLst>
+                              <p:cond delay="0"/>
+                            </p:stCondLst>
+                            <p:childTnLst>
+                              <p:par>
+                                <p:cTn id="5" presetID="1" presetClass="mediacall" presetSubtype="0" fill="hold" nodeType="afterEffect">
+                                  <p:stCondLst>
+                                    <p:cond delay="0"/>
+                                  </p:stCondLst>
+                                  <p:childTnLst>
+                                    <p:cmd type="call" cmd="playFrom(0.0)">
+                                      <p:cBhvr>
+                                        <p:cTn id="6" dur="3791" fill="hold"/>
+                                        <p:tgtEl>
+                                          <p:spTgt spid="5"/>
+                                        </p:tgtEl>
+                                      </p:cBhvr>
+                                    </p:cmd>
+                                  </p:childTnLst>
+                                </p:cTn>
+                              </p:par>
+                            </p:childTnLst>
+                          </p:cTn>
+                        </p:par>
+                      </p:childTnLst>
+                    </p:cTn>
+                  </p:par>
+                </p:childTnLst>
+              </p:cTn>
+              <p:prevCondLst>
+                <p:cond evt="onPrev" delay="0">
+                  <p:tgtEl>
+                    <p:sldTgt/>
+                  </p:tgtEl>
+                </p:cond>
+              </p:prevCondLst>
+              <p:nextCondLst>
+                <p:cond evt="onNext" delay="0">
+                  <p:tgtEl>
+                    <p:sldTgt/>
+                  </p:tgtEl>
+                </p:cond>
+              </p:nextCondLst>
+            </p:seq>
+            <p:audio>
+              <p:cMediaNode vol="80000" showWhenStopped="0">
+                <p:cTn id="7" fill="hold" display="0">
+                  <p:stCondLst>
+                    <p:cond delay="indefinite"/>
+                  </p:stCondLst>
+                  <p:endCondLst>
+                    <p:cond evt="onStopAudio" delay="0">
+                      <p:tgtEl>
+                        <p:sldTgt/>
+                      </p:tgtEl>
+                    </p:cond>
+                  </p:endCondLst>
+                </p:cTn>
+                <p:tgtEl>
+                  <p:spTgt spid="5"/>
+                </p:tgtEl>
+              </p:cMediaNode>
+            </p:audio>
+          </p:childTnLst>
+        </p:cTn>
+      </p:par>
+    </p:tnLst>
+  </p:timing>
 </p:sld>
 </file>
 

</xml_diff>

<commit_message>
+ gardener and cf slide
</commit_message>
<xml_diff>
--- a/kubernetes/11_administration.pptx
+++ b/kubernetes/11_administration.pptx
@@ -5,10 +5,10 @@
     <p:sldMasterId id="2147483733" r:id="rId1"/>
   </p:sldMasterIdLst>
   <p:notesMasterIdLst>
-    <p:notesMasterId r:id="rId23"/>
+    <p:notesMasterId r:id="rId24"/>
   </p:notesMasterIdLst>
   <p:handoutMasterIdLst>
-    <p:handoutMasterId r:id="rId24"/>
+    <p:handoutMasterId r:id="rId25"/>
   </p:handoutMasterIdLst>
   <p:sldIdLst>
     <p:sldId id="433" r:id="rId2"/>
@@ -31,7 +31,8 @@
     <p:sldId id="449" r:id="rId19"/>
     <p:sldId id="460" r:id="rId20"/>
     <p:sldId id="461" r:id="rId21"/>
-    <p:sldId id="265" r:id="rId22"/>
+    <p:sldId id="465" r:id="rId22"/>
+    <p:sldId id="265" r:id="rId23"/>
   </p:sldIdLst>
   <p:sldSz cx="12195175" cy="6858000"/>
   <p:notesSz cx="6858000" cy="9144000"/>
@@ -207,10 +208,6 @@
 </p:presentation>
 </file>
 
-<file path=ppt/revisionInfo.xml><?xml version="1.0" encoding="utf-8"?>
-<p1510:revInfo xmlns:a="http://schemas.openxmlformats.org/drawingml/2006/main" xmlns:r="http://schemas.openxmlformats.org/officeDocument/2006/relationships" xmlns:p1510="http://schemas.microsoft.com/office/powerpoint/2015/10/main"/>
-</file>
-
 <file path=ppt/handoutMasters/handoutMaster1.xml><?xml version="1.0" encoding="utf-8"?>
 <p:handoutMaster xmlns:a="http://schemas.openxmlformats.org/drawingml/2006/main" xmlns:r="http://schemas.openxmlformats.org/officeDocument/2006/relationships" xmlns:p="http://schemas.openxmlformats.org/presentationml/2006/main">
   <p:cSld>
@@ -1750,6 +1747,37 @@
       </p:grpSpPr>
       <p:sp>
         <p:nvSpPr>
+          <p:cNvPr id="2" name="Slide Image Placeholder 1"/>
+          <p:cNvSpPr>
+            <a:spLocks noGrp="1" noRot="1" noChangeAspect="1"/>
+          </p:cNvSpPr>
+          <p:nvPr>
+            <p:ph type="sldImg"/>
+          </p:nvPr>
+        </p:nvSpPr>
+        <p:spPr/>
+      </p:sp>
+      <p:sp>
+        <p:nvSpPr>
+          <p:cNvPr id="3" name="Notes Placeholder 2"/>
+          <p:cNvSpPr>
+            <a:spLocks noGrp="1"/>
+          </p:cNvSpPr>
+          <p:nvPr>
+            <p:ph type="body" idx="1"/>
+          </p:nvPr>
+        </p:nvSpPr>
+        <p:spPr/>
+        <p:txBody>
+          <a:bodyPr/>
+          <a:lstStyle/>
+          <a:p>
+            <a:endParaRPr lang="en-US" dirty="0"/>
+          </a:p>
+        </p:txBody>
+      </p:sp>
+      <p:sp>
+        <p:nvSpPr>
           <p:cNvPr id="4" name="Slide Number Placeholder 3"/>
           <p:cNvSpPr>
             <a:spLocks noGrp="1"/>
@@ -1764,9 +1792,63 @@
           <a:lstStyle/>
           <a:p>
             <a:fld id="{7D8C2C35-2B8A-446E-BEC0-FD36716C29AC}" type="slidenum">
+              <a:rPr lang="de-DE" smtClean="0"/>
+              <a:pPr/>
+              <a:t>21</a:t>
+            </a:fld>
+            <a:endParaRPr lang="de-DE" dirty="0"/>
+          </a:p>
+        </p:txBody>
+      </p:sp>
+    </p:spTree>
+    <p:extLst>
+      <p:ext uri="{BB962C8B-B14F-4D97-AF65-F5344CB8AC3E}">
+        <p14:creationId xmlns:p14="http://schemas.microsoft.com/office/powerpoint/2010/main" val="857575218"/>
+      </p:ext>
+    </p:extLst>
+  </p:cSld>
+  <p:clrMapOvr>
+    <a:masterClrMapping/>
+  </p:clrMapOvr>
+</p:notes>
+</file>
+
+<file path=ppt/notesSlides/notesSlide19.xml><?xml version="1.0" encoding="utf-8"?>
+<p:notes xmlns:a="http://schemas.openxmlformats.org/drawingml/2006/main" xmlns:r="http://schemas.openxmlformats.org/officeDocument/2006/relationships" xmlns:p="http://schemas.openxmlformats.org/presentationml/2006/main">
+  <p:cSld>
+    <p:spTree>
+      <p:nvGrpSpPr>
+        <p:cNvPr id="1" name=""/>
+        <p:cNvGrpSpPr/>
+        <p:nvPr/>
+      </p:nvGrpSpPr>
+      <p:grpSpPr>
+        <a:xfrm>
+          <a:off x="0" y="0"/>
+          <a:ext cx="0" cy="0"/>
+          <a:chOff x="0" y="0"/>
+          <a:chExt cx="0" cy="0"/>
+        </a:xfrm>
+      </p:grpSpPr>
+      <p:sp>
+        <p:nvSpPr>
+          <p:cNvPr id="4" name="Slide Number Placeholder 3"/>
+          <p:cNvSpPr>
+            <a:spLocks noGrp="1"/>
+          </p:cNvSpPr>
+          <p:nvPr>
+            <p:ph type="sldNum" sz="quarter" idx="10"/>
+          </p:nvPr>
+        </p:nvSpPr>
+        <p:spPr/>
+        <p:txBody>
+          <a:bodyPr/>
+          <a:lstStyle/>
+          <a:p>
+            <a:fld id="{7D8C2C35-2B8A-446E-BEC0-FD36716C29AC}" type="slidenum">
               <a:rPr lang="en-US" smtClean="0"/>
               <a:pPr/>
-              <a:t>21</a:t>
+              <a:t>22</a:t>
             </a:fld>
             <a:endParaRPr lang="en-US" dirty="0"/>
           </a:p>
@@ -30292,6 +30374,1650 @@
 </file>
 
 <file path=ppt/slides/slide21.xml><?xml version="1.0" encoding="utf-8"?>
+<p:sld xmlns:a="http://schemas.openxmlformats.org/drawingml/2006/main" xmlns:r="http://schemas.openxmlformats.org/officeDocument/2006/relationships" xmlns:p="http://schemas.openxmlformats.org/presentationml/2006/main">
+  <p:cSld>
+    <p:spTree>
+      <p:nvGrpSpPr>
+        <p:cNvPr id="1" name=""/>
+        <p:cNvGrpSpPr/>
+        <p:nvPr/>
+      </p:nvGrpSpPr>
+      <p:grpSpPr>
+        <a:xfrm>
+          <a:off x="0" y="0"/>
+          <a:ext cx="0" cy="0"/>
+          <a:chOff x="0" y="0"/>
+          <a:chExt cx="0" cy="0"/>
+        </a:xfrm>
+      </p:grpSpPr>
+      <p:sp>
+        <p:nvSpPr>
+          <p:cNvPr id="3" name="Title 2"/>
+          <p:cNvSpPr>
+            <a:spLocks noGrp="1"/>
+          </p:cNvSpPr>
+          <p:nvPr>
+            <p:ph type="title"/>
+          </p:nvPr>
+        </p:nvSpPr>
+        <p:spPr>
+          <a:xfrm>
+            <a:off x="504001" y="504000"/>
+            <a:ext cx="11186476" cy="738664"/>
+          </a:xfrm>
+        </p:spPr>
+        <p:txBody>
+          <a:bodyPr/>
+          <a:lstStyle/>
+          <a:p>
+            <a:r>
+              <a:rPr lang="de-DE" dirty="0" err="1"/>
+              <a:t>No</a:t>
+            </a:r>
+            <a:r>
+              <a:rPr lang="de-DE" dirty="0"/>
+              <a:t> „</a:t>
+            </a:r>
+            <a:r>
+              <a:rPr lang="de-DE" dirty="0" err="1"/>
+              <a:t>one</a:t>
+            </a:r>
+            <a:r>
+              <a:rPr lang="de-DE" dirty="0"/>
+              <a:t> </a:t>
+            </a:r>
+            <a:r>
+              <a:rPr lang="de-DE" dirty="0" err="1"/>
+              <a:t>size</a:t>
+            </a:r>
+            <a:r>
+              <a:rPr lang="de-DE" dirty="0"/>
+              <a:t> </a:t>
+            </a:r>
+            <a:r>
+              <a:rPr lang="de-DE" dirty="0" err="1"/>
+              <a:t>fits</a:t>
+            </a:r>
+            <a:r>
+              <a:rPr lang="de-DE" dirty="0"/>
+              <a:t> all“ - Cloud </a:t>
+            </a:r>
+            <a:r>
+              <a:rPr lang="de-DE" dirty="0" err="1"/>
+              <a:t>Foundry</a:t>
+            </a:r>
+            <a:r>
+              <a:rPr lang="de-DE" dirty="0"/>
+              <a:t> </a:t>
+            </a:r>
+            <a:r>
+              <a:rPr lang="de-DE" dirty="0" err="1"/>
+              <a:t>and</a:t>
+            </a:r>
+            <a:r>
+              <a:rPr lang="de-DE" dirty="0"/>
+              <a:t> </a:t>
+            </a:r>
+            <a:r>
+              <a:rPr lang="de-DE" dirty="0" err="1"/>
+              <a:t>Kubernetes</a:t>
+            </a:r>
+            <a:br>
+              <a:rPr lang="de-DE" dirty="0"/>
+            </a:br>
+            <a:endParaRPr lang="en-US" dirty="0"/>
+          </a:p>
+        </p:txBody>
+      </p:sp>
+      <p:grpSp>
+        <p:nvGrpSpPr>
+          <p:cNvPr id="4" name="Group 3"/>
+          <p:cNvGrpSpPr/>
+          <p:nvPr/>
+        </p:nvGrpSpPr>
+        <p:grpSpPr>
+          <a:xfrm>
+            <a:off x="369403" y="1674928"/>
+            <a:ext cx="5000980" cy="4150401"/>
+            <a:chOff x="428106" y="2378312"/>
+            <a:chExt cx="5000980" cy="4150401"/>
+          </a:xfrm>
+        </p:grpSpPr>
+        <p:cxnSp>
+          <p:nvCxnSpPr>
+            <p:cNvPr id="5" name="Straight Connector 4"/>
+            <p:cNvCxnSpPr/>
+            <p:nvPr/>
+          </p:nvCxnSpPr>
+          <p:spPr>
+            <a:xfrm>
+              <a:off x="1542670" y="2708734"/>
+              <a:ext cx="0" cy="2725772"/>
+            </a:xfrm>
+            <a:prstGeom prst="line">
+              <a:avLst/>
+            </a:prstGeom>
+            <a:ln w="9525">
+              <a:solidFill>
+                <a:schemeClr val="tx1"/>
+              </a:solidFill>
+              <a:headEnd type="none" w="med" len="med"/>
+              <a:tailEnd type="none" w="med" len="med"/>
+            </a:ln>
+          </p:spPr>
+          <p:style>
+            <a:lnRef idx="1">
+              <a:schemeClr val="accent1"/>
+            </a:lnRef>
+            <a:fillRef idx="0">
+              <a:schemeClr val="accent1"/>
+            </a:fillRef>
+            <a:effectRef idx="0">
+              <a:schemeClr val="accent1"/>
+            </a:effectRef>
+            <a:fontRef idx="minor">
+              <a:schemeClr val="tx1"/>
+            </a:fontRef>
+          </p:style>
+        </p:cxnSp>
+        <p:cxnSp>
+          <p:nvCxnSpPr>
+            <p:cNvPr id="7" name="Straight Connector 6"/>
+            <p:cNvCxnSpPr/>
+            <p:nvPr/>
+          </p:nvCxnSpPr>
+          <p:spPr>
+            <a:xfrm>
+              <a:off x="1524363" y="5434506"/>
+              <a:ext cx="3561781" cy="0"/>
+            </a:xfrm>
+            <a:prstGeom prst="line">
+              <a:avLst/>
+            </a:prstGeom>
+            <a:ln w="9525">
+              <a:solidFill>
+                <a:schemeClr val="tx1"/>
+              </a:solidFill>
+              <a:headEnd type="none" w="med" len="med"/>
+              <a:tailEnd type="none" w="med" len="med"/>
+            </a:ln>
+          </p:spPr>
+          <p:style>
+            <a:lnRef idx="1">
+              <a:schemeClr val="accent1"/>
+            </a:lnRef>
+            <a:fillRef idx="0">
+              <a:schemeClr val="accent1"/>
+            </a:fillRef>
+            <a:effectRef idx="0">
+              <a:schemeClr val="accent1"/>
+            </a:effectRef>
+            <a:fontRef idx="minor">
+              <a:schemeClr val="tx1"/>
+            </a:fontRef>
+          </p:style>
+        </p:cxnSp>
+        <p:sp>
+          <p:nvSpPr>
+            <p:cNvPr id="9" name="TextBox 8"/>
+            <p:cNvSpPr txBox="1"/>
+            <p:nvPr/>
+          </p:nvSpPr>
+          <p:spPr>
+            <a:xfrm>
+              <a:off x="1542670" y="5489127"/>
+              <a:ext cx="1620502" cy="215388"/>
+            </a:xfrm>
+            <a:prstGeom prst="rect">
+              <a:avLst/>
+            </a:prstGeom>
+            <a:noFill/>
+          </p:spPr>
+          <p:txBody>
+            <a:bodyPr wrap="square" lIns="0" tIns="0" rIns="0" bIns="0" rtlCol="0">
+              <a:spAutoFit/>
+            </a:bodyPr>
+            <a:lstStyle/>
+            <a:p>
+              <a:pPr defTabSz="1088449" fontAlgn="base">
+                <a:spcBef>
+                  <a:spcPct val="50000"/>
+                </a:spcBef>
+                <a:spcAft>
+                  <a:spcPct val="0"/>
+                </a:spcAft>
+                <a:buClr>
+                  <a:srgbClr val="F0AB00"/>
+                </a:buClr>
+                <a:buSzPct val="80000"/>
+              </a:pPr>
+              <a:r>
+                <a:rPr lang="de-DE" sz="1400" kern="0" dirty="0" err="1">
+                  <a:ea typeface="Arial Unicode MS" pitchFamily="34" charset="-128"/>
+                  <a:cs typeface="Arial Unicode MS" pitchFamily="34" charset="-128"/>
+                </a:rPr>
+                <a:t>Porting</a:t>
+              </a:r>
+              <a:r>
+                <a:rPr lang="de-DE" sz="1400" kern="0" dirty="0">
+                  <a:ea typeface="Arial Unicode MS" pitchFamily="34" charset="-128"/>
+                  <a:cs typeface="Arial Unicode MS" pitchFamily="34" charset="-128"/>
+                </a:rPr>
+                <a:t> </a:t>
+              </a:r>
+              <a:r>
+                <a:rPr lang="de-DE" sz="1400" kern="0" dirty="0" err="1">
+                  <a:ea typeface="Arial Unicode MS" pitchFamily="34" charset="-128"/>
+                  <a:cs typeface="Arial Unicode MS" pitchFamily="34" charset="-128"/>
+                </a:rPr>
+                <a:t>only</a:t>
+              </a:r>
+              <a:r>
+                <a:rPr lang="de-DE" sz="1400" kern="0" dirty="0">
+                  <a:ea typeface="Arial Unicode MS" pitchFamily="34" charset="-128"/>
+                  <a:cs typeface="Arial Unicode MS" pitchFamily="34" charset="-128"/>
+                </a:rPr>
+                <a:t> (</a:t>
+              </a:r>
+              <a:r>
+                <a:rPr lang="de-DE" sz="1400" kern="0" dirty="0" err="1">
+                  <a:ea typeface="Arial Unicode MS" pitchFamily="34" charset="-128"/>
+                  <a:cs typeface="Arial Unicode MS" pitchFamily="34" charset="-128"/>
+                </a:rPr>
+                <a:t>as-is</a:t>
+              </a:r>
+              <a:r>
+                <a:rPr lang="de-DE" sz="1400" kern="0" dirty="0">
+                  <a:ea typeface="Arial Unicode MS" pitchFamily="34" charset="-128"/>
+                  <a:cs typeface="Arial Unicode MS" pitchFamily="34" charset="-128"/>
+                </a:rPr>
+                <a:t>)</a:t>
+              </a:r>
+              <a:endParaRPr lang="en-US" sz="1400" kern="0" dirty="0" err="1">
+                <a:ea typeface="Arial Unicode MS" pitchFamily="34" charset="-128"/>
+                <a:cs typeface="Arial Unicode MS" pitchFamily="34" charset="-128"/>
+              </a:endParaRPr>
+            </a:p>
+          </p:txBody>
+        </p:sp>
+        <p:sp>
+          <p:nvSpPr>
+            <p:cNvPr id="10" name="TextBox 9"/>
+            <p:cNvSpPr txBox="1"/>
+            <p:nvPr/>
+          </p:nvSpPr>
+          <p:spPr>
+            <a:xfrm>
+              <a:off x="3496293" y="5467151"/>
+              <a:ext cx="1932793" cy="215388"/>
+            </a:xfrm>
+            <a:prstGeom prst="rect">
+              <a:avLst/>
+            </a:prstGeom>
+            <a:noFill/>
+          </p:spPr>
+          <p:txBody>
+            <a:bodyPr wrap="square" lIns="0" tIns="0" rIns="0" bIns="0" rtlCol="0">
+              <a:spAutoFit/>
+            </a:bodyPr>
+            <a:lstStyle/>
+            <a:p>
+              <a:pPr defTabSz="1088449" fontAlgn="base">
+                <a:spcBef>
+                  <a:spcPct val="50000"/>
+                </a:spcBef>
+                <a:spcAft>
+                  <a:spcPct val="0"/>
+                </a:spcAft>
+                <a:buClr>
+                  <a:srgbClr val="F0AB00"/>
+                </a:buClr>
+                <a:buSzPct val="80000"/>
+              </a:pPr>
+              <a:r>
+                <a:rPr lang="de-DE" sz="1400" kern="0" dirty="0">
+                  <a:ea typeface="Arial Unicode MS" pitchFamily="34" charset="-128"/>
+                  <a:cs typeface="Arial Unicode MS" pitchFamily="34" charset="-128"/>
+                </a:rPr>
+                <a:t>New </a:t>
+              </a:r>
+              <a:r>
+                <a:rPr lang="de-DE" sz="1400" kern="0" dirty="0" err="1">
+                  <a:ea typeface="Arial Unicode MS" pitchFamily="34" charset="-128"/>
+                  <a:cs typeface="Arial Unicode MS" pitchFamily="34" charset="-128"/>
+                </a:rPr>
+                <a:t>or</a:t>
+              </a:r>
+              <a:r>
+                <a:rPr lang="de-DE" sz="1400" kern="0" dirty="0">
+                  <a:ea typeface="Arial Unicode MS" pitchFamily="34" charset="-128"/>
+                  <a:cs typeface="Arial Unicode MS" pitchFamily="34" charset="-128"/>
+                </a:rPr>
+                <a:t> </a:t>
+              </a:r>
+              <a:r>
+                <a:rPr lang="de-DE" sz="1400" kern="0" dirty="0" err="1">
+                  <a:ea typeface="Arial Unicode MS" pitchFamily="34" charset="-128"/>
+                  <a:cs typeface="Arial Unicode MS" pitchFamily="34" charset="-128"/>
+                </a:rPr>
+                <a:t>major</a:t>
+              </a:r>
+              <a:r>
+                <a:rPr lang="de-DE" sz="1400" kern="0" dirty="0">
+                  <a:ea typeface="Arial Unicode MS" pitchFamily="34" charset="-128"/>
+                  <a:cs typeface="Arial Unicode MS" pitchFamily="34" charset="-128"/>
+                </a:rPr>
+                <a:t> </a:t>
+              </a:r>
+              <a:r>
+                <a:rPr lang="de-DE" sz="1400" kern="0" dirty="0" err="1">
+                  <a:ea typeface="Arial Unicode MS" pitchFamily="34" charset="-128"/>
+                  <a:cs typeface="Arial Unicode MS" pitchFamily="34" charset="-128"/>
+                </a:rPr>
+                <a:t>redesign</a:t>
+              </a:r>
+              <a:endParaRPr lang="en-US" sz="1400" kern="0" dirty="0" err="1">
+                <a:ea typeface="Arial Unicode MS" pitchFamily="34" charset="-128"/>
+                <a:cs typeface="Arial Unicode MS" pitchFamily="34" charset="-128"/>
+              </a:endParaRPr>
+            </a:p>
+          </p:txBody>
+        </p:sp>
+        <p:sp>
+          <p:nvSpPr>
+            <p:cNvPr id="11" name="TextBox 10"/>
+            <p:cNvSpPr txBox="1"/>
+            <p:nvPr/>
+          </p:nvSpPr>
+          <p:spPr>
+            <a:xfrm rot="16200000">
+              <a:off x="-166757" y="3743147"/>
+              <a:ext cx="1620502" cy="430775"/>
+            </a:xfrm>
+            <a:prstGeom prst="rect">
+              <a:avLst/>
+            </a:prstGeom>
+            <a:noFill/>
+          </p:spPr>
+          <p:txBody>
+            <a:bodyPr wrap="square" lIns="0" tIns="0" rIns="0" bIns="0" rtlCol="0">
+              <a:spAutoFit/>
+            </a:bodyPr>
+            <a:lstStyle/>
+            <a:p>
+              <a:pPr defTabSz="1088449" fontAlgn="base">
+                <a:spcBef>
+                  <a:spcPct val="50000"/>
+                </a:spcBef>
+                <a:spcAft>
+                  <a:spcPct val="0"/>
+                </a:spcAft>
+                <a:buClr>
+                  <a:srgbClr val="F0AB00"/>
+                </a:buClr>
+                <a:buSzPct val="80000"/>
+              </a:pPr>
+              <a:r>
+                <a:rPr lang="de-DE" sz="1400" b="1" kern="0" dirty="0">
+                  <a:ea typeface="Arial Unicode MS" pitchFamily="34" charset="-128"/>
+                  <a:cs typeface="Arial Unicode MS" pitchFamily="34" charset="-128"/>
+                </a:rPr>
+                <a:t>Platform </a:t>
+              </a:r>
+              <a:r>
+                <a:rPr lang="de-DE" sz="1400" b="1" kern="0" dirty="0" err="1">
+                  <a:ea typeface="Arial Unicode MS" pitchFamily="34" charset="-128"/>
+                  <a:cs typeface="Arial Unicode MS" pitchFamily="34" charset="-128"/>
+                </a:rPr>
+                <a:t>support</a:t>
+              </a:r>
+              <a:r>
+                <a:rPr lang="de-DE" sz="1400" b="1" kern="0" dirty="0">
+                  <a:ea typeface="Arial Unicode MS" pitchFamily="34" charset="-128"/>
+                  <a:cs typeface="Arial Unicode MS" pitchFamily="34" charset="-128"/>
+                </a:rPr>
+                <a:t> </a:t>
+              </a:r>
+              <a:r>
+                <a:rPr lang="de-DE" sz="1400" kern="0" dirty="0" err="1">
+                  <a:ea typeface="Arial Unicode MS" pitchFamily="34" charset="-128"/>
+                  <a:cs typeface="Arial Unicode MS" pitchFamily="34" charset="-128"/>
+                </a:rPr>
+                <a:t>for</a:t>
+              </a:r>
+              <a:r>
+                <a:rPr lang="de-DE" sz="1400" kern="0" dirty="0">
+                  <a:ea typeface="Arial Unicode MS" pitchFamily="34" charset="-128"/>
+                  <a:cs typeface="Arial Unicode MS" pitchFamily="34" charset="-128"/>
+                </a:rPr>
+                <a:t> </a:t>
+              </a:r>
+              <a:r>
+                <a:rPr lang="de-DE" sz="1400" kern="0" dirty="0" err="1">
+                  <a:ea typeface="Arial Unicode MS" pitchFamily="34" charset="-128"/>
+                  <a:cs typeface="Arial Unicode MS" pitchFamily="34" charset="-128"/>
+                </a:rPr>
+                <a:t>dev</a:t>
+              </a:r>
+              <a:r>
+                <a:rPr lang="de-DE" sz="1400" kern="0" dirty="0">
+                  <a:ea typeface="Arial Unicode MS" pitchFamily="34" charset="-128"/>
+                  <a:cs typeface="Arial Unicode MS" pitchFamily="34" charset="-128"/>
+                </a:rPr>
+                <a:t> + </a:t>
+              </a:r>
+              <a:r>
+                <a:rPr lang="de-DE" sz="1400" kern="0" dirty="0" err="1">
+                  <a:ea typeface="Arial Unicode MS" pitchFamily="34" charset="-128"/>
+                  <a:cs typeface="Arial Unicode MS" pitchFamily="34" charset="-128"/>
+                </a:rPr>
+                <a:t>ops</a:t>
+              </a:r>
+              <a:endParaRPr lang="en-US" sz="1400" kern="0" dirty="0" err="1">
+                <a:ea typeface="Arial Unicode MS" pitchFamily="34" charset="-128"/>
+                <a:cs typeface="Arial Unicode MS" pitchFamily="34" charset="-128"/>
+              </a:endParaRPr>
+            </a:p>
+          </p:txBody>
+        </p:sp>
+        <p:sp>
+          <p:nvSpPr>
+            <p:cNvPr id="12" name="TextBox 11"/>
+            <p:cNvSpPr txBox="1"/>
+            <p:nvPr/>
+          </p:nvSpPr>
+          <p:spPr>
+            <a:xfrm>
+              <a:off x="2344882" y="5923148"/>
+              <a:ext cx="1620502" cy="215388"/>
+            </a:xfrm>
+            <a:prstGeom prst="rect">
+              <a:avLst/>
+            </a:prstGeom>
+            <a:noFill/>
+          </p:spPr>
+          <p:txBody>
+            <a:bodyPr wrap="square" lIns="0" tIns="0" rIns="0" bIns="0" rtlCol="0">
+              <a:spAutoFit/>
+            </a:bodyPr>
+            <a:lstStyle/>
+            <a:p>
+              <a:pPr defTabSz="1088449" fontAlgn="base">
+                <a:spcBef>
+                  <a:spcPct val="50000"/>
+                </a:spcBef>
+                <a:spcAft>
+                  <a:spcPct val="0"/>
+                </a:spcAft>
+                <a:buClr>
+                  <a:srgbClr val="F0AB00"/>
+                </a:buClr>
+                <a:buSzPct val="80000"/>
+              </a:pPr>
+              <a:r>
+                <a:rPr lang="de-DE" sz="1400" b="1" kern="0" dirty="0" err="1">
+                  <a:ea typeface="Arial Unicode MS" pitchFamily="34" charset="-128"/>
+                  <a:cs typeface="Arial Unicode MS" pitchFamily="34" charset="-128"/>
+                </a:rPr>
+                <a:t>Redesign</a:t>
+              </a:r>
+              <a:r>
+                <a:rPr lang="de-DE" sz="1400" b="1" kern="0" dirty="0">
+                  <a:ea typeface="Arial Unicode MS" pitchFamily="34" charset="-128"/>
+                  <a:cs typeface="Arial Unicode MS" pitchFamily="34" charset="-128"/>
+                </a:rPr>
+                <a:t> </a:t>
+              </a:r>
+              <a:r>
+                <a:rPr lang="de-DE" sz="1400" b="1" kern="0" dirty="0" err="1">
+                  <a:ea typeface="Arial Unicode MS" pitchFamily="34" charset="-128"/>
+                  <a:cs typeface="Arial Unicode MS" pitchFamily="34" charset="-128"/>
+                </a:rPr>
+                <a:t>flexibility</a:t>
+              </a:r>
+              <a:endParaRPr lang="en-US" sz="1400" b="1" kern="0" dirty="0" err="1">
+                <a:ea typeface="Arial Unicode MS" pitchFamily="34" charset="-128"/>
+                <a:cs typeface="Arial Unicode MS" pitchFamily="34" charset="-128"/>
+              </a:endParaRPr>
+            </a:p>
+          </p:txBody>
+        </p:sp>
+        <p:sp>
+          <p:nvSpPr>
+            <p:cNvPr id="13" name="TextBox 12"/>
+            <p:cNvSpPr txBox="1"/>
+            <p:nvPr/>
+          </p:nvSpPr>
+          <p:spPr>
+            <a:xfrm rot="16200000">
+              <a:off x="417632" y="4593679"/>
+              <a:ext cx="1620502" cy="430775"/>
+            </a:xfrm>
+            <a:prstGeom prst="rect">
+              <a:avLst/>
+            </a:prstGeom>
+            <a:noFill/>
+          </p:spPr>
+          <p:txBody>
+            <a:bodyPr wrap="square" lIns="0" tIns="0" rIns="0" bIns="0" rtlCol="0">
+              <a:spAutoFit/>
+            </a:bodyPr>
+            <a:lstStyle/>
+            <a:p>
+              <a:pPr defTabSz="1088449" fontAlgn="base">
+                <a:spcBef>
+                  <a:spcPct val="50000"/>
+                </a:spcBef>
+                <a:spcAft>
+                  <a:spcPct val="0"/>
+                </a:spcAft>
+                <a:buClr>
+                  <a:srgbClr val="F0AB00"/>
+                </a:buClr>
+                <a:buSzPct val="80000"/>
+              </a:pPr>
+              <a:r>
+                <a:rPr lang="de-DE" sz="1400" kern="0" dirty="0">
+                  <a:ea typeface="Arial Unicode MS" pitchFamily="34" charset="-128"/>
+                  <a:cs typeface="Arial Unicode MS" pitchFamily="34" charset="-128"/>
+                </a:rPr>
+                <a:t>Low </a:t>
+              </a:r>
+              <a:br>
+                <a:rPr lang="de-DE" sz="1400" kern="0" dirty="0">
+                  <a:ea typeface="Arial Unicode MS" pitchFamily="34" charset="-128"/>
+                  <a:cs typeface="Arial Unicode MS" pitchFamily="34" charset="-128"/>
+                </a:rPr>
+              </a:br>
+              <a:r>
+                <a:rPr lang="de-DE" sz="1400" kern="0" dirty="0">
+                  <a:ea typeface="Arial Unicode MS" pitchFamily="34" charset="-128"/>
+                  <a:cs typeface="Arial Unicode MS" pitchFamily="34" charset="-128"/>
+                </a:rPr>
+                <a:t>(bring </a:t>
+              </a:r>
+              <a:r>
+                <a:rPr lang="de-DE" sz="1400" kern="0" dirty="0" err="1">
+                  <a:ea typeface="Arial Unicode MS" pitchFamily="34" charset="-128"/>
+                  <a:cs typeface="Arial Unicode MS" pitchFamily="34" charset="-128"/>
+                </a:rPr>
+                <a:t>your</a:t>
+              </a:r>
+              <a:r>
+                <a:rPr lang="de-DE" sz="1400" kern="0" dirty="0">
+                  <a:ea typeface="Arial Unicode MS" pitchFamily="34" charset="-128"/>
+                  <a:cs typeface="Arial Unicode MS" pitchFamily="34" charset="-128"/>
+                </a:rPr>
+                <a:t> </a:t>
+              </a:r>
+              <a:r>
+                <a:rPr lang="de-DE" sz="1400" kern="0" dirty="0" err="1">
+                  <a:ea typeface="Arial Unicode MS" pitchFamily="34" charset="-128"/>
+                  <a:cs typeface="Arial Unicode MS" pitchFamily="34" charset="-128"/>
+                </a:rPr>
+                <a:t>own</a:t>
+              </a:r>
+              <a:r>
+                <a:rPr lang="de-DE" sz="1400" kern="0" dirty="0">
+                  <a:ea typeface="Arial Unicode MS" pitchFamily="34" charset="-128"/>
+                  <a:cs typeface="Arial Unicode MS" pitchFamily="34" charset="-128"/>
+                </a:rPr>
+                <a:t> …)</a:t>
+              </a:r>
+              <a:endParaRPr lang="en-US" sz="1400" kern="0" dirty="0" err="1">
+                <a:ea typeface="Arial Unicode MS" pitchFamily="34" charset="-128"/>
+                <a:cs typeface="Arial Unicode MS" pitchFamily="34" charset="-128"/>
+              </a:endParaRPr>
+            </a:p>
+          </p:txBody>
+        </p:sp>
+        <p:sp>
+          <p:nvSpPr>
+            <p:cNvPr id="14" name="TextBox 13"/>
+            <p:cNvSpPr txBox="1"/>
+            <p:nvPr/>
+          </p:nvSpPr>
+          <p:spPr>
+            <a:xfrm rot="16200000">
+              <a:off x="417633" y="2973175"/>
+              <a:ext cx="1620502" cy="430775"/>
+            </a:xfrm>
+            <a:prstGeom prst="rect">
+              <a:avLst/>
+            </a:prstGeom>
+            <a:noFill/>
+          </p:spPr>
+          <p:txBody>
+            <a:bodyPr wrap="square" lIns="0" tIns="0" rIns="0" bIns="0" rtlCol="0">
+              <a:spAutoFit/>
+            </a:bodyPr>
+            <a:lstStyle/>
+            <a:p>
+              <a:pPr defTabSz="1088449" fontAlgn="base">
+                <a:spcBef>
+                  <a:spcPct val="50000"/>
+                </a:spcBef>
+                <a:spcAft>
+                  <a:spcPct val="0"/>
+                </a:spcAft>
+                <a:buClr>
+                  <a:srgbClr val="F0AB00"/>
+                </a:buClr>
+                <a:buSzPct val="80000"/>
+              </a:pPr>
+              <a:r>
+                <a:rPr lang="de-DE" sz="1400" kern="0" dirty="0">
+                  <a:ea typeface="Arial Unicode MS" pitchFamily="34" charset="-128"/>
+                  <a:cs typeface="Arial Unicode MS" pitchFamily="34" charset="-128"/>
+                </a:rPr>
+                <a:t>High </a:t>
+              </a:r>
+              <a:br>
+                <a:rPr lang="de-DE" sz="1400" kern="0" dirty="0">
+                  <a:ea typeface="Arial Unicode MS" pitchFamily="34" charset="-128"/>
+                  <a:cs typeface="Arial Unicode MS" pitchFamily="34" charset="-128"/>
+                </a:rPr>
+              </a:br>
+              <a:r>
+                <a:rPr lang="de-DE" sz="1400" kern="0" dirty="0">
+                  <a:ea typeface="Arial Unicode MS" pitchFamily="34" charset="-128"/>
+                  <a:cs typeface="Arial Unicode MS" pitchFamily="34" charset="-128"/>
+                </a:rPr>
+                <a:t>(</a:t>
+              </a:r>
+              <a:r>
+                <a:rPr lang="de-DE" sz="1400" kern="0" dirty="0" err="1">
+                  <a:ea typeface="Arial Unicode MS" pitchFamily="34" charset="-128"/>
+                  <a:cs typeface="Arial Unicode MS" pitchFamily="34" charset="-128"/>
+                </a:rPr>
+                <a:t>leverage</a:t>
+              </a:r>
+              <a:r>
+                <a:rPr lang="de-DE" sz="1400" kern="0" dirty="0">
+                  <a:ea typeface="Arial Unicode MS" pitchFamily="34" charset="-128"/>
+                  <a:cs typeface="Arial Unicode MS" pitchFamily="34" charset="-128"/>
+                </a:rPr>
+                <a:t> </a:t>
+              </a:r>
+              <a:r>
+                <a:rPr lang="de-DE" sz="1400" kern="0" dirty="0" err="1">
+                  <a:ea typeface="Arial Unicode MS" pitchFamily="34" charset="-128"/>
+                  <a:cs typeface="Arial Unicode MS" pitchFamily="34" charset="-128"/>
+                </a:rPr>
+                <a:t>platform</a:t>
+              </a:r>
+              <a:r>
+                <a:rPr lang="de-DE" sz="1400" kern="0" dirty="0">
+                  <a:ea typeface="Arial Unicode MS" pitchFamily="34" charset="-128"/>
+                  <a:cs typeface="Arial Unicode MS" pitchFamily="34" charset="-128"/>
+                </a:rPr>
+                <a:t>)</a:t>
+              </a:r>
+              <a:endParaRPr lang="en-US" sz="1400" kern="0" dirty="0" err="1">
+                <a:ea typeface="Arial Unicode MS" pitchFamily="34" charset="-128"/>
+                <a:cs typeface="Arial Unicode MS" pitchFamily="34" charset="-128"/>
+              </a:endParaRPr>
+            </a:p>
+          </p:txBody>
+        </p:sp>
+        <p:sp>
+          <p:nvSpPr>
+            <p:cNvPr id="18" name="Oval 17"/>
+            <p:cNvSpPr/>
+            <p:nvPr/>
+          </p:nvSpPr>
+          <p:spPr bwMode="gray">
+            <a:xfrm>
+              <a:off x="480907" y="6238266"/>
+              <a:ext cx="275974" cy="290447"/>
+            </a:xfrm>
+            <a:prstGeom prst="ellipse">
+              <a:avLst/>
+            </a:prstGeom>
+            <a:solidFill>
+              <a:schemeClr val="bg1"/>
+            </a:solidFill>
+            <a:ln w="12700" algn="ctr">
+              <a:solidFill>
+                <a:schemeClr val="tx1"/>
+              </a:solidFill>
+              <a:miter lim="800000"/>
+              <a:headEnd/>
+              <a:tailEnd/>
+            </a:ln>
+          </p:spPr>
+          <p:txBody>
+            <a:bodyPr lIns="89977" tIns="71981" rIns="89977" bIns="71981" rtlCol="0" anchor="ctr"/>
+            <a:lstStyle/>
+            <a:p>
+              <a:pPr algn="ctr" defTabSz="914126" fontAlgn="base">
+                <a:spcBef>
+                  <a:spcPct val="50000"/>
+                </a:spcBef>
+                <a:spcAft>
+                  <a:spcPct val="0"/>
+                </a:spcAft>
+                <a:buClr>
+                  <a:srgbClr val="F0AB00"/>
+                </a:buClr>
+                <a:buSzPct val="80000"/>
+              </a:pPr>
+              <a:endParaRPr lang="en-US" sz="1799" kern="0" dirty="0" err="1">
+                <a:ea typeface="Arial Unicode MS" pitchFamily="34" charset="-128"/>
+                <a:cs typeface="Arial Unicode MS" pitchFamily="34" charset="-128"/>
+              </a:endParaRPr>
+            </a:p>
+          </p:txBody>
+        </p:sp>
+        <p:sp>
+          <p:nvSpPr>
+            <p:cNvPr id="20" name="TextBox 19"/>
+            <p:cNvSpPr txBox="1"/>
+            <p:nvPr/>
+          </p:nvSpPr>
+          <p:spPr>
+            <a:xfrm>
+              <a:off x="840267" y="6300851"/>
+              <a:ext cx="3305084" cy="184618"/>
+            </a:xfrm>
+            <a:prstGeom prst="rect">
+              <a:avLst/>
+            </a:prstGeom>
+            <a:noFill/>
+          </p:spPr>
+          <p:txBody>
+            <a:bodyPr wrap="square" lIns="0" tIns="0" rIns="0" bIns="0" rtlCol="0">
+              <a:spAutoFit/>
+            </a:bodyPr>
+            <a:lstStyle/>
+            <a:p>
+              <a:pPr defTabSz="1088449" fontAlgn="base">
+                <a:spcBef>
+                  <a:spcPct val="50000"/>
+                </a:spcBef>
+                <a:spcAft>
+                  <a:spcPct val="0"/>
+                </a:spcAft>
+                <a:buClr>
+                  <a:srgbClr val="F0AB00"/>
+                </a:buClr>
+                <a:buSzPct val="80000"/>
+              </a:pPr>
+              <a:r>
+                <a:rPr lang="de-DE" sz="1200" i="1" kern="0" dirty="0">
+                  <a:ea typeface="Arial Unicode MS" pitchFamily="34" charset="-128"/>
+                  <a:cs typeface="Arial Unicode MS" pitchFamily="34" charset="-128"/>
+                </a:rPr>
+                <a:t>Size = </a:t>
+              </a:r>
+              <a:r>
+                <a:rPr lang="de-DE" sz="1200" i="1" kern="0" dirty="0" err="1">
+                  <a:ea typeface="Arial Unicode MS" pitchFamily="34" charset="-128"/>
+                  <a:cs typeface="Arial Unicode MS" pitchFamily="34" charset="-128"/>
+                </a:rPr>
+                <a:t>Resource</a:t>
+              </a:r>
+              <a:r>
+                <a:rPr lang="de-DE" sz="1200" i="1" kern="0" dirty="0">
+                  <a:ea typeface="Arial Unicode MS" pitchFamily="34" charset="-128"/>
+                  <a:cs typeface="Arial Unicode MS" pitchFamily="34" charset="-128"/>
+                </a:rPr>
+                <a:t> </a:t>
+              </a:r>
+              <a:r>
+                <a:rPr lang="de-DE" sz="1200" i="1" kern="0" dirty="0" err="1">
+                  <a:ea typeface="Arial Unicode MS" pitchFamily="34" charset="-128"/>
+                  <a:cs typeface="Arial Unicode MS" pitchFamily="34" charset="-128"/>
+                </a:rPr>
+                <a:t>consumption</a:t>
+              </a:r>
+              <a:r>
+                <a:rPr lang="de-DE" sz="1200" i="1" kern="0" dirty="0">
+                  <a:ea typeface="Arial Unicode MS" pitchFamily="34" charset="-128"/>
+                  <a:cs typeface="Arial Unicode MS" pitchFamily="34" charset="-128"/>
+                </a:rPr>
+                <a:t> per </a:t>
+              </a:r>
+              <a:r>
+                <a:rPr lang="de-DE" sz="1200" i="1" kern="0" dirty="0" err="1">
+                  <a:ea typeface="Arial Unicode MS" pitchFamily="34" charset="-128"/>
+                  <a:cs typeface="Arial Unicode MS" pitchFamily="34" charset="-128"/>
+                </a:rPr>
+                <a:t>microservice</a:t>
+              </a:r>
+              <a:endParaRPr lang="en-US" sz="1200" i="1" kern="0" dirty="0" err="1">
+                <a:ea typeface="Arial Unicode MS" pitchFamily="34" charset="-128"/>
+                <a:cs typeface="Arial Unicode MS" pitchFamily="34" charset="-128"/>
+              </a:endParaRPr>
+            </a:p>
+          </p:txBody>
+        </p:sp>
+      </p:grpSp>
+      <p:grpSp>
+        <p:nvGrpSpPr>
+          <p:cNvPr id="6" name="Group 5"/>
+          <p:cNvGrpSpPr/>
+          <p:nvPr/>
+        </p:nvGrpSpPr>
+        <p:grpSpPr>
+          <a:xfrm>
+            <a:off x="3166918" y="1735341"/>
+            <a:ext cx="1714853" cy="801932"/>
+            <a:chOff x="3225620" y="2438726"/>
+            <a:chExt cx="1714853" cy="801932"/>
+          </a:xfrm>
+        </p:grpSpPr>
+        <p:sp>
+          <p:nvSpPr>
+            <p:cNvPr id="30" name="Oval 29"/>
+            <p:cNvSpPr/>
+            <p:nvPr/>
+          </p:nvSpPr>
+          <p:spPr bwMode="gray">
+            <a:xfrm>
+              <a:off x="4427038" y="2556218"/>
+              <a:ext cx="513435" cy="531924"/>
+            </a:xfrm>
+            <a:prstGeom prst="ellipse">
+              <a:avLst/>
+            </a:prstGeom>
+            <a:solidFill>
+              <a:schemeClr val="accent1">
+                <a:lumMod val="40000"/>
+                <a:lumOff val="60000"/>
+              </a:schemeClr>
+            </a:solidFill>
+            <a:ln w="6350" algn="ctr">
+              <a:solidFill>
+                <a:schemeClr val="accent1"/>
+              </a:solidFill>
+              <a:miter lim="800000"/>
+              <a:headEnd/>
+              <a:tailEnd/>
+            </a:ln>
+          </p:spPr>
+          <p:txBody>
+            <a:bodyPr lIns="89977" tIns="71981" rIns="89977" bIns="71981" rtlCol="0" anchor="ctr"/>
+            <a:lstStyle/>
+            <a:p>
+              <a:pPr algn="ctr" defTabSz="914126" fontAlgn="base">
+                <a:spcBef>
+                  <a:spcPct val="50000"/>
+                </a:spcBef>
+                <a:spcAft>
+                  <a:spcPct val="0"/>
+                </a:spcAft>
+                <a:buClr>
+                  <a:srgbClr val="F0AB00"/>
+                </a:buClr>
+                <a:buSzPct val="80000"/>
+              </a:pPr>
+              <a:endParaRPr lang="en-US" sz="1799" kern="0" dirty="0" err="1">
+                <a:solidFill>
+                  <a:srgbClr val="000000"/>
+                </a:solidFill>
+                <a:ea typeface="Arial Unicode MS" pitchFamily="34" charset="-128"/>
+                <a:cs typeface="Arial Unicode MS" pitchFamily="34" charset="-128"/>
+              </a:endParaRPr>
+            </a:p>
+          </p:txBody>
+        </p:sp>
+        <p:sp>
+          <p:nvSpPr>
+            <p:cNvPr id="29" name="Oval 28"/>
+            <p:cNvSpPr/>
+            <p:nvPr/>
+          </p:nvSpPr>
+          <p:spPr bwMode="gray">
+            <a:xfrm>
+              <a:off x="4357388" y="2620950"/>
+              <a:ext cx="513435" cy="531924"/>
+            </a:xfrm>
+            <a:prstGeom prst="ellipse">
+              <a:avLst/>
+            </a:prstGeom>
+            <a:solidFill>
+              <a:schemeClr val="accent1">
+                <a:lumMod val="40000"/>
+                <a:lumOff val="60000"/>
+              </a:schemeClr>
+            </a:solidFill>
+            <a:ln w="6350" algn="ctr">
+              <a:solidFill>
+                <a:schemeClr val="accent1"/>
+              </a:solidFill>
+              <a:miter lim="800000"/>
+              <a:headEnd/>
+              <a:tailEnd/>
+            </a:ln>
+          </p:spPr>
+          <p:txBody>
+            <a:bodyPr lIns="89977" tIns="71981" rIns="89977" bIns="71981" rtlCol="0" anchor="ctr"/>
+            <a:lstStyle/>
+            <a:p>
+              <a:pPr algn="ctr" defTabSz="914126" fontAlgn="base">
+                <a:spcBef>
+                  <a:spcPct val="50000"/>
+                </a:spcBef>
+                <a:spcAft>
+                  <a:spcPct val="0"/>
+                </a:spcAft>
+                <a:buClr>
+                  <a:srgbClr val="F0AB00"/>
+                </a:buClr>
+                <a:buSzPct val="80000"/>
+              </a:pPr>
+              <a:endParaRPr lang="en-US" sz="1799" kern="0" dirty="0" err="1">
+                <a:solidFill>
+                  <a:srgbClr val="000000"/>
+                </a:solidFill>
+                <a:ea typeface="Arial Unicode MS" pitchFamily="34" charset="-128"/>
+                <a:cs typeface="Arial Unicode MS" pitchFamily="34" charset="-128"/>
+              </a:endParaRPr>
+            </a:p>
+          </p:txBody>
+        </p:sp>
+        <p:sp>
+          <p:nvSpPr>
+            <p:cNvPr id="17" name="Oval 16"/>
+            <p:cNvSpPr/>
+            <p:nvPr/>
+          </p:nvSpPr>
+          <p:spPr bwMode="gray">
+            <a:xfrm>
+              <a:off x="4260300" y="2708734"/>
+              <a:ext cx="513435" cy="531924"/>
+            </a:xfrm>
+            <a:prstGeom prst="ellipse">
+              <a:avLst/>
+            </a:prstGeom>
+            <a:solidFill>
+              <a:schemeClr val="accent1">
+                <a:lumMod val="60000"/>
+                <a:lumOff val="40000"/>
+              </a:schemeClr>
+            </a:solidFill>
+            <a:ln w="6350" algn="ctr">
+              <a:noFill/>
+              <a:miter lim="800000"/>
+              <a:headEnd/>
+              <a:tailEnd/>
+            </a:ln>
+          </p:spPr>
+          <p:txBody>
+            <a:bodyPr lIns="89977" tIns="71981" rIns="89977" bIns="71981" rtlCol="0" anchor="ctr"/>
+            <a:lstStyle/>
+            <a:p>
+              <a:pPr algn="ctr" defTabSz="914126" fontAlgn="base">
+                <a:spcBef>
+                  <a:spcPct val="50000"/>
+                </a:spcBef>
+                <a:spcAft>
+                  <a:spcPct val="0"/>
+                </a:spcAft>
+                <a:buClr>
+                  <a:srgbClr val="F0AB00"/>
+                </a:buClr>
+                <a:buSzPct val="80000"/>
+              </a:pPr>
+              <a:endParaRPr lang="en-US" sz="1799" kern="0" dirty="0" err="1">
+                <a:solidFill>
+                  <a:srgbClr val="000000"/>
+                </a:solidFill>
+                <a:ea typeface="Arial Unicode MS" pitchFamily="34" charset="-128"/>
+                <a:cs typeface="Arial Unicode MS" pitchFamily="34" charset="-128"/>
+              </a:endParaRPr>
+            </a:p>
+          </p:txBody>
+        </p:sp>
+        <p:sp>
+          <p:nvSpPr>
+            <p:cNvPr id="22" name="TextBox 21"/>
+            <p:cNvSpPr txBox="1"/>
+            <p:nvPr/>
+          </p:nvSpPr>
+          <p:spPr>
+            <a:xfrm>
+              <a:off x="3225620" y="2438726"/>
+              <a:ext cx="1134079" cy="430775"/>
+            </a:xfrm>
+            <a:prstGeom prst="rect">
+              <a:avLst/>
+            </a:prstGeom>
+            <a:noFill/>
+          </p:spPr>
+          <p:txBody>
+            <a:bodyPr wrap="square" lIns="0" tIns="0" rIns="0" bIns="0" rtlCol="0">
+              <a:spAutoFit/>
+            </a:bodyPr>
+            <a:lstStyle/>
+            <a:p>
+              <a:pPr defTabSz="1088449" fontAlgn="base">
+                <a:spcBef>
+                  <a:spcPct val="50000"/>
+                </a:spcBef>
+                <a:spcAft>
+                  <a:spcPct val="0"/>
+                </a:spcAft>
+                <a:buClr>
+                  <a:srgbClr val="F0AB00"/>
+                </a:buClr>
+                <a:buSzPct val="80000"/>
+              </a:pPr>
+              <a:r>
+                <a:rPr lang="de-DE" sz="1400" kern="0" dirty="0">
+                  <a:ea typeface="Arial Unicode MS" pitchFamily="34" charset="-128"/>
+                  <a:cs typeface="Arial Unicode MS" pitchFamily="34" charset="-128"/>
+                </a:rPr>
+                <a:t>Business </a:t>
+              </a:r>
+              <a:r>
+                <a:rPr lang="de-DE" sz="1400" kern="0" dirty="0" err="1">
+                  <a:ea typeface="Arial Unicode MS" pitchFamily="34" charset="-128"/>
+                  <a:cs typeface="Arial Unicode MS" pitchFamily="34" charset="-128"/>
+                </a:rPr>
+                <a:t>Applications</a:t>
+              </a:r>
+              <a:endParaRPr lang="en-US" sz="1400" kern="0" dirty="0" err="1">
+                <a:ea typeface="Arial Unicode MS" pitchFamily="34" charset="-128"/>
+                <a:cs typeface="Arial Unicode MS" pitchFamily="34" charset="-128"/>
+              </a:endParaRPr>
+            </a:p>
+          </p:txBody>
+        </p:sp>
+      </p:grpSp>
+      <p:grpSp>
+        <p:nvGrpSpPr>
+          <p:cNvPr id="16" name="Group 15"/>
+          <p:cNvGrpSpPr/>
+          <p:nvPr/>
+        </p:nvGrpSpPr>
+        <p:grpSpPr>
+          <a:xfrm>
+            <a:off x="1713722" y="3295429"/>
+            <a:ext cx="1438800" cy="1363324"/>
+            <a:chOff x="1772425" y="3998814"/>
+            <a:chExt cx="1438800" cy="1363324"/>
+          </a:xfrm>
+        </p:grpSpPr>
+        <p:sp>
+          <p:nvSpPr>
+            <p:cNvPr id="15" name="Oval 14"/>
+            <p:cNvSpPr/>
+            <p:nvPr/>
+          </p:nvSpPr>
+          <p:spPr bwMode="gray">
+            <a:xfrm>
+              <a:off x="1772425" y="3998814"/>
+              <a:ext cx="1438800" cy="1363324"/>
+            </a:xfrm>
+            <a:prstGeom prst="ellipse">
+              <a:avLst/>
+            </a:prstGeom>
+            <a:solidFill>
+              <a:schemeClr val="accent3">
+                <a:lumMod val="20000"/>
+                <a:lumOff val="80000"/>
+              </a:schemeClr>
+            </a:solidFill>
+            <a:ln w="6350" algn="ctr">
+              <a:solidFill>
+                <a:schemeClr val="accent3">
+                  <a:lumMod val="40000"/>
+                  <a:lumOff val="60000"/>
+                </a:schemeClr>
+              </a:solidFill>
+              <a:miter lim="800000"/>
+              <a:headEnd/>
+              <a:tailEnd/>
+            </a:ln>
+          </p:spPr>
+          <p:txBody>
+            <a:bodyPr lIns="89977" tIns="71981" rIns="89977" bIns="71981" rtlCol="0" anchor="ctr"/>
+            <a:lstStyle/>
+            <a:p>
+              <a:pPr algn="ctr" defTabSz="914126" fontAlgn="base">
+                <a:spcBef>
+                  <a:spcPct val="50000"/>
+                </a:spcBef>
+                <a:spcAft>
+                  <a:spcPct val="0"/>
+                </a:spcAft>
+                <a:buClr>
+                  <a:srgbClr val="F0AB00"/>
+                </a:buClr>
+                <a:buSzPct val="80000"/>
+              </a:pPr>
+              <a:endParaRPr lang="en-US" sz="1799" kern="0" dirty="0" err="1">
+                <a:solidFill>
+                  <a:srgbClr val="000000"/>
+                </a:solidFill>
+                <a:ea typeface="Arial Unicode MS" pitchFamily="34" charset="-128"/>
+                <a:cs typeface="Arial Unicode MS" pitchFamily="34" charset="-128"/>
+              </a:endParaRPr>
+            </a:p>
+          </p:txBody>
+        </p:sp>
+        <p:sp>
+          <p:nvSpPr>
+            <p:cNvPr id="25" name="TextBox 24"/>
+            <p:cNvSpPr txBox="1"/>
+            <p:nvPr/>
+          </p:nvSpPr>
+          <p:spPr>
+            <a:xfrm>
+              <a:off x="2014314" y="4421249"/>
+              <a:ext cx="1056595" cy="430775"/>
+            </a:xfrm>
+            <a:prstGeom prst="rect">
+              <a:avLst/>
+            </a:prstGeom>
+            <a:noFill/>
+          </p:spPr>
+          <p:txBody>
+            <a:bodyPr wrap="square" lIns="0" tIns="0" rIns="0" bIns="0" rtlCol="0">
+              <a:spAutoFit/>
+            </a:bodyPr>
+            <a:lstStyle/>
+            <a:p>
+              <a:pPr defTabSz="1088449" fontAlgn="base">
+                <a:spcBef>
+                  <a:spcPct val="50000"/>
+                </a:spcBef>
+                <a:spcAft>
+                  <a:spcPct val="0"/>
+                </a:spcAft>
+                <a:buClr>
+                  <a:srgbClr val="F0AB00"/>
+                </a:buClr>
+                <a:buSzPct val="80000"/>
+              </a:pPr>
+              <a:r>
+                <a:rPr lang="de-DE" sz="1400" kern="0" dirty="0">
+                  <a:solidFill>
+                    <a:srgbClr val="000000"/>
+                  </a:solidFill>
+                  <a:ea typeface="Arial Unicode MS" pitchFamily="34" charset="-128"/>
+                  <a:cs typeface="Arial Unicode MS" pitchFamily="34" charset="-128"/>
+                </a:rPr>
+                <a:t>Business </a:t>
+              </a:r>
+              <a:r>
+                <a:rPr lang="de-DE" sz="1400" kern="0" dirty="0" err="1">
+                  <a:solidFill>
+                    <a:srgbClr val="000000"/>
+                  </a:solidFill>
+                  <a:ea typeface="Arial Unicode MS" pitchFamily="34" charset="-128"/>
+                  <a:cs typeface="Arial Unicode MS" pitchFamily="34" charset="-128"/>
+                </a:rPr>
+                <a:t>Applications</a:t>
+              </a:r>
+              <a:endParaRPr lang="en-US" sz="1400" kern="0" dirty="0" err="1">
+                <a:solidFill>
+                  <a:srgbClr val="000000"/>
+                </a:solidFill>
+                <a:ea typeface="Arial Unicode MS" pitchFamily="34" charset="-128"/>
+                <a:cs typeface="Arial Unicode MS" pitchFamily="34" charset="-128"/>
+              </a:endParaRPr>
+            </a:p>
+          </p:txBody>
+        </p:sp>
+      </p:grpSp>
+      <p:grpSp>
+        <p:nvGrpSpPr>
+          <p:cNvPr id="8" name="Group 7"/>
+          <p:cNvGrpSpPr/>
+          <p:nvPr/>
+        </p:nvGrpSpPr>
+        <p:grpSpPr>
+          <a:xfrm>
+            <a:off x="4007403" y="3603207"/>
+            <a:ext cx="977322" cy="924389"/>
+            <a:chOff x="4066106" y="4306591"/>
+            <a:chExt cx="977322" cy="924389"/>
+          </a:xfrm>
+        </p:grpSpPr>
+        <p:sp>
+          <p:nvSpPr>
+            <p:cNvPr id="26" name="Oval 25"/>
+            <p:cNvSpPr/>
+            <p:nvPr/>
+          </p:nvSpPr>
+          <p:spPr bwMode="gray">
+            <a:xfrm>
+              <a:off x="4066106" y="4306591"/>
+              <a:ext cx="901821" cy="924389"/>
+            </a:xfrm>
+            <a:prstGeom prst="ellipse">
+              <a:avLst/>
+            </a:prstGeom>
+            <a:solidFill>
+              <a:schemeClr val="accent3">
+                <a:lumMod val="20000"/>
+                <a:lumOff val="80000"/>
+              </a:schemeClr>
+            </a:solidFill>
+            <a:ln w="6350" algn="ctr">
+              <a:solidFill>
+                <a:schemeClr val="accent3">
+                  <a:lumMod val="40000"/>
+                  <a:lumOff val="60000"/>
+                </a:schemeClr>
+              </a:solidFill>
+              <a:miter lim="800000"/>
+              <a:headEnd/>
+              <a:tailEnd/>
+            </a:ln>
+          </p:spPr>
+          <p:txBody>
+            <a:bodyPr lIns="89977" tIns="71981" rIns="89977" bIns="71981" rtlCol="0" anchor="ctr"/>
+            <a:lstStyle/>
+            <a:p>
+              <a:pPr algn="ctr" defTabSz="914126" fontAlgn="base">
+                <a:spcBef>
+                  <a:spcPct val="50000"/>
+                </a:spcBef>
+                <a:spcAft>
+                  <a:spcPct val="0"/>
+                </a:spcAft>
+                <a:buClr>
+                  <a:srgbClr val="F0AB00"/>
+                </a:buClr>
+                <a:buSzPct val="80000"/>
+              </a:pPr>
+              <a:endParaRPr lang="en-US" sz="1799" kern="0" dirty="0" err="1">
+                <a:solidFill>
+                  <a:srgbClr val="000000"/>
+                </a:solidFill>
+                <a:ea typeface="Arial Unicode MS" pitchFamily="34" charset="-128"/>
+                <a:cs typeface="Arial Unicode MS" pitchFamily="34" charset="-128"/>
+              </a:endParaRPr>
+            </a:p>
+          </p:txBody>
+        </p:sp>
+        <p:sp>
+          <p:nvSpPr>
+            <p:cNvPr id="27" name="TextBox 26"/>
+            <p:cNvSpPr txBox="1"/>
+            <p:nvPr/>
+          </p:nvSpPr>
+          <p:spPr>
+            <a:xfrm>
+              <a:off x="4210226" y="4537443"/>
+              <a:ext cx="833202" cy="430775"/>
+            </a:xfrm>
+            <a:prstGeom prst="rect">
+              <a:avLst/>
+            </a:prstGeom>
+            <a:noFill/>
+          </p:spPr>
+          <p:txBody>
+            <a:bodyPr wrap="square" lIns="0" tIns="0" rIns="0" bIns="0" rtlCol="0">
+              <a:spAutoFit/>
+            </a:bodyPr>
+            <a:lstStyle/>
+            <a:p>
+              <a:pPr defTabSz="1088449" fontAlgn="base">
+                <a:spcBef>
+                  <a:spcPct val="50000"/>
+                </a:spcBef>
+                <a:spcAft>
+                  <a:spcPct val="0"/>
+                </a:spcAft>
+                <a:buClr>
+                  <a:srgbClr val="F0AB00"/>
+                </a:buClr>
+                <a:buSzPct val="80000"/>
+              </a:pPr>
+              <a:r>
+                <a:rPr lang="de-DE" sz="1400" kern="0" dirty="0" err="1">
+                  <a:solidFill>
+                    <a:srgbClr val="000000"/>
+                  </a:solidFill>
+                  <a:ea typeface="Arial Unicode MS" pitchFamily="34" charset="-128"/>
+                  <a:cs typeface="Arial Unicode MS" pitchFamily="34" charset="-128"/>
+                </a:rPr>
+                <a:t>Backing</a:t>
+              </a:r>
+              <a:r>
+                <a:rPr lang="de-DE" sz="1400" kern="0" dirty="0">
+                  <a:solidFill>
+                    <a:srgbClr val="000000"/>
+                  </a:solidFill>
+                  <a:ea typeface="Arial Unicode MS" pitchFamily="34" charset="-128"/>
+                  <a:cs typeface="Arial Unicode MS" pitchFamily="34" charset="-128"/>
+                </a:rPr>
+                <a:t> </a:t>
+              </a:r>
+              <a:r>
+                <a:rPr lang="de-DE" sz="1400" kern="0" dirty="0" err="1">
+                  <a:solidFill>
+                    <a:srgbClr val="000000"/>
+                  </a:solidFill>
+                  <a:ea typeface="Arial Unicode MS" pitchFamily="34" charset="-128"/>
+                  <a:cs typeface="Arial Unicode MS" pitchFamily="34" charset="-128"/>
+                </a:rPr>
+                <a:t>services</a:t>
+              </a:r>
+              <a:endParaRPr lang="en-US" sz="1400" kern="0" dirty="0" err="1">
+                <a:solidFill>
+                  <a:srgbClr val="000000"/>
+                </a:solidFill>
+                <a:ea typeface="Arial Unicode MS" pitchFamily="34" charset="-128"/>
+                <a:cs typeface="Arial Unicode MS" pitchFamily="34" charset="-128"/>
+              </a:endParaRPr>
+            </a:p>
+          </p:txBody>
+        </p:sp>
+      </p:grpSp>
+      <p:sp>
+        <p:nvSpPr>
+          <p:cNvPr id="28" name="Rectangle 27"/>
+          <p:cNvSpPr/>
+          <p:nvPr/>
+        </p:nvSpPr>
+        <p:spPr>
+          <a:xfrm>
+            <a:off x="5520151" y="1597709"/>
+            <a:ext cx="6302757" cy="4242187"/>
+          </a:xfrm>
+          <a:prstGeom prst="rect">
+            <a:avLst/>
+          </a:prstGeom>
+        </p:spPr>
+        <p:txBody>
+          <a:bodyPr wrap="square">
+            <a:spAutoFit/>
+          </a:bodyPr>
+          <a:lstStyle/>
+          <a:p>
+            <a:pPr marL="0" lvl="1" defTabSz="1088231">
+              <a:lnSpc>
+                <a:spcPct val="107000"/>
+              </a:lnSpc>
+              <a:spcBef>
+                <a:spcPts val="600"/>
+              </a:spcBef>
+              <a:buClr>
+                <a:srgbClr val="F0AB00"/>
+              </a:buClr>
+              <a:buNone/>
+            </a:pPr>
+            <a:r>
+              <a:rPr lang="en-US" sz="1400" b="1" dirty="0">
+                <a:solidFill>
+                  <a:srgbClr val="000000"/>
+                </a:solidFill>
+              </a:rPr>
+              <a:t>Business Applications </a:t>
+            </a:r>
+          </a:p>
+          <a:p>
+            <a:pPr marL="179910" lvl="1" indent="-179910" defTabSz="1088231">
+              <a:lnSpc>
+                <a:spcPct val="107000"/>
+              </a:lnSpc>
+              <a:spcBef>
+                <a:spcPts val="600"/>
+              </a:spcBef>
+              <a:buClr>
+                <a:schemeClr val="accent1"/>
+              </a:buClr>
+              <a:buFont typeface="Wingdings" pitchFamily="2" charset="2"/>
+              <a:buChar char="§"/>
+            </a:pPr>
+            <a:r>
+              <a:rPr lang="en-US" sz="1400" dirty="0">
+                <a:latin typeface="Arial" panose="020B0604020202020204" pitchFamily="34" charset="0"/>
+                <a:cs typeface="Arial" panose="020B0604020202020204" pitchFamily="34" charset="0"/>
+              </a:rPr>
+              <a:t>High level of support and platform services available, limited resource consumption per microservice and low level of legacy code are assumed (e.g. Currency Conversion, Consent Management </a:t>
+            </a:r>
+            <a:r>
+              <a:rPr lang="en-US" sz="1400" dirty="0" err="1">
+                <a:latin typeface="Arial" panose="020B0604020202020204" pitchFamily="34" charset="0"/>
+                <a:cs typeface="Arial" panose="020B0604020202020204" pitchFamily="34" charset="0"/>
+              </a:rPr>
+              <a:t>etc</a:t>
+            </a:r>
+            <a:r>
+              <a:rPr lang="en-US" sz="1400" dirty="0">
+                <a:latin typeface="Arial" panose="020B0604020202020204" pitchFamily="34" charset="0"/>
+                <a:cs typeface="Arial" panose="020B0604020202020204" pitchFamily="34" charset="0"/>
+              </a:rPr>
+              <a:t>) </a:t>
+            </a:r>
+            <a:br>
+              <a:rPr lang="en-US" sz="1400" dirty="0">
+                <a:solidFill>
+                  <a:srgbClr val="000000"/>
+                </a:solidFill>
+              </a:rPr>
+            </a:br>
+            <a:r>
+              <a:rPr lang="en-US" sz="1400" dirty="0">
+                <a:sym typeface="Wingdings" panose="05000000000000000000" pitchFamily="2" charset="2"/>
+              </a:rPr>
+              <a:t></a:t>
+            </a:r>
+            <a:r>
+              <a:rPr lang="en-US" sz="1400" dirty="0">
+                <a:solidFill>
+                  <a:srgbClr val="000000"/>
+                </a:solidFill>
+              </a:rPr>
+              <a:t> </a:t>
+            </a:r>
+            <a:r>
+              <a:rPr lang="en-US" sz="1400" b="1" dirty="0">
+                <a:solidFill>
+                  <a:schemeClr val="accent1">
+                    <a:lumMod val="75000"/>
+                  </a:schemeClr>
+                </a:solidFill>
+              </a:rPr>
+              <a:t>Cloud Foundry recommended</a:t>
+            </a:r>
+          </a:p>
+          <a:p>
+            <a:pPr marL="179964" lvl="1" indent="-179964" defTabSz="1088558">
+              <a:lnSpc>
+                <a:spcPct val="107000"/>
+              </a:lnSpc>
+              <a:spcBef>
+                <a:spcPts val="600"/>
+              </a:spcBef>
+              <a:buClr>
+                <a:srgbClr val="0FAAFF"/>
+              </a:buClr>
+              <a:buFont typeface="Wingdings" pitchFamily="2" charset="2"/>
+              <a:buChar char="§"/>
+            </a:pPr>
+            <a:r>
+              <a:rPr lang="en-US" sz="1400" dirty="0">
+                <a:latin typeface="Arial" panose="020B0604020202020204" pitchFamily="34" charset="0"/>
+                <a:cs typeface="Arial" panose="020B0604020202020204" pitchFamily="34" charset="0"/>
+              </a:rPr>
+              <a:t>Consequences: adopt microservice architecture and 12 factor app</a:t>
+            </a:r>
+          </a:p>
+          <a:p>
+            <a:pPr defTabSz="1088231">
+              <a:lnSpc>
+                <a:spcPct val="107000"/>
+              </a:lnSpc>
+              <a:spcBef>
+                <a:spcPts val="600"/>
+              </a:spcBef>
+              <a:buClr>
+                <a:srgbClr val="F0AB00"/>
+              </a:buClr>
+            </a:pPr>
+            <a:br>
+              <a:rPr lang="en-US" sz="1400" b="1" dirty="0">
+                <a:solidFill>
+                  <a:srgbClr val="000000"/>
+                </a:solidFill>
+              </a:rPr>
+            </a:br>
+            <a:r>
+              <a:rPr lang="en-US" sz="1400" b="1" dirty="0">
+                <a:solidFill>
+                  <a:srgbClr val="000000"/>
+                </a:solidFill>
+              </a:rPr>
+              <a:t>New and existing Backing Service </a:t>
+            </a:r>
+          </a:p>
+          <a:p>
+            <a:pPr marL="179910" lvl="1" indent="-179910" defTabSz="1088231">
+              <a:lnSpc>
+                <a:spcPct val="107000"/>
+              </a:lnSpc>
+              <a:spcBef>
+                <a:spcPts val="600"/>
+              </a:spcBef>
+              <a:buClr>
+                <a:schemeClr val="accent1"/>
+              </a:buClr>
+              <a:buFont typeface="Wingdings" pitchFamily="2" charset="2"/>
+              <a:buChar char="§"/>
+            </a:pPr>
+            <a:r>
+              <a:rPr lang="en-US" sz="1400" dirty="0">
+                <a:latin typeface="Arial" panose="020B0604020202020204" pitchFamily="34" charset="0"/>
+                <a:cs typeface="Arial" panose="020B0604020202020204" pitchFamily="34" charset="0"/>
+              </a:rPr>
+              <a:t>Low level of platform service support assumed acceptable, direct infrastructure access needed (e.g. HANA, Data Hub, Machine Learning)</a:t>
+            </a:r>
+            <a:br>
+              <a:rPr lang="en-US" sz="1400" dirty="0"/>
+            </a:br>
+            <a:r>
+              <a:rPr lang="en-US" sz="1400" dirty="0">
+                <a:sym typeface="Wingdings" panose="05000000000000000000" pitchFamily="2" charset="2"/>
+              </a:rPr>
+              <a:t></a:t>
+            </a:r>
+            <a:r>
+              <a:rPr lang="en-US" sz="1400" dirty="0">
+                <a:solidFill>
+                  <a:srgbClr val="000000"/>
+                </a:solidFill>
+              </a:rPr>
+              <a:t> </a:t>
+            </a:r>
+            <a:r>
+              <a:rPr lang="en-US" sz="1400" b="1" dirty="0">
+                <a:solidFill>
+                  <a:schemeClr val="accent3"/>
+                </a:solidFill>
+              </a:rPr>
+              <a:t>K8s recommended</a:t>
+            </a:r>
+            <a:endParaRPr lang="en-US" sz="1400" dirty="0">
+              <a:solidFill>
+                <a:schemeClr val="accent3"/>
+              </a:solidFill>
+            </a:endParaRPr>
+          </a:p>
+          <a:p>
+            <a:pPr marL="0" lvl="1" defTabSz="1088231">
+              <a:lnSpc>
+                <a:spcPct val="107000"/>
+              </a:lnSpc>
+              <a:spcBef>
+                <a:spcPts val="600"/>
+              </a:spcBef>
+              <a:buClr>
+                <a:srgbClr val="F0AB00"/>
+              </a:buClr>
+              <a:buNone/>
+            </a:pPr>
+            <a:br>
+              <a:rPr lang="en-US" sz="1400" b="1" dirty="0">
+                <a:solidFill>
+                  <a:srgbClr val="000000"/>
+                </a:solidFill>
+              </a:rPr>
+            </a:br>
+            <a:r>
+              <a:rPr lang="en-US" sz="1400" b="1" dirty="0"/>
+              <a:t>Existing Business Application</a:t>
+            </a:r>
+          </a:p>
+          <a:p>
+            <a:pPr marL="285750" lvl="1" indent="-285750" defTabSz="1088231">
+              <a:lnSpc>
+                <a:spcPct val="107000"/>
+              </a:lnSpc>
+              <a:spcBef>
+                <a:spcPts val="600"/>
+              </a:spcBef>
+              <a:buClr>
+                <a:schemeClr val="accent1"/>
+              </a:buClr>
+              <a:buFont typeface="Wingdings" panose="05000000000000000000" pitchFamily="2" charset="2"/>
+              <a:buChar char="§"/>
+            </a:pPr>
+            <a:r>
+              <a:rPr lang="en-US" sz="1400" dirty="0"/>
+              <a:t>High level of existing code assumed, high requirements for resource consumption per (micro)service, </a:t>
+            </a:r>
+            <a:r>
+              <a:rPr lang="en-US" sz="1400" dirty="0" err="1"/>
+              <a:t>stateful</a:t>
+            </a:r>
+            <a:r>
+              <a:rPr lang="en-US" sz="1400" dirty="0"/>
+              <a:t> apps or service mesh capabilities </a:t>
+            </a:r>
+            <a:br>
+              <a:rPr lang="en-US" sz="1400" dirty="0">
+                <a:solidFill>
+                  <a:srgbClr val="000000"/>
+                </a:solidFill>
+              </a:rPr>
+            </a:br>
+            <a:r>
+              <a:rPr lang="en-US" sz="1400" dirty="0">
+                <a:sym typeface="Wingdings" panose="05000000000000000000" pitchFamily="2" charset="2"/>
+              </a:rPr>
+              <a:t></a:t>
+            </a:r>
+            <a:r>
+              <a:rPr lang="en-US" sz="1400" dirty="0">
+                <a:solidFill>
+                  <a:srgbClr val="000000"/>
+                </a:solidFill>
+              </a:rPr>
+              <a:t> </a:t>
+            </a:r>
+            <a:r>
+              <a:rPr lang="en-US" sz="1400" b="1" dirty="0">
+                <a:solidFill>
+                  <a:schemeClr val="accent3"/>
+                </a:solidFill>
+              </a:rPr>
+              <a:t>K8s recommended</a:t>
+            </a:r>
+          </a:p>
+        </p:txBody>
+      </p:sp>
+    </p:spTree>
+    <p:extLst>
+      <p:ext uri="{BB962C8B-B14F-4D97-AF65-F5344CB8AC3E}">
+        <p14:creationId xmlns:p14="http://schemas.microsoft.com/office/powerpoint/2010/main" val="460715042"/>
+      </p:ext>
+    </p:extLst>
+  </p:cSld>
+  <p:clrMapOvr>
+    <a:masterClrMapping/>
+  </p:clrMapOvr>
+</p:sld>
+</file>
+
+<file path=ppt/slides/slide22.xml><?xml version="1.0" encoding="utf-8"?>
 <p:sld xmlns:a="http://schemas.openxmlformats.org/drawingml/2006/main" xmlns:r="http://schemas.openxmlformats.org/officeDocument/2006/relationships" xmlns:p="http://schemas.openxmlformats.org/presentationml/2006/main" show="0">
   <p:cSld>
     <p:spTree>

</xml_diff>

<commit_message>
Adapted the RBAC demo.
</commit_message>
<xml_diff>
--- a/kubernetes/11_administration.pptx
+++ b/kubernetes/11_administration.pptx
@@ -2179,7 +2179,7 @@
         <p:spPr/>
         <p:txBody>
           <a:bodyPr>
-            <a:normAutofit fontScale="92500" lnSpcReduction="20000"/>
+            <a:normAutofit/>
           </a:bodyPr>
           <a:lstStyle/>
           <a:p>
@@ -3057,7 +3057,7 @@
         <p:spPr/>
         <p:txBody>
           <a:bodyPr>
-            <a:normAutofit/>
+            <a:normAutofit fontScale="92500" lnSpcReduction="20000"/>
           </a:bodyPr>
           <a:lstStyle/>
           <a:p>
@@ -3152,7 +3152,148 @@
             </a:pPr>
             <a:r>
               <a:rPr lang="en-US" dirty="0"/>
-              <a:t>Create a custom role and</a:t>
+              <a:t>Create a custom role:</a:t>
+            </a:r>
+          </a:p>
+          <a:p>
+            <a:pPr marL="465750" marR="0" lvl="1" indent="-285750" algn="l" defTabSz="1088776" rtl="0" eaLnBrk="1" fontAlgn="auto" latinLnBrk="0" hangingPunct="1">
+              <a:lnSpc>
+                <a:spcPct val="100000"/>
+              </a:lnSpc>
+              <a:spcBef>
+                <a:spcPts val="0"/>
+              </a:spcBef>
+              <a:spcAft>
+                <a:spcPts val="0"/>
+              </a:spcAft>
+              <a:buClr>
+                <a:schemeClr val="accent1"/>
+              </a:buClr>
+              <a:buSzPct val="100000"/>
+              <a:buFontTx/>
+              <a:buChar char="-"/>
+              <a:tabLst/>
+              <a:defRPr/>
+            </a:pPr>
+            <a:r>
+              <a:rPr lang="en-US" dirty="0"/>
+              <a:t>In the demo folder, have a look at 11a_rbac.yaml</a:t>
+            </a:r>
+          </a:p>
+          <a:p>
+            <a:pPr marL="645750" marR="0" lvl="2" indent="-285750" algn="l" defTabSz="1088776" rtl="0" eaLnBrk="1" fontAlgn="auto" latinLnBrk="0" hangingPunct="1">
+              <a:lnSpc>
+                <a:spcPct val="100000"/>
+              </a:lnSpc>
+              <a:spcBef>
+                <a:spcPts val="0"/>
+              </a:spcBef>
+              <a:spcAft>
+                <a:spcPts val="0"/>
+              </a:spcAft>
+              <a:buClr>
+                <a:schemeClr val="accent1"/>
+              </a:buClr>
+              <a:buSzPct val="100000"/>
+              <a:buFontTx/>
+              <a:buChar char="-"/>
+              <a:tabLst/>
+              <a:defRPr/>
+            </a:pPr>
+            <a:r>
+              <a:rPr lang="en-US" dirty="0"/>
+              <a:t>explain the access to the different API groups &amp; objects within</a:t>
+            </a:r>
+          </a:p>
+          <a:p>
+            <a:pPr marL="645750" marR="0" lvl="2" indent="-285750" algn="l" defTabSz="1088776" rtl="0" eaLnBrk="1" fontAlgn="auto" latinLnBrk="0" hangingPunct="1">
+              <a:lnSpc>
+                <a:spcPct val="100000"/>
+              </a:lnSpc>
+              <a:spcBef>
+                <a:spcPts val="0"/>
+              </a:spcBef>
+              <a:spcAft>
+                <a:spcPts val="0"/>
+              </a:spcAft>
+              <a:buClr>
+                <a:schemeClr val="accent1"/>
+              </a:buClr>
+              <a:buSzPct val="100000"/>
+              <a:buFontTx/>
+              <a:buChar char="-"/>
+              <a:tabLst/>
+              <a:defRPr/>
+            </a:pPr>
+            <a:r>
+              <a:rPr lang="en-US" dirty="0"/>
+              <a:t>The role "pod-master" gives you full access to pods, read access to </a:t>
+            </a:r>
+            <a:r>
+              <a:rPr lang="en-US" dirty="0" err="1"/>
+              <a:t>configmaps</a:t>
+            </a:r>
+            <a:r>
+              <a:rPr lang="en-US" dirty="0"/>
+              <a:t> and no access to anything else</a:t>
+            </a:r>
+          </a:p>
+          <a:p>
+            <a:pPr marL="645750" marR="0" lvl="2" indent="-285750" algn="l" defTabSz="1088776" rtl="0" eaLnBrk="1" fontAlgn="auto" latinLnBrk="0" hangingPunct="1">
+              <a:lnSpc>
+                <a:spcPct val="100000"/>
+              </a:lnSpc>
+              <a:spcBef>
+                <a:spcPts val="0"/>
+              </a:spcBef>
+              <a:spcAft>
+                <a:spcPts val="0"/>
+              </a:spcAft>
+              <a:buClr>
+                <a:schemeClr val="accent1"/>
+              </a:buClr>
+              <a:buSzPct val="100000"/>
+              <a:buFontTx/>
+              <a:buChar char="-"/>
+              <a:tabLst/>
+              <a:defRPr/>
+            </a:pPr>
+            <a:r>
+              <a:rPr lang="en-US" dirty="0"/>
+              <a:t>the YAML creates a service account "pod-master"</a:t>
+            </a:r>
+          </a:p>
+          <a:p>
+            <a:pPr marL="645750" marR="0" lvl="2" indent="-285750" algn="l" defTabSz="1088776" rtl="0" eaLnBrk="1" fontAlgn="auto" latinLnBrk="0" hangingPunct="1">
+              <a:lnSpc>
+                <a:spcPct val="100000"/>
+              </a:lnSpc>
+              <a:spcBef>
+                <a:spcPts val="0"/>
+              </a:spcBef>
+              <a:spcAft>
+                <a:spcPts val="0"/>
+              </a:spcAft>
+              <a:buClr>
+                <a:schemeClr val="accent1"/>
+              </a:buClr>
+              <a:buSzPct val="100000"/>
+              <a:buFontTx/>
+              <a:buChar char="-"/>
+              <a:tabLst/>
+              <a:defRPr/>
+            </a:pPr>
+            <a:r>
+              <a:rPr lang="en-US" dirty="0"/>
+              <a:t>The role gets bound to the service account by the </a:t>
+            </a:r>
+            <a:r>
+              <a:rPr lang="en-US" dirty="0" err="1"/>
+              <a:t>rolebinding</a:t>
+            </a:r>
+            <a:r>
+              <a:rPr lang="en-US" dirty="0"/>
+              <a:t> "pod-master"</a:t>
             </a:r>
           </a:p>
           <a:p>
@@ -3162,17 +3303,68 @@
             </a:pPr>
             <a:r>
               <a:rPr lang="en-US" dirty="0"/>
-              <a:t>explain the access to the different API groups &amp; objects within</a:t>
-            </a:r>
-          </a:p>
-          <a:p>
-            <a:pPr marL="465750" lvl="1" indent="-285750">
+              <a:t>In the demo folder, run the script 11b_rbac-demo-shell.sh</a:t>
+            </a:r>
+          </a:p>
+          <a:p>
+            <a:pPr marL="645750" lvl="2" indent="-285750">
               <a:buFontTx/>
               <a:buChar char="-"/>
             </a:pPr>
             <a:r>
               <a:rPr lang="en-US" dirty="0"/>
-              <a:t>explain the action that are allowed or prohibited</a:t>
+              <a:t>This script will start a new shell with a temporary </a:t>
+            </a:r>
+            <a:r>
+              <a:rPr lang="en-US" dirty="0" err="1"/>
+              <a:t>kube.config</a:t>
+            </a:r>
+            <a:r>
+              <a:rPr lang="en-US" dirty="0"/>
+              <a:t> that accesses the cluster as service account pod-master</a:t>
+            </a:r>
+          </a:p>
+          <a:p>
+            <a:pPr marL="645750" lvl="2" indent="-285750">
+              <a:buFontTx/>
+              <a:buChar char="-"/>
+            </a:pPr>
+            <a:r>
+              <a:rPr lang="en-US" dirty="0"/>
+              <a:t>In this shell, try to get the running pods and the </a:t>
+            </a:r>
+            <a:r>
+              <a:rPr lang="en-US" dirty="0" err="1"/>
+              <a:t>configmaps</a:t>
+            </a:r>
+            <a:endParaRPr lang="en-US" dirty="0"/>
+          </a:p>
+          <a:p>
+            <a:pPr marL="645750" lvl="2" indent="-285750">
+              <a:buFontTx/>
+              <a:buChar char="-"/>
+            </a:pPr>
+            <a:r>
+              <a:rPr lang="en-US" dirty="0"/>
+              <a:t>Try to get the secrets</a:t>
+            </a:r>
+          </a:p>
+          <a:p>
+            <a:pPr marL="645750" lvl="2" indent="-285750">
+              <a:buFontTx/>
+              <a:buChar char="-"/>
+            </a:pPr>
+            <a:r>
+              <a:rPr lang="en-US" dirty="0"/>
+              <a:t>Create the secret pod with "</a:t>
+            </a:r>
+            <a:r>
+              <a:rPr lang="en-US" dirty="0" err="1"/>
+              <a:t>kubectl</a:t>
+            </a:r>
+            <a:r>
+              <a:rPr lang="en-US" dirty="0"/>
+              <a:t> create –f 07d_demo_pod_with_secret.yaml" and have a look at its logs to show that secrets are still visible from within the pod although we do not have access to the secrets through the role (potential security leak)</a:t>
             </a:r>
           </a:p>
           <a:p>
@@ -3189,7 +3381,7 @@
             </a:pPr>
             <a:r>
               <a:rPr lang="en-US" dirty="0"/>
-              <a:t>create a role binding and use </a:t>
+              <a:t>Use the role binding "pod-master" and use </a:t>
             </a:r>
             <a:r>
               <a:rPr lang="en-US" dirty="0" err="1"/>
@@ -3214,16 +3406,6 @@
             <a:r>
               <a:rPr lang="en-US" dirty="0"/>
               <a:t> … to demo its function. </a:t>
-            </a:r>
-          </a:p>
-          <a:p>
-            <a:pPr marL="465750" lvl="1" indent="-285750">
-              <a:buFontTx/>
-              <a:buChar char="-"/>
-            </a:pPr>
-            <a:r>
-              <a:rPr lang="en-US" dirty="0"/>
-              <a:t>If you don’t have a role/binding at hand, refer to the default service account in the default namespace and query, if listing nodes is possible (which shouldn’t be the case)</a:t>
             </a:r>
           </a:p>
           <a:p>

</xml_diff>

<commit_message>
remove sound, fix font color
</commit_message>
<xml_diff>
--- a/kubernetes/11_administration.pptx
+++ b/kubernetes/11_administration.pptx
@@ -21032,44 +21032,6 @@
           </a:p>
         </p:txBody>
       </p:sp>
-      <p:pic>
-        <p:nvPicPr>
-          <p:cNvPr id="4" name="mario">
-            <a:hlinkClick r:id="" action="ppaction://media"/>
-            <a:extLst>
-              <a:ext uri="{FF2B5EF4-FFF2-40B4-BE49-F238E27FC236}">
-                <a16:creationId xmlns:a16="http://schemas.microsoft.com/office/drawing/2014/main" id="{5EDB2663-CD61-4DD6-BC63-9F4A86D811FD}"/>
-              </a:ext>
-            </a:extLst>
-          </p:cNvPr>
-          <p:cNvPicPr>
-            <a:picLocks noChangeAspect="1"/>
-          </p:cNvPicPr>
-          <p:nvPr>
-            <a:audioFile r:link="rId2"/>
-            <p:extLst>
-              <p:ext uri="{DAA4B4D4-6D71-4841-9C94-3DE7FCFB9230}">
-                <p14:media xmlns:p14="http://schemas.microsoft.com/office/powerpoint/2010/main" r:embed="rId1"/>
-              </p:ext>
-            </p:extLst>
-          </p:nvPr>
-        </p:nvPicPr>
-        <p:blipFill>
-          <a:blip r:embed="rId5"/>
-          <a:stretch>
-            <a:fillRect/>
-          </a:stretch>
-        </p:blipFill>
-        <p:spPr>
-          <a:xfrm>
-            <a:off x="3231203" y="383866"/>
-            <a:ext cx="609600" cy="609600"/>
-          </a:xfrm>
-          <a:prstGeom prst="rect">
-            <a:avLst/>
-          </a:prstGeom>
-        </p:spPr>
-      </p:pic>
     </p:spTree>
     <p:extLst>
       <p:ext uri="{BB962C8B-B14F-4D97-AF65-F5344CB8AC3E}">
@@ -21080,93 +21042,6 @@
   <p:clrMapOvr>
     <a:masterClrMapping/>
   </p:clrMapOvr>
-  <p:timing>
-    <p:tnLst>
-      <p:par>
-        <p:cTn id="1" dur="indefinite" restart="never" nodeType="tmRoot">
-          <p:childTnLst>
-            <p:seq concurrent="1" nextAc="seek">
-              <p:cTn id="2" dur="indefinite" nodeType="mainSeq">
-                <p:childTnLst>
-                  <p:par>
-                    <p:cTn id="3" fill="hold">
-                      <p:stCondLst>
-                        <p:cond delay="indefinite"/>
-                        <p:cond evt="onBegin" delay="0">
-                          <p:tn val="2"/>
-                        </p:cond>
-                      </p:stCondLst>
-                      <p:childTnLst>
-                        <p:par>
-                          <p:cTn id="4" fill="hold">
-                            <p:stCondLst>
-                              <p:cond delay="0"/>
-                            </p:stCondLst>
-                            <p:childTnLst>
-                              <p:par>
-                                <p:cTn id="5" presetID="1" presetClass="mediacall" presetSubtype="0" fill="hold" nodeType="afterEffect">
-                                  <p:stCondLst>
-                                    <p:cond delay="0"/>
-                                  </p:stCondLst>
-                                  <p:childTnLst>
-                                    <p:cmd type="call" cmd="playFrom(0.0)">
-                                      <p:cBhvr>
-                                        <p:cTn id="6" dur="2361" fill="hold"/>
-                                        <p:tgtEl>
-                                          <p:spTgt spid="4"/>
-                                        </p:tgtEl>
-                                      </p:cBhvr>
-                                    </p:cmd>
-                                  </p:childTnLst>
-                                </p:cTn>
-                              </p:par>
-                            </p:childTnLst>
-                          </p:cTn>
-                        </p:par>
-                      </p:childTnLst>
-                    </p:cTn>
-                  </p:par>
-                </p:childTnLst>
-              </p:cTn>
-              <p:prevCondLst>
-                <p:cond evt="onPrev" delay="0">
-                  <p:tgtEl>
-                    <p:sldTgt/>
-                  </p:tgtEl>
-                </p:cond>
-              </p:prevCondLst>
-              <p:nextCondLst>
-                <p:cond evt="onNext" delay="0">
-                  <p:tgtEl>
-                    <p:sldTgt/>
-                  </p:tgtEl>
-                </p:cond>
-              </p:nextCondLst>
-            </p:seq>
-            <p:audio>
-              <p:cMediaNode vol="80000" showWhenStopped="0">
-                <p:cTn id="7" fill="hold" display="0">
-                  <p:stCondLst>
-                    <p:cond delay="indefinite"/>
-                  </p:stCondLst>
-                  <p:endCondLst>
-                    <p:cond evt="onStopAudio" delay="0">
-                      <p:tgtEl>
-                        <p:sldTgt/>
-                      </p:tgtEl>
-                    </p:cond>
-                  </p:endCondLst>
-                </p:cTn>
-                <p:tgtEl>
-                  <p:spTgt spid="4"/>
-                </p:tgtEl>
-              </p:cMediaNode>
-            </p:audio>
-          </p:childTnLst>
-        </p:cTn>
-      </p:par>
-    </p:tnLst>
-  </p:timing>
 </p:sld>
 </file>
 
@@ -23571,44 +23446,6 @@
           </a:fontRef>
         </p:style>
       </p:cxnSp>
-      <p:pic>
-        <p:nvPicPr>
-          <p:cNvPr id="5" name="mario-end">
-            <a:hlinkClick r:id="" action="ppaction://media"/>
-            <a:extLst>
-              <a:ext uri="{FF2B5EF4-FFF2-40B4-BE49-F238E27FC236}">
-                <a16:creationId xmlns:a16="http://schemas.microsoft.com/office/drawing/2014/main" id="{81106E6E-145A-4D99-B520-20556078FE9F}"/>
-              </a:ext>
-            </a:extLst>
-          </p:cNvPr>
-          <p:cNvPicPr>
-            <a:picLocks noChangeAspect="1"/>
-          </p:cNvPicPr>
-          <p:nvPr>
-            <a:audioFile r:link="rId2"/>
-            <p:extLst>
-              <p:ext uri="{DAA4B4D4-6D71-4841-9C94-3DE7FCFB9230}">
-                <p14:media xmlns:p14="http://schemas.microsoft.com/office/powerpoint/2010/main" r:embed="rId1"/>
-              </p:ext>
-            </p:extLst>
-          </p:nvPr>
-        </p:nvPicPr>
-        <p:blipFill>
-          <a:blip r:embed="rId4"/>
-          <a:stretch>
-            <a:fillRect/>
-          </a:stretch>
-        </p:blipFill>
-        <p:spPr>
-          <a:xfrm>
-            <a:off x="10930622" y="5736631"/>
-            <a:ext cx="609600" cy="609600"/>
-          </a:xfrm>
-          <a:prstGeom prst="rect">
-            <a:avLst/>
-          </a:prstGeom>
-        </p:spPr>
-      </p:pic>
     </p:spTree>
     <p:extLst>
       <p:ext uri="{BB962C8B-B14F-4D97-AF65-F5344CB8AC3E}">
@@ -23619,93 +23456,6 @@
   <p:clrMapOvr>
     <a:masterClrMapping/>
   </p:clrMapOvr>
-  <p:timing>
-    <p:tnLst>
-      <p:par>
-        <p:cTn id="1" dur="indefinite" restart="never" nodeType="tmRoot">
-          <p:childTnLst>
-            <p:seq concurrent="1" nextAc="seek">
-              <p:cTn id="2" dur="indefinite" nodeType="mainSeq">
-                <p:childTnLst>
-                  <p:par>
-                    <p:cTn id="3" fill="hold">
-                      <p:stCondLst>
-                        <p:cond delay="indefinite"/>
-                        <p:cond evt="onBegin" delay="0">
-                          <p:tn val="2"/>
-                        </p:cond>
-                      </p:stCondLst>
-                      <p:childTnLst>
-                        <p:par>
-                          <p:cTn id="4" fill="hold">
-                            <p:stCondLst>
-                              <p:cond delay="0"/>
-                            </p:stCondLst>
-                            <p:childTnLst>
-                              <p:par>
-                                <p:cTn id="5" presetID="1" presetClass="mediacall" presetSubtype="0" fill="hold" nodeType="afterEffect">
-                                  <p:stCondLst>
-                                    <p:cond delay="0"/>
-                                  </p:stCondLst>
-                                  <p:childTnLst>
-                                    <p:cmd type="call" cmd="playFrom(0.0)">
-                                      <p:cBhvr>
-                                        <p:cTn id="6" dur="3791" fill="hold"/>
-                                        <p:tgtEl>
-                                          <p:spTgt spid="5"/>
-                                        </p:tgtEl>
-                                      </p:cBhvr>
-                                    </p:cmd>
-                                  </p:childTnLst>
-                                </p:cTn>
-                              </p:par>
-                            </p:childTnLst>
-                          </p:cTn>
-                        </p:par>
-                      </p:childTnLst>
-                    </p:cTn>
-                  </p:par>
-                </p:childTnLst>
-              </p:cTn>
-              <p:prevCondLst>
-                <p:cond evt="onPrev" delay="0">
-                  <p:tgtEl>
-                    <p:sldTgt/>
-                  </p:tgtEl>
-                </p:cond>
-              </p:prevCondLst>
-              <p:nextCondLst>
-                <p:cond evt="onNext" delay="0">
-                  <p:tgtEl>
-                    <p:sldTgt/>
-                  </p:tgtEl>
-                </p:cond>
-              </p:nextCondLst>
-            </p:seq>
-            <p:audio>
-              <p:cMediaNode vol="80000" showWhenStopped="0">
-                <p:cTn id="7" fill="hold" display="0">
-                  <p:stCondLst>
-                    <p:cond delay="indefinite"/>
-                  </p:stCondLst>
-                  <p:endCondLst>
-                    <p:cond evt="onStopAudio" delay="0">
-                      <p:tgtEl>
-                        <p:sldTgt/>
-                      </p:tgtEl>
-                    </p:cond>
-                  </p:endCondLst>
-                </p:cTn>
-                <p:tgtEl>
-                  <p:spTgt spid="5"/>
-                </p:tgtEl>
-              </p:cMediaNode>
-            </p:audio>
-          </p:childTnLst>
-        </p:cTn>
-      </p:par>
-    </p:tnLst>
-  </p:timing>
 </p:sld>
 </file>
 
@@ -27683,6 +27433,9 @@
                 <a:buSzPct val="80000"/>
               </a:pPr>
               <a:endParaRPr lang="en-GB" sz="1799" kern="0" dirty="0" err="1">
+                <a:solidFill>
+                  <a:schemeClr val="tx1"/>
+                </a:solidFill>
                 <a:ea typeface="Arial Unicode MS" pitchFamily="34" charset="-128"/>
                 <a:cs typeface="Arial Unicode MS" pitchFamily="34" charset="-128"/>
               </a:endParaRPr>
@@ -27747,6 +27500,9 @@
                 <a:buSzPct val="80000"/>
               </a:pPr>
               <a:endParaRPr lang="en-GB" sz="1799" kern="0" dirty="0" err="1">
+                <a:solidFill>
+                  <a:schemeClr val="tx1"/>
+                </a:solidFill>
                 <a:ea typeface="Arial Unicode MS" pitchFamily="34" charset="-128"/>
                 <a:cs typeface="Arial Unicode MS" pitchFamily="34" charset="-128"/>
               </a:endParaRPr>
@@ -27778,9 +27534,6 @@
               <a:pPr algn="ctr"/>
               <a:r>
                 <a:rPr lang="en-US" sz="1799" b="1" dirty="0">
-                  <a:solidFill>
-                    <a:prstClr val="black"/>
-                  </a:solidFill>
                   <a:latin typeface="Calibri" panose="020F0502020204030204"/>
                 </a:rPr>
                 <a:t>Management Vector</a:t>
@@ -27790,9 +27543,6 @@
               <a:pPr algn="ctr"/>
               <a:r>
                 <a:rPr lang="en-US" sz="1799" b="1" dirty="0">
-                  <a:solidFill>
-                    <a:prstClr val="black"/>
-                  </a:solidFill>
                   <a:latin typeface="Calibri" panose="020F0502020204030204"/>
                 </a:rPr>
                 <a:t>into all</a:t>
@@ -27802,9 +27552,6 @@
               <a:pPr algn="ctr"/>
               <a:r>
                 <a:rPr lang="en-US" sz="1799" b="1" dirty="0">
-                  <a:solidFill>
-                    <a:prstClr val="black"/>
-                  </a:solidFill>
                   <a:latin typeface="Calibri" panose="020F0502020204030204"/>
                 </a:rPr>
                 <a:t>Control Planes</a:t>
@@ -27873,9 +27620,6 @@
           <a:p>
             <a:r>
               <a:rPr lang="en-US" sz="1799">
-                <a:solidFill>
-                  <a:prstClr val="black"/>
-                </a:solidFill>
                 <a:latin typeface="Calibri" panose="020F0502020204030204"/>
               </a:rPr>
               <a:t>Seed Cluster</a:t>
@@ -27915,9 +27659,6 @@
               <a:defRPr/>
             </a:pPr>
             <a:endParaRPr lang="en-US" sz="1799" kern="0">
-              <a:solidFill>
-                <a:prstClr val="white"/>
-              </a:solidFill>
               <a:latin typeface="Calibri" panose="020F0502020204030204"/>
               <a:ea typeface=""/>
               <a:cs typeface=""/>
@@ -27962,9 +27703,6 @@
             </a:pPr>
             <a:r>
               <a:rPr lang="en-US" sz="800" kern="0">
-                <a:solidFill>
-                  <a:prstClr val="white"/>
-                </a:solidFill>
                 <a:latin typeface="Calibri" panose="020F0502020204030204"/>
                 <a:ea typeface=""/>
                 <a:cs typeface=""/>
@@ -28011,9 +27749,6 @@
             </a:pPr>
             <a:r>
               <a:rPr lang="en-US" sz="800" kern="0">
-                <a:solidFill>
-                  <a:prstClr val="white"/>
-                </a:solidFill>
                 <a:latin typeface="Calibri" panose="020F0502020204030204"/>
                 <a:ea typeface=""/>
                 <a:cs typeface=""/>
@@ -28060,9 +27795,6 @@
             </a:pPr>
             <a:r>
               <a:rPr lang="en-US" sz="800" kern="0">
-                <a:solidFill>
-                  <a:prstClr val="white"/>
-                </a:solidFill>
                 <a:latin typeface="Calibri" panose="020F0502020204030204"/>
                 <a:ea typeface=""/>
                 <a:cs typeface=""/>
@@ -28109,9 +27841,6 @@
             </a:pPr>
             <a:r>
               <a:rPr lang="en-US" sz="800" kern="0">
-                <a:solidFill>
-                  <a:prstClr val="white"/>
-                </a:solidFill>
                 <a:latin typeface="Calibri" panose="020F0502020204030204"/>
                 <a:ea typeface=""/>
                 <a:cs typeface=""/>
@@ -28158,9 +27887,6 @@
             </a:pPr>
             <a:r>
               <a:rPr lang="en-US" sz="800" kern="0">
-                <a:solidFill>
-                  <a:prstClr val="white"/>
-                </a:solidFill>
                 <a:latin typeface="Calibri" panose="020F0502020204030204"/>
                 <a:ea typeface=""/>
                 <a:cs typeface=""/>
@@ -28207,9 +27933,6 @@
             </a:pPr>
             <a:r>
               <a:rPr lang="en-US" sz="800" kern="0">
-                <a:solidFill>
-                  <a:prstClr val="white"/>
-                </a:solidFill>
                 <a:latin typeface="Calibri" panose="020F0502020204030204"/>
                 <a:ea typeface=""/>
                 <a:cs typeface=""/>
@@ -28256,9 +27979,6 @@
             </a:pPr>
             <a:r>
               <a:rPr lang="en-US" sz="800" kern="0">
-                <a:solidFill>
-                  <a:prstClr val="white"/>
-                </a:solidFill>
                 <a:latin typeface="Calibri" panose="020F0502020204030204"/>
                 <a:ea typeface=""/>
                 <a:cs typeface=""/>
@@ -28292,9 +28012,6 @@
           <a:p>
             <a:r>
               <a:rPr lang="en-US" sz="1799">
-                <a:solidFill>
-                  <a:prstClr val="black"/>
-                </a:solidFill>
                 <a:latin typeface="Calibri" panose="020F0502020204030204"/>
               </a:rPr>
               <a:t>HA</a:t>
@@ -28336,9 +28053,6 @@
               <a:defRPr/>
             </a:pPr>
             <a:endParaRPr lang="en-US" sz="1799" kern="0">
-              <a:solidFill>
-                <a:prstClr val="white"/>
-              </a:solidFill>
               <a:latin typeface="Calibri" panose="020F0502020204030204"/>
               <a:ea typeface=""/>
               <a:cs typeface=""/>
@@ -28383,9 +28097,6 @@
             </a:pPr>
             <a:r>
               <a:rPr lang="en-US" sz="800" kern="0">
-                <a:solidFill>
-                  <a:prstClr val="white"/>
-                </a:solidFill>
                 <a:latin typeface="Calibri" panose="020F0502020204030204"/>
                 <a:ea typeface=""/>
                 <a:cs typeface=""/>
@@ -28419,9 +28130,6 @@
           <a:p>
             <a:r>
               <a:rPr lang="en-US" sz="1799">
-                <a:solidFill>
-                  <a:prstClr val="black"/>
-                </a:solidFill>
                 <a:latin typeface="Calibri" panose="020F0502020204030204"/>
               </a:rPr>
               <a:t>Shoot Clusters</a:t>
@@ -28466,9 +28174,6 @@
             </a:pPr>
             <a:r>
               <a:rPr lang="en-US" sz="800" kern="0">
-                <a:solidFill>
-                  <a:prstClr val="white"/>
-                </a:solidFill>
                 <a:latin typeface="Calibri" panose="020F0502020204030204"/>
                 <a:ea typeface=""/>
                 <a:cs typeface=""/>
@@ -28515,9 +28220,6 @@
             </a:pPr>
             <a:r>
               <a:rPr lang="en-US" sz="800" kern="0">
-                <a:solidFill>
-                  <a:prstClr val="white"/>
-                </a:solidFill>
                 <a:latin typeface="Calibri" panose="020F0502020204030204"/>
                 <a:ea typeface=""/>
                 <a:cs typeface=""/>
@@ -28559,9 +28261,6 @@
               <a:defRPr/>
             </a:pPr>
             <a:endParaRPr lang="en-US" sz="1799" kern="0">
-              <a:solidFill>
-                <a:prstClr val="white"/>
-              </a:solidFill>
               <a:latin typeface="Calibri" panose="020F0502020204030204"/>
               <a:ea typeface=""/>
               <a:cs typeface=""/>
@@ -28606,9 +28305,6 @@
             </a:pPr>
             <a:r>
               <a:rPr lang="en-US" sz="800" kern="0">
-                <a:solidFill>
-                  <a:prstClr val="white"/>
-                </a:solidFill>
                 <a:latin typeface="Calibri" panose="020F0502020204030204"/>
                 <a:ea typeface=""/>
                 <a:cs typeface=""/>
@@ -28655,9 +28351,6 @@
             </a:pPr>
             <a:r>
               <a:rPr lang="en-US" sz="800" kern="0" dirty="0">
-                <a:solidFill>
-                  <a:prstClr val="white"/>
-                </a:solidFill>
                 <a:latin typeface="Calibri" panose="020F0502020204030204"/>
                 <a:ea typeface=""/>
                 <a:cs typeface=""/>
@@ -28704,9 +28397,6 @@
             </a:pPr>
             <a:r>
               <a:rPr lang="en-US" sz="800" kern="0">
-                <a:solidFill>
-                  <a:prstClr val="white"/>
-                </a:solidFill>
                 <a:latin typeface="Calibri" panose="020F0502020204030204"/>
                 <a:ea typeface=""/>
                 <a:cs typeface=""/>
@@ -28748,9 +28438,6 @@
               <a:defRPr/>
             </a:pPr>
             <a:endParaRPr lang="en-US" sz="1799" kern="0">
-              <a:solidFill>
-                <a:prstClr val="white"/>
-              </a:solidFill>
               <a:latin typeface="Calibri" panose="020F0502020204030204"/>
               <a:ea typeface=""/>
               <a:cs typeface=""/>
@@ -28795,9 +28482,6 @@
             </a:pPr>
             <a:r>
               <a:rPr lang="en-US" sz="800" kern="0">
-                <a:solidFill>
-                  <a:prstClr val="white"/>
-                </a:solidFill>
                 <a:latin typeface="Calibri" panose="020F0502020204030204"/>
                 <a:ea typeface=""/>
                 <a:cs typeface=""/>
@@ -28844,9 +28528,6 @@
             </a:pPr>
             <a:r>
               <a:rPr lang="en-US" sz="800" kern="0">
-                <a:solidFill>
-                  <a:prstClr val="white"/>
-                </a:solidFill>
                 <a:latin typeface="Calibri" panose="020F0502020204030204"/>
                 <a:ea typeface=""/>
                 <a:cs typeface=""/>
@@ -28888,9 +28569,6 @@
               <a:defRPr/>
             </a:pPr>
             <a:endParaRPr lang="en-US" sz="1799" kern="0">
-              <a:solidFill>
-                <a:prstClr val="white"/>
-              </a:solidFill>
               <a:latin typeface="Calibri" panose="020F0502020204030204"/>
               <a:ea typeface=""/>
               <a:cs typeface=""/>
@@ -28935,9 +28613,6 @@
             </a:pPr>
             <a:r>
               <a:rPr lang="en-US" sz="800" kern="0">
-                <a:solidFill>
-                  <a:prstClr val="white"/>
-                </a:solidFill>
                 <a:latin typeface="Calibri" panose="020F0502020204030204"/>
                 <a:ea typeface=""/>
                 <a:cs typeface=""/>
@@ -28984,9 +28659,6 @@
             </a:pPr>
             <a:r>
               <a:rPr lang="en-US" sz="800" kern="0">
-                <a:solidFill>
-                  <a:prstClr val="white"/>
-                </a:solidFill>
                 <a:latin typeface="Calibri" panose="020F0502020204030204"/>
                 <a:ea typeface=""/>
                 <a:cs typeface=""/>
@@ -29028,9 +28700,6 @@
               <a:defRPr/>
             </a:pPr>
             <a:endParaRPr lang="en-US" sz="1799" kern="0">
-              <a:solidFill>
-                <a:prstClr val="white"/>
-              </a:solidFill>
               <a:latin typeface="Calibri" panose="020F0502020204030204"/>
               <a:ea typeface=""/>
               <a:cs typeface=""/>
@@ -29075,9 +28744,6 @@
             </a:pPr>
             <a:r>
               <a:rPr lang="en-US" sz="800" kern="0">
-                <a:solidFill>
-                  <a:prstClr val="white"/>
-                </a:solidFill>
                 <a:latin typeface="Calibri" panose="020F0502020204030204"/>
                 <a:ea typeface=""/>
                 <a:cs typeface=""/>
@@ -29137,9 +28803,6 @@
           <a:p>
             <a:r>
               <a:rPr lang="en-US" sz="1799" dirty="0">
-                <a:solidFill>
-                  <a:prstClr val="black"/>
-                </a:solidFill>
                 <a:latin typeface="Calibri" panose="020F0502020204030204"/>
               </a:rPr>
               <a:t>manages</a:t>
@@ -29262,9 +28925,6 @@
             </a:pPr>
             <a:r>
               <a:rPr lang="en-US" sz="1799" kern="0">
-                <a:solidFill>
-                  <a:prstClr val="white"/>
-                </a:solidFill>
                 <a:latin typeface="Calibri" panose="020F0502020204030204"/>
                 <a:ea typeface=""/>
                 <a:cs typeface=""/>
@@ -29298,9 +28958,6 @@
           <a:p>
             <a:r>
               <a:rPr lang="en-US" sz="1799" b="1" dirty="0">
-                <a:solidFill>
-                  <a:prstClr val="black"/>
-                </a:solidFill>
                 <a:latin typeface="Calibri" panose="020F0502020204030204"/>
               </a:rPr>
               <a:t>Think outside the box /</a:t>
@@ -29309,9 +28966,6 @@
           <a:p>
             <a:r>
               <a:rPr lang="en-US" sz="1799" b="1" dirty="0">
-                <a:solidFill>
-                  <a:prstClr val="black"/>
-                </a:solidFill>
                 <a:latin typeface="Calibri" panose="020F0502020204030204"/>
               </a:rPr>
               <a:t>Move outside the box!</a:t>
@@ -29354,11 +29008,6 @@
             </a:pPr>
             <a:r>
               <a:rPr lang="en-US" sz="1799" kern="0">
-                <a:solidFill>
-                  <a:prstClr val="white">
-                    <a:lumMod val="75000"/>
-                  </a:prstClr>
-                </a:solidFill>
                 <a:latin typeface="Calibri" panose="020F0502020204030204"/>
                 <a:ea typeface=""/>
                 <a:cs typeface=""/>
@@ -29405,9 +29054,6 @@
             </a:pPr>
             <a:r>
               <a:rPr lang="en-US" sz="1799" kern="0">
-                <a:solidFill>
-                  <a:prstClr val="white"/>
-                </a:solidFill>
                 <a:latin typeface="Calibri" panose="020F0502020204030204"/>
                 <a:ea typeface=""/>
                 <a:cs typeface=""/>
@@ -29454,9 +29100,6 @@
             </a:pPr>
             <a:r>
               <a:rPr lang="en-US" sz="1799" kern="0">
-                <a:solidFill>
-                  <a:prstClr val="white"/>
-                </a:solidFill>
                 <a:latin typeface="Calibri" panose="020F0502020204030204"/>
                 <a:ea typeface=""/>
                 <a:cs typeface=""/>
@@ -29503,9 +29146,6 @@
             </a:pPr>
             <a:r>
               <a:rPr lang="en-US" sz="1799" kern="0">
-                <a:solidFill>
-                  <a:prstClr val="white"/>
-                </a:solidFill>
                 <a:latin typeface="Calibri" panose="020F0502020204030204"/>
                 <a:ea typeface=""/>
                 <a:cs typeface=""/>
@@ -29550,11 +29190,6 @@
             </a:pPr>
             <a:r>
               <a:rPr lang="en-US" sz="1799" kern="0">
-                <a:solidFill>
-                  <a:prstClr val="white">
-                    <a:lumMod val="75000"/>
-                  </a:prstClr>
-                </a:solidFill>
                 <a:latin typeface="Calibri" panose="020F0502020204030204"/>
                 <a:ea typeface=""/>
                 <a:cs typeface=""/>
@@ -29599,11 +29234,6 @@
             </a:pPr>
             <a:r>
               <a:rPr lang="en-US" sz="1799" kern="0">
-                <a:solidFill>
-                  <a:prstClr val="white">
-                    <a:lumMod val="75000"/>
-                  </a:prstClr>
-                </a:solidFill>
                 <a:latin typeface="Calibri" panose="020F0502020204030204"/>
                 <a:ea typeface=""/>
                 <a:cs typeface=""/>
@@ -29648,11 +29278,6 @@
             </a:pPr>
             <a:r>
               <a:rPr lang="en-US" sz="1799" kern="0">
-                <a:solidFill>
-                  <a:prstClr val="white">
-                    <a:lumMod val="75000"/>
-                  </a:prstClr>
-                </a:solidFill>
                 <a:latin typeface="Calibri" panose="020F0502020204030204"/>
                 <a:ea typeface=""/>
                 <a:cs typeface=""/>
@@ -29697,11 +29322,6 @@
             </a:pPr>
             <a:r>
               <a:rPr lang="en-US" sz="1799" kern="0">
-                <a:solidFill>
-                  <a:prstClr val="white">
-                    <a:lumMod val="75000"/>
-                  </a:prstClr>
-                </a:solidFill>
                 <a:latin typeface="Calibri" panose="020F0502020204030204"/>
                 <a:ea typeface=""/>
                 <a:cs typeface=""/>
@@ -29735,22 +29355,12 @@
           <a:p>
             <a:r>
               <a:rPr lang="mr-IN" sz="1799">
-                <a:solidFill>
-                  <a:prstClr val="white">
-                    <a:lumMod val="75000"/>
-                  </a:prstClr>
-                </a:solidFill>
                 <a:latin typeface="Calibri" panose="020F0502020204030204"/>
                 <a:cs typeface="Mangal" charset="0"/>
               </a:rPr>
               <a:t>…</a:t>
             </a:r>
             <a:endParaRPr lang="en-US" sz="1799">
-              <a:solidFill>
-                <a:prstClr val="white">
-                  <a:lumMod val="75000"/>
-                </a:prstClr>
-              </a:solidFill>
               <a:latin typeface="Calibri" panose="020F0502020204030204"/>
             </a:endParaRPr>
           </a:p>
@@ -29873,9 +29483,6 @@
             </a:pPr>
             <a:r>
               <a:rPr lang="en-US" sz="1799" kern="0">
-                <a:solidFill>
-                  <a:prstClr val="white"/>
-                </a:solidFill>
                 <a:latin typeface="Calibri" panose="020F0502020204030204"/>
                 <a:ea typeface=""/>
                 <a:cs typeface=""/>
@@ -29917,9 +29524,6 @@
               <a:defRPr/>
             </a:pPr>
             <a:endParaRPr lang="en-US" sz="1799" kern="0">
-              <a:solidFill>
-                <a:prstClr val="white"/>
-              </a:solidFill>
               <a:latin typeface="Calibri" panose="020F0502020204030204"/>
               <a:ea typeface=""/>
               <a:cs typeface=""/>
@@ -29964,9 +29568,6 @@
             </a:pPr>
             <a:r>
               <a:rPr lang="en-US" sz="800" kern="0" dirty="0">
-                <a:solidFill>
-                  <a:prstClr val="white"/>
-                </a:solidFill>
                 <a:latin typeface="Calibri" panose="020F0502020204030204"/>
                 <a:ea typeface=""/>
                 <a:cs typeface=""/>
@@ -30013,9 +29614,6 @@
             </a:pPr>
             <a:r>
               <a:rPr lang="en-US" sz="800" kern="0">
-                <a:solidFill>
-                  <a:prstClr val="white"/>
-                </a:solidFill>
                 <a:latin typeface="Calibri" panose="020F0502020204030204"/>
                 <a:ea typeface=""/>
                 <a:cs typeface=""/>
@@ -30049,9 +29647,6 @@
           <a:p>
             <a:r>
               <a:rPr lang="en-US" sz="1400" b="1" dirty="0">
-                <a:solidFill>
-                  <a:prstClr val="black"/>
-                </a:solidFill>
                 <a:latin typeface="Calibri" panose="020F0502020204030204"/>
               </a:rPr>
               <a:t>Auto-scaling via native</a:t>
@@ -30060,18 +29655,12 @@
           <a:p>
             <a:r>
               <a:rPr lang="en-US" sz="1400" b="1" dirty="0" err="1">
-                <a:solidFill>
-                  <a:prstClr val="black"/>
-                </a:solidFill>
                 <a:latin typeface="Calibri" panose="020F0502020204030204"/>
               </a:rPr>
               <a:t>hyperscale</a:t>
             </a:r>
             <a:r>
               <a:rPr lang="en-US" sz="1400" b="1" dirty="0">
-                <a:solidFill>
-                  <a:prstClr val="black"/>
-                </a:solidFill>
                 <a:latin typeface="Calibri" panose="020F0502020204030204"/>
               </a:rPr>
               <a:t> provider service</a:t>
@@ -30080,9 +29669,6 @@
           <a:p>
             <a:r>
               <a:rPr lang="en-US" sz="1400" b="1" dirty="0">
-                <a:solidFill>
-                  <a:prstClr val="black"/>
-                </a:solidFill>
                 <a:latin typeface="Calibri" panose="020F0502020204030204"/>
               </a:rPr>
               <a:t>or controller on bare metal</a:t>

</xml_diff>

<commit_message>
added custom scheduler demo
</commit_message>
<xml_diff>
--- a/kubernetes/11_administration.pptx
+++ b/kubernetes/11_administration.pptx
@@ -5,10 +5,10 @@
     <p:sldMasterId id="2147483733" r:id="rId1"/>
   </p:sldMasterIdLst>
   <p:notesMasterIdLst>
-    <p:notesMasterId r:id="rId27"/>
+    <p:notesMasterId r:id="rId28"/>
   </p:notesMasterIdLst>
   <p:handoutMasterIdLst>
-    <p:handoutMasterId r:id="rId28"/>
+    <p:handoutMasterId r:id="rId29"/>
   </p:handoutMasterIdLst>
   <p:sldIdLst>
     <p:sldId id="433" r:id="rId2"/>
@@ -22,20 +22,21 @@
     <p:sldId id="454" r:id="rId10"/>
     <p:sldId id="450" r:id="rId11"/>
     <p:sldId id="462" r:id="rId12"/>
-    <p:sldId id="469" r:id="rId13"/>
-    <p:sldId id="471" r:id="rId14"/>
-    <p:sldId id="459" r:id="rId15"/>
-    <p:sldId id="446" r:id="rId16"/>
-    <p:sldId id="467" r:id="rId17"/>
-    <p:sldId id="458" r:id="rId18"/>
-    <p:sldId id="470" r:id="rId19"/>
-    <p:sldId id="457" r:id="rId20"/>
-    <p:sldId id="456" r:id="rId21"/>
-    <p:sldId id="468" r:id="rId22"/>
-    <p:sldId id="449" r:id="rId23"/>
-    <p:sldId id="460" r:id="rId24"/>
-    <p:sldId id="461" r:id="rId25"/>
-    <p:sldId id="265" r:id="rId26"/>
+    <p:sldId id="472" r:id="rId13"/>
+    <p:sldId id="469" r:id="rId14"/>
+    <p:sldId id="471" r:id="rId15"/>
+    <p:sldId id="459" r:id="rId16"/>
+    <p:sldId id="446" r:id="rId17"/>
+    <p:sldId id="467" r:id="rId18"/>
+    <p:sldId id="458" r:id="rId19"/>
+    <p:sldId id="470" r:id="rId20"/>
+    <p:sldId id="457" r:id="rId21"/>
+    <p:sldId id="456" r:id="rId22"/>
+    <p:sldId id="468" r:id="rId23"/>
+    <p:sldId id="449" r:id="rId24"/>
+    <p:sldId id="460" r:id="rId25"/>
+    <p:sldId id="461" r:id="rId26"/>
+    <p:sldId id="265" r:id="rId27"/>
   </p:sldIdLst>
   <p:sldSz cx="12195175" cy="6858000"/>
   <p:notesSz cx="6858000" cy="9144000"/>
@@ -793,9 +794,177 @@
         </p:nvSpPr>
         <p:spPr/>
         <p:txBody>
-          <a:bodyPr/>
+          <a:bodyPr>
+            <a:normAutofit/>
+          </a:bodyPr>
           <a:lstStyle/>
           <a:p>
+            <a:pPr marL="0" lvl="0" indent="0">
+              <a:buFontTx/>
+              <a:buNone/>
+            </a:pPr>
+            <a:r>
+              <a:rPr lang="en-US" dirty="0"/>
+              <a:t>Custom scheduler - this Demo is optional!</a:t>
+            </a:r>
+          </a:p>
+          <a:p>
+            <a:pPr marL="0" lvl="0" indent="0">
+              <a:buFontTx/>
+              <a:buNone/>
+            </a:pPr>
+            <a:endParaRPr lang="en-US" dirty="0"/>
+          </a:p>
+          <a:p>
+            <a:pPr marL="0" lvl="0" indent="0">
+              <a:buFontTx/>
+              <a:buNone/>
+            </a:pPr>
+            <a:r>
+              <a:rPr lang="en-US" dirty="0"/>
+              <a:t>If regular scheduling doesn’t fit to your requirements, you can build a custom scheduler. </a:t>
+            </a:r>
+          </a:p>
+          <a:p>
+            <a:pPr marL="0" lvl="0" indent="0">
+              <a:buFontTx/>
+              <a:buNone/>
+            </a:pPr>
+            <a:r>
+              <a:rPr lang="en-US" dirty="0"/>
+              <a:t>All you need is to</a:t>
+            </a:r>
+          </a:p>
+          <a:p>
+            <a:pPr marL="285750" lvl="0" indent="-285750">
+              <a:buFontTx/>
+              <a:buChar char="-"/>
+            </a:pPr>
+            <a:r>
+              <a:rPr lang="en-US" dirty="0"/>
+              <a:t>a name the scheduler can be referenced by</a:t>
+            </a:r>
+          </a:p>
+          <a:p>
+            <a:pPr marL="285750" lvl="0" indent="-285750">
+              <a:buFontTx/>
+              <a:buChar char="-"/>
+            </a:pPr>
+            <a:r>
+              <a:rPr lang="en-US" dirty="0"/>
+              <a:t>A control loop watching the API for unscheduled pods referencing the scheduler by name</a:t>
+            </a:r>
+          </a:p>
+          <a:p>
+            <a:pPr marL="285750" lvl="0" indent="-285750">
+              <a:buFontTx/>
+              <a:buChar char="-"/>
+            </a:pPr>
+            <a:r>
+              <a:rPr lang="en-US" dirty="0"/>
+              <a:t>Access to the cluster API to run the loop and post the bindings</a:t>
+            </a:r>
+          </a:p>
+          <a:p>
+            <a:pPr marL="285750" lvl="0" indent="-285750">
+              <a:buFontTx/>
+              <a:buChar char="-"/>
+            </a:pPr>
+            <a:endParaRPr lang="en-US" dirty="0"/>
+          </a:p>
+          <a:p>
+            <a:pPr marL="0" lvl="0" indent="0">
+              <a:buFontTx/>
+              <a:buNone/>
+            </a:pPr>
+            <a:r>
+              <a:rPr lang="en-US" dirty="0"/>
+              <a:t>Demo :</a:t>
+            </a:r>
+          </a:p>
+          <a:p>
+            <a:pPr marL="285750" lvl="0" indent="-285750">
+              <a:buFontTx/>
+              <a:buChar char="-"/>
+            </a:pPr>
+            <a:r>
+              <a:rPr lang="en-US" dirty="0" err="1"/>
+              <a:t>kubectl</a:t>
+            </a:r>
+            <a:r>
+              <a:rPr lang="en-US" dirty="0"/>
+              <a:t> proxy &amp;</a:t>
+            </a:r>
+          </a:p>
+          <a:p>
+            <a:pPr marL="285750" lvl="0" indent="-285750">
+              <a:buFontTx/>
+              <a:buChar char="-"/>
+            </a:pPr>
+            <a:r>
+              <a:rPr lang="en-US" dirty="0"/>
+              <a:t>Create the deployment 11d_custom_scheduler_deployment.yaml</a:t>
+            </a:r>
+          </a:p>
+          <a:p>
+            <a:pPr marL="285750" lvl="0" indent="-285750">
+              <a:buFontTx/>
+              <a:buChar char="-"/>
+            </a:pPr>
+            <a:r>
+              <a:rPr lang="en-US" dirty="0"/>
+              <a:t>Show the pod with the specified scheduler name &amp; run a “describe” on it. Highlight the missing default scheduling event </a:t>
+            </a:r>
+            <a:r>
+              <a:rPr lang="en-US" dirty="0">
+                <a:sym typeface="Wingdings" panose="05000000000000000000" pitchFamily="2" charset="2"/>
+              </a:rPr>
+              <a:t> the default scheduler doesn’t pick it up</a:t>
+            </a:r>
+            <a:endParaRPr lang="en-US" dirty="0"/>
+          </a:p>
+          <a:p>
+            <a:pPr marL="285750" lvl="0" indent="-285750">
+              <a:buFontTx/>
+              <a:buChar char="-"/>
+            </a:pPr>
+            <a:r>
+              <a:rPr lang="en-US" dirty="0"/>
+              <a:t>Run “./11e_custom_scheduler.sh &lt;your-target-namespace&gt;” to start the scheduling loop</a:t>
+            </a:r>
+          </a:p>
+          <a:p>
+            <a:pPr marL="285750" lvl="0" indent="-285750">
+              <a:buFontTx/>
+              <a:buChar char="-"/>
+            </a:pPr>
+            <a:r>
+              <a:rPr lang="en-US" dirty="0"/>
+              <a:t>Show the scheduled pods</a:t>
+            </a:r>
+          </a:p>
+          <a:p>
+            <a:pPr marL="0" lvl="0" indent="0">
+              <a:buFontTx/>
+              <a:buNone/>
+            </a:pPr>
+            <a:endParaRPr lang="en-US" dirty="0"/>
+          </a:p>
+          <a:p>
+            <a:pPr marL="0" lvl="0" indent="0">
+              <a:buFontTx/>
+              <a:buNone/>
+            </a:pPr>
+            <a:r>
+              <a:rPr lang="en-US" dirty="0"/>
+              <a:t>Instead of running the scheduler locally you could also run it within the cluster – simply pack it into a docker image and use it with a deployment.</a:t>
+            </a:r>
+          </a:p>
+          <a:p>
+            <a:pPr marL="285750" lvl="0" indent="-285750">
+              <a:buFontTx/>
+              <a:buChar char="-"/>
+            </a:pPr>
             <a:endParaRPr lang="en-US" dirty="0"/>
           </a:p>
         </p:txBody>
@@ -816,18 +985,18 @@
           <a:lstStyle/>
           <a:p>
             <a:fld id="{7D8C2C35-2B8A-446E-BEC0-FD36716C29AC}" type="slidenum">
-              <a:rPr lang="en-US" smtClean="0"/>
+              <a:rPr lang="de-DE" smtClean="0"/>
               <a:pPr/>
               <a:t>12</a:t>
             </a:fld>
-            <a:endParaRPr lang="en-US" dirty="0"/>
+            <a:endParaRPr lang="de-DE" dirty="0"/>
           </a:p>
         </p:txBody>
       </p:sp>
     </p:spTree>
     <p:extLst>
       <p:ext uri="{BB962C8B-B14F-4D97-AF65-F5344CB8AC3E}">
-        <p14:creationId xmlns:p14="http://schemas.microsoft.com/office/powerpoint/2010/main" val="2873814892"/>
+        <p14:creationId xmlns:p14="http://schemas.microsoft.com/office/powerpoint/2010/main" val="3470228819"/>
       </p:ext>
     </p:extLst>
   </p:cSld>
@@ -881,42 +1050,6 @@
           <a:bodyPr/>
           <a:lstStyle/>
           <a:p>
-            <a:r>
-              <a:rPr lang="en-US" dirty="0"/>
-              <a:t>Resource Quota and </a:t>
-            </a:r>
-            <a:r>
-              <a:rPr lang="en-US" dirty="0" err="1"/>
-              <a:t>LimitRanges</a:t>
-            </a:r>
-            <a:r>
-              <a:rPr lang="en-US" dirty="0"/>
-              <a:t> can be used to control requested as well as actual resource consumption + # of k8s objects per namespace. Example: if the memory quota per pod is 200 MB and you want to start, let’s say a Jenkins which would require more – the application will not be able to start before being killed for exceeding the memory limit.</a:t>
-            </a:r>
-          </a:p>
-          <a:p>
-            <a:endParaRPr lang="en-US" dirty="0"/>
-          </a:p>
-          <a:p>
-            <a:r>
-              <a:rPr lang="en-US" dirty="0"/>
-              <a:t>Network policies control traffic within the cluster – details on next slide.</a:t>
-            </a:r>
-          </a:p>
-          <a:p>
-            <a:endParaRPr lang="en-US" dirty="0"/>
-          </a:p>
-          <a:p>
-            <a:r>
-              <a:rPr lang="en-US" dirty="0" err="1"/>
-              <a:t>PodSecurityPolicies</a:t>
-            </a:r>
-            <a:r>
-              <a:rPr lang="en-US" dirty="0"/>
-              <a:t> specify (security relevant) runtime conditions for pods. https://kubernetes.io/docs/concepts/policy/pod-security-policy/ </a:t>
-            </a:r>
-          </a:p>
-          <a:p>
             <a:endParaRPr lang="en-US" dirty="0"/>
           </a:p>
         </p:txBody>
@@ -937,18 +1070,18 @@
           <a:lstStyle/>
           <a:p>
             <a:fld id="{7D8C2C35-2B8A-446E-BEC0-FD36716C29AC}" type="slidenum">
-              <a:rPr lang="de-DE" smtClean="0"/>
+              <a:rPr lang="en-US" smtClean="0"/>
               <a:pPr/>
               <a:t>13</a:t>
             </a:fld>
-            <a:endParaRPr lang="de-DE" dirty="0"/>
+            <a:endParaRPr lang="en-US" dirty="0"/>
           </a:p>
         </p:txBody>
       </p:sp>
     </p:spTree>
     <p:extLst>
       <p:ext uri="{BB962C8B-B14F-4D97-AF65-F5344CB8AC3E}">
-        <p14:creationId xmlns:p14="http://schemas.microsoft.com/office/powerpoint/2010/main" val="3992989739"/>
+        <p14:creationId xmlns:p14="http://schemas.microsoft.com/office/powerpoint/2010/main" val="2873814892"/>
       </p:ext>
     </p:extLst>
   </p:cSld>
@@ -999,49 +1132,46 @@
         </p:nvSpPr>
         <p:spPr/>
         <p:txBody>
-          <a:bodyPr>
-            <a:normAutofit/>
-          </a:bodyPr>
+          <a:bodyPr/>
           <a:lstStyle/>
           <a:p>
             <a:r>
-              <a:rPr lang="en-US" noProof="0" dirty="0"/>
-              <a:t>Network policies are </a:t>
-            </a:r>
-            <a:r>
-              <a:rPr lang="en-US" noProof="0" dirty="0" err="1"/>
-              <a:t>kubernetes</a:t>
-            </a:r>
-            <a:r>
-              <a:rPr lang="en-US" noProof="0" dirty="0"/>
-              <a:t> object just as pods. The need an overlay network that supports the enforcement of their rules, like Calico. </a:t>
-            </a:r>
-          </a:p>
-          <a:p>
-            <a:r>
-              <a:rPr lang="en-US" noProof="0" dirty="0"/>
-              <a:t>Basically they define rules for incoming (ingress) and outgoing (egress) traffic to pods. As filter rules you can set IP addresses or use labels. Filter actions are deny or allow.</a:t>
-            </a:r>
-          </a:p>
-          <a:p>
-            <a:endParaRPr lang="en-US" noProof="0" dirty="0"/>
-          </a:p>
-          <a:p>
-            <a:r>
-              <a:rPr lang="en-US" noProof="0" dirty="0"/>
-              <a:t>In the example above, let’s assume princess Peach is at her castle (pod). She has created a service in order to be callable, but only as long as her location = castle. That works quite well, only that Bowser keeps calling her all the time. So Peach decides to allow only calls from Mario and puts a network policy in place. The policy filters incoming calls when she has her “location: castle” label and allows only those to pass, that have a label “caller: </a:t>
-            </a:r>
-            <a:r>
-              <a:rPr lang="en-US" noProof="0" dirty="0" err="1"/>
-              <a:t>mario</a:t>
-            </a:r>
-            <a:r>
-              <a:rPr lang="en-US" noProof="0" dirty="0"/>
-              <a:t>” attached. As a result Bowser is no longer able to call her.</a:t>
-            </a:r>
-          </a:p>
-          <a:p>
-            <a:endParaRPr lang="en-US" noProof="0" dirty="0"/>
+              <a:rPr lang="en-US" dirty="0"/>
+              <a:t>Resource Quota and </a:t>
+            </a:r>
+            <a:r>
+              <a:rPr lang="en-US" dirty="0" err="1"/>
+              <a:t>LimitRanges</a:t>
+            </a:r>
+            <a:r>
+              <a:rPr lang="en-US" dirty="0"/>
+              <a:t> can be used to control requested as well as actual resource consumption + # of k8s objects per namespace. Example: if the memory quota per pod is 200 MB and you want to start, let’s say a Jenkins which would require more – the application will not be able to start before being killed for exceeding the memory limit.</a:t>
+            </a:r>
+          </a:p>
+          <a:p>
+            <a:endParaRPr lang="en-US" dirty="0"/>
+          </a:p>
+          <a:p>
+            <a:r>
+              <a:rPr lang="en-US" dirty="0"/>
+              <a:t>Network policies control traffic within the cluster – details on next slide.</a:t>
+            </a:r>
+          </a:p>
+          <a:p>
+            <a:endParaRPr lang="en-US" dirty="0"/>
+          </a:p>
+          <a:p>
+            <a:r>
+              <a:rPr lang="en-US" dirty="0" err="1"/>
+              <a:t>PodSecurityPolicies</a:t>
+            </a:r>
+            <a:r>
+              <a:rPr lang="en-US" dirty="0"/>
+              <a:t> specify (security relevant) runtime conditions for pods. https://kubernetes.io/docs/concepts/policy/pod-security-policy/ </a:t>
+            </a:r>
+          </a:p>
+          <a:p>
+            <a:endParaRPr lang="en-US" dirty="0"/>
           </a:p>
         </p:txBody>
       </p:sp>
@@ -1061,18 +1191,18 @@
           <a:lstStyle/>
           <a:p>
             <a:fld id="{7D8C2C35-2B8A-446E-BEC0-FD36716C29AC}" type="slidenum">
-              <a:rPr lang="en-US" smtClean="0"/>
+              <a:rPr lang="de-DE" smtClean="0"/>
               <a:pPr/>
               <a:t>14</a:t>
             </a:fld>
-            <a:endParaRPr lang="en-US" dirty="0"/>
+            <a:endParaRPr lang="de-DE" dirty="0"/>
           </a:p>
         </p:txBody>
       </p:sp>
     </p:spTree>
     <p:extLst>
       <p:ext uri="{BB962C8B-B14F-4D97-AF65-F5344CB8AC3E}">
-        <p14:creationId xmlns:p14="http://schemas.microsoft.com/office/powerpoint/2010/main" val="325304950"/>
+        <p14:creationId xmlns:p14="http://schemas.microsoft.com/office/powerpoint/2010/main" val="3992989739"/>
       </p:ext>
     </p:extLst>
   </p:cSld>
@@ -1123,7 +1253,9 @@
         </p:nvSpPr>
         <p:spPr/>
         <p:txBody>
-          <a:bodyPr/>
+          <a:bodyPr>
+            <a:normAutofit/>
+          </a:bodyPr>
           <a:lstStyle/>
           <a:p>
             <a:r>
@@ -1146,229 +1278,24 @@
             </a:r>
           </a:p>
           <a:p>
+            <a:endParaRPr lang="en-US" noProof="0" dirty="0"/>
+          </a:p>
+          <a:p>
             <a:r>
               <a:rPr lang="en-US" noProof="0" dirty="0"/>
-              <a:t>In the example above, the network policy is enforced for access to “Pod A”, determined by its label and the corresponding selector.</a:t>
-            </a:r>
-          </a:p>
-          <a:p>
+              <a:t>In the example above, let’s assume princess Peach is at her castle (pod). She has created a service in order to be callable, but only as long as her location = castle. That works quite well, only that Bowser keeps calling her all the time. So Peach decides to allow only calls from Mario and puts a network policy in place. The policy filters incoming calls when she has her “location: castle” label and allows only those to pass, that have a label “caller: </a:t>
+            </a:r>
+            <a:r>
+              <a:rPr lang="en-US" noProof="0" dirty="0" err="1"/>
+              <a:t>mario</a:t>
+            </a:r>
             <a:r>
               <a:rPr lang="en-US" noProof="0" dirty="0"/>
-              <a:t>Pod B is allowed to access pod A since it has the correct label. Traffic from pod M will be blocked.</a:t>
-            </a:r>
-          </a:p>
-          <a:p>
-            <a:r>
-              <a:rPr lang="de-DE" dirty="0"/>
-              <a:t>Demo:</a:t>
-            </a:r>
-          </a:p>
-          <a:p>
-            <a:r>
-              <a:rPr lang="de-DE" dirty="0" err="1"/>
-              <a:t>kubectl</a:t>
-            </a:r>
-            <a:r>
-              <a:rPr lang="de-DE" dirty="0"/>
-              <a:t> </a:t>
-            </a:r>
-            <a:r>
-              <a:rPr lang="de-DE" dirty="0" err="1"/>
-              <a:t>run</a:t>
-            </a:r>
-            <a:r>
-              <a:rPr lang="de-DE" dirty="0"/>
-              <a:t> </a:t>
-            </a:r>
-            <a:r>
-              <a:rPr lang="de-DE" dirty="0" err="1"/>
-              <a:t>nginx</a:t>
-            </a:r>
-            <a:r>
-              <a:rPr lang="de-DE" dirty="0"/>
-              <a:t> --image</a:t>
-            </a:r>
-            <a:r>
-              <a:rPr lang="de-DE" b="1" dirty="0"/>
-              <a:t>=</a:t>
-            </a:r>
-            <a:r>
-              <a:rPr lang="de-DE" dirty="0" err="1"/>
-              <a:t>nginx</a:t>
-            </a:r>
-            <a:r>
-              <a:rPr lang="de-DE" dirty="0"/>
-              <a:t> --</a:t>
-            </a:r>
-            <a:r>
-              <a:rPr lang="de-DE" dirty="0" err="1"/>
-              <a:t>replicas</a:t>
-            </a:r>
-            <a:r>
-              <a:rPr lang="de-DE" b="1" dirty="0"/>
-              <a:t>=</a:t>
-            </a:r>
-            <a:r>
-              <a:rPr lang="de-DE" dirty="0"/>
-              <a:t>2 </a:t>
-            </a:r>
-          </a:p>
-          <a:p>
-            <a:r>
-              <a:rPr lang="de-DE" dirty="0" err="1"/>
-              <a:t>kubectl</a:t>
-            </a:r>
-            <a:r>
-              <a:rPr lang="de-DE" dirty="0"/>
-              <a:t> </a:t>
-            </a:r>
-            <a:r>
-              <a:rPr lang="de-DE" dirty="0" err="1"/>
-              <a:t>expose</a:t>
-            </a:r>
-            <a:r>
-              <a:rPr lang="de-DE" dirty="0"/>
-              <a:t> </a:t>
-            </a:r>
-            <a:r>
-              <a:rPr lang="de-DE" dirty="0" err="1"/>
-              <a:t>deployment</a:t>
-            </a:r>
-            <a:r>
-              <a:rPr lang="de-DE" dirty="0"/>
-              <a:t> </a:t>
-            </a:r>
-            <a:r>
-              <a:rPr lang="de-DE" dirty="0" err="1"/>
-              <a:t>nginx</a:t>
-            </a:r>
-            <a:r>
-              <a:rPr lang="de-DE" dirty="0"/>
-              <a:t> --</a:t>
-            </a:r>
-            <a:r>
-              <a:rPr lang="de-DE" dirty="0" err="1"/>
-              <a:t>port</a:t>
-            </a:r>
-            <a:r>
-              <a:rPr lang="de-DE" b="1" dirty="0"/>
-              <a:t>=</a:t>
-            </a:r>
-            <a:r>
-              <a:rPr lang="de-DE" dirty="0"/>
-              <a:t>80</a:t>
-            </a:r>
-          </a:p>
-          <a:p>
-            <a:r>
-              <a:rPr lang="de-DE" dirty="0" err="1"/>
-              <a:t>kubectl</a:t>
-            </a:r>
-            <a:r>
-              <a:rPr lang="de-DE" dirty="0"/>
-              <a:t> </a:t>
-            </a:r>
-            <a:r>
-              <a:rPr lang="de-DE" dirty="0" err="1"/>
-              <a:t>run</a:t>
-            </a:r>
-            <a:r>
-              <a:rPr lang="de-DE" dirty="0"/>
-              <a:t> </a:t>
-            </a:r>
-            <a:r>
-              <a:rPr lang="de-DE" dirty="0" err="1"/>
-              <a:t>busybox</a:t>
-            </a:r>
-            <a:r>
-              <a:rPr lang="de-DE" dirty="0"/>
-              <a:t> --</a:t>
-            </a:r>
-            <a:r>
-              <a:rPr lang="de-DE" dirty="0" err="1"/>
-              <a:t>rm</a:t>
-            </a:r>
-            <a:r>
-              <a:rPr lang="de-DE" dirty="0"/>
-              <a:t> -</a:t>
-            </a:r>
-            <a:r>
-              <a:rPr lang="de-DE" dirty="0" err="1"/>
-              <a:t>ti</a:t>
-            </a:r>
-            <a:r>
-              <a:rPr lang="de-DE" dirty="0"/>
-              <a:t> --image</a:t>
-            </a:r>
-            <a:r>
-              <a:rPr lang="de-DE" b="1" dirty="0"/>
-              <a:t>=</a:t>
-            </a:r>
-            <a:r>
-              <a:rPr lang="de-DE" dirty="0" err="1"/>
-              <a:t>busybox</a:t>
-            </a:r>
-            <a:r>
-              <a:rPr lang="de-DE" dirty="0"/>
-              <a:t> /bin/sh</a:t>
-            </a:r>
-          </a:p>
-          <a:p>
-            <a:r>
-              <a:rPr lang="de-DE" dirty="0"/>
-              <a:t> # </a:t>
-            </a:r>
-            <a:r>
-              <a:rPr lang="de-DE" dirty="0" err="1"/>
-              <a:t>wget</a:t>
-            </a:r>
-            <a:r>
-              <a:rPr lang="de-DE" dirty="0"/>
-              <a:t> --spider --timeout=1 </a:t>
-            </a:r>
-            <a:r>
-              <a:rPr lang="de-DE" dirty="0" err="1"/>
-              <a:t>nginx</a:t>
-            </a:r>
-            <a:endParaRPr lang="en-US" dirty="0"/>
-          </a:p>
-          <a:p>
-            <a:r>
-              <a:rPr lang="en-US" dirty="0" err="1"/>
-              <a:t>Kubectl</a:t>
-            </a:r>
-            <a:r>
-              <a:rPr lang="en-US" dirty="0"/>
-              <a:t> create –f network-</a:t>
-            </a:r>
-            <a:r>
-              <a:rPr lang="en-US" dirty="0" err="1"/>
-              <a:t>policy.yaml</a:t>
-            </a:r>
-            <a:endParaRPr lang="en-US" dirty="0"/>
-          </a:p>
-          <a:p>
-            <a:r>
-              <a:rPr lang="en-US" dirty="0" err="1"/>
-              <a:t>Kubectl</a:t>
-            </a:r>
-            <a:r>
-              <a:rPr lang="en-US" dirty="0"/>
-              <a:t> run ..</a:t>
-            </a:r>
-          </a:p>
-          <a:p>
-            <a:r>
-              <a:rPr lang="en-US" dirty="0" err="1"/>
-              <a:t>Kubectl</a:t>
-            </a:r>
-            <a:r>
-              <a:rPr lang="en-US" dirty="0"/>
-              <a:t> run … -l access=true</a:t>
-            </a:r>
-          </a:p>
-          <a:p>
-            <a:endParaRPr lang="en-US" dirty="0"/>
+              <a:t>” attached. As a result Bowser is no longer able to call her.</a:t>
+            </a:r>
+          </a:p>
+          <a:p>
+            <a:endParaRPr lang="en-US" noProof="0" dirty="0"/>
           </a:p>
         </p:txBody>
       </p:sp>
@@ -1399,7 +1326,7 @@
     </p:spTree>
     <p:extLst>
       <p:ext uri="{BB962C8B-B14F-4D97-AF65-F5344CB8AC3E}">
-        <p14:creationId xmlns:p14="http://schemas.microsoft.com/office/powerpoint/2010/main" val="3747275599"/>
+        <p14:creationId xmlns:p14="http://schemas.microsoft.com/office/powerpoint/2010/main" val="325304950"/>
       </p:ext>
     </p:extLst>
   </p:cSld>
@@ -1450,10 +1377,40 @@
         </p:nvSpPr>
         <p:spPr/>
         <p:txBody>
-          <a:bodyPr>
-            <a:normAutofit fontScale="92500" lnSpcReduction="20000"/>
-          </a:bodyPr>
+          <a:bodyPr/>
           <a:lstStyle/>
+          <a:p>
+            <a:r>
+              <a:rPr lang="en-US" noProof="0" dirty="0"/>
+              <a:t>Network policies are </a:t>
+            </a:r>
+            <a:r>
+              <a:rPr lang="en-US" noProof="0" dirty="0" err="1"/>
+              <a:t>kubernetes</a:t>
+            </a:r>
+            <a:r>
+              <a:rPr lang="en-US" noProof="0" dirty="0"/>
+              <a:t> object just as pods. The need an overlay network that supports the enforcement of their rules, like Calico. </a:t>
+            </a:r>
+          </a:p>
+          <a:p>
+            <a:r>
+              <a:rPr lang="en-US" noProof="0" dirty="0"/>
+              <a:t>Basically they define rules for incoming (ingress) and outgoing (egress) traffic to pods. As filter rules you can set IP addresses or use labels. Filter actions are deny or allow.</a:t>
+            </a:r>
+          </a:p>
+          <a:p>
+            <a:r>
+              <a:rPr lang="en-US" noProof="0" dirty="0"/>
+              <a:t>In the example above, the network policy is enforced for access to “Pod A”, determined by its label and the corresponding selector.</a:t>
+            </a:r>
+          </a:p>
+          <a:p>
+            <a:r>
+              <a:rPr lang="en-US" noProof="0" dirty="0"/>
+              <a:t>Pod B is allowed to access pod A since it has the correct label. Traffic from pod M will be blocked.</a:t>
+            </a:r>
+          </a:p>
           <a:p>
             <a:r>
               <a:rPr lang="de-DE" dirty="0"/>
@@ -1461,13 +1418,71 @@
             </a:r>
           </a:p>
           <a:p>
-            <a:pPr marL="285750" indent="-285750">
-              <a:buFont typeface="Symbol" panose="05050102010706020507" pitchFamily="18" charset="2"/>
-              <a:buChar char="-"/>
-            </a:pPr>
+            <a:r>
+              <a:rPr lang="de-DE" dirty="0" err="1"/>
+              <a:t>kubectl</a:t>
+            </a:r>
             <a:r>
               <a:rPr lang="de-DE" dirty="0"/>
-              <a:t>Create a </a:t>
+              <a:t> </a:t>
+            </a:r>
+            <a:r>
+              <a:rPr lang="de-DE" dirty="0" err="1"/>
+              <a:t>run</a:t>
+            </a:r>
+            <a:r>
+              <a:rPr lang="de-DE" dirty="0"/>
+              <a:t> </a:t>
+            </a:r>
+            <a:r>
+              <a:rPr lang="de-DE" dirty="0" err="1"/>
+              <a:t>nginx</a:t>
+            </a:r>
+            <a:r>
+              <a:rPr lang="de-DE" dirty="0"/>
+              <a:t> --image</a:t>
+            </a:r>
+            <a:r>
+              <a:rPr lang="de-DE" b="1" dirty="0"/>
+              <a:t>=</a:t>
+            </a:r>
+            <a:r>
+              <a:rPr lang="de-DE" dirty="0" err="1"/>
+              <a:t>nginx</a:t>
+            </a:r>
+            <a:r>
+              <a:rPr lang="de-DE" dirty="0"/>
+              <a:t> --</a:t>
+            </a:r>
+            <a:r>
+              <a:rPr lang="de-DE" dirty="0" err="1"/>
+              <a:t>replicas</a:t>
+            </a:r>
+            <a:r>
+              <a:rPr lang="de-DE" b="1" dirty="0"/>
+              <a:t>=</a:t>
+            </a:r>
+            <a:r>
+              <a:rPr lang="de-DE" dirty="0"/>
+              <a:t>2 </a:t>
+            </a:r>
+          </a:p>
+          <a:p>
+            <a:r>
+              <a:rPr lang="de-DE" dirty="0" err="1"/>
+              <a:t>kubectl</a:t>
+            </a:r>
+            <a:r>
+              <a:rPr lang="de-DE" dirty="0"/>
+              <a:t> </a:t>
+            </a:r>
+            <a:r>
+              <a:rPr lang="de-DE" dirty="0" err="1"/>
+              <a:t>expose</a:t>
+            </a:r>
+            <a:r>
+              <a:rPr lang="de-DE" dirty="0"/>
+              <a:t> </a:t>
             </a:r>
             <a:r>
               <a:rPr lang="de-DE" dirty="0" err="1"/>
@@ -1475,11 +1490,33 @@
             </a:r>
             <a:r>
               <a:rPr lang="de-DE" dirty="0"/>
-              <a:t> &amp; a </a:t>
+              <a:t> </a:t>
             </a:r>
             <a:r>
               <a:rPr lang="de-DE" dirty="0" err="1"/>
-              <a:t>corresponding</a:t>
+              <a:t>nginx</a:t>
+            </a:r>
+            <a:r>
+              <a:rPr lang="de-DE" dirty="0"/>
+              <a:t> --</a:t>
+            </a:r>
+            <a:r>
+              <a:rPr lang="de-DE" dirty="0" err="1"/>
+              <a:t>port</a:t>
+            </a:r>
+            <a:r>
+              <a:rPr lang="de-DE" b="1" dirty="0"/>
+              <a:t>=</a:t>
+            </a:r>
+            <a:r>
+              <a:rPr lang="de-DE" dirty="0"/>
+              <a:t>80</a:t>
+            </a:r>
+          </a:p>
+          <a:p>
+            <a:r>
+              <a:rPr lang="de-DE" dirty="0" err="1"/>
+              <a:t>kubectl</a:t>
             </a:r>
             <a:r>
               <a:rPr lang="de-DE" dirty="0"/>
@@ -1487,23 +1524,7 @@
             </a:r>
             <a:r>
               <a:rPr lang="de-DE" dirty="0" err="1"/>
-              <a:t>service</a:t>
-            </a:r>
-            <a:r>
-              <a:rPr lang="de-DE" dirty="0"/>
-              <a:t> (</a:t>
-            </a:r>
-            <a:r>
-              <a:rPr lang="de-DE" dirty="0" err="1"/>
-              <a:t>if</a:t>
-            </a:r>
-            <a:r>
-              <a:rPr lang="de-DE" dirty="0"/>
-              <a:t> not </a:t>
-            </a:r>
-            <a:r>
-              <a:rPr lang="de-DE" dirty="0" err="1"/>
-              <a:t>yet</a:t>
+              <a:t>run</a:t>
             </a:r>
             <a:r>
               <a:rPr lang="de-DE" dirty="0"/>
@@ -1511,350 +1532,64 @@
             </a:r>
             <a:r>
               <a:rPr lang="de-DE" dirty="0" err="1"/>
-              <a:t>done</a:t>
+              <a:t>busybox</a:t>
             </a:r>
             <a:r>
               <a:rPr lang="de-DE" dirty="0"/>
-              <a:t>)</a:t>
-            </a:r>
-          </a:p>
-          <a:p>
-            <a:pPr marL="465750" lvl="1" indent="-285750">
-              <a:buFont typeface="Symbol" panose="05050102010706020507" pitchFamily="18" charset="2"/>
-              <a:buChar char="-"/>
-            </a:pPr>
+              <a:t> --</a:t>
+            </a:r>
             <a:r>
               <a:rPr lang="de-DE" dirty="0" err="1"/>
-              <a:t>kubectl</a:t>
+              <a:t>rm</a:t>
             </a:r>
             <a:r>
               <a:rPr lang="de-DE" dirty="0"/>
-              <a:t> </a:t>
+              <a:t> -</a:t>
             </a:r>
             <a:r>
               <a:rPr lang="de-DE" dirty="0" err="1"/>
-              <a:t>run</a:t>
+              <a:t>ti</a:t>
             </a:r>
             <a:r>
               <a:rPr lang="de-DE" dirty="0"/>
-              <a:t> </a:t>
+              <a:t> --image</a:t>
+            </a:r>
+            <a:r>
+              <a:rPr lang="de-DE" b="1" dirty="0"/>
+              <a:t>=</a:t>
+            </a:r>
+            <a:r>
+              <a:rPr lang="de-DE" dirty="0" err="1"/>
+              <a:t>busybox</a:t>
+            </a:r>
+            <a:r>
+              <a:rPr lang="de-DE" dirty="0"/>
+              <a:t> /bin/sh</a:t>
+            </a:r>
+          </a:p>
+          <a:p>
+            <a:r>
+              <a:rPr lang="de-DE" dirty="0"/>
+              <a:t> # </a:t>
+            </a:r>
+            <a:r>
+              <a:rPr lang="de-DE" dirty="0" err="1"/>
+              <a:t>wget</a:t>
+            </a:r>
+            <a:r>
+              <a:rPr lang="de-DE" dirty="0"/>
+              <a:t> --spider --timeout=1 </a:t>
             </a:r>
             <a:r>
               <a:rPr lang="de-DE" dirty="0" err="1"/>
               <a:t>nginx</a:t>
             </a:r>
-            <a:r>
-              <a:rPr lang="de-DE" dirty="0"/>
-              <a:t> --image</a:t>
-            </a:r>
-            <a:r>
-              <a:rPr lang="de-DE" b="1" dirty="0"/>
-              <a:t>=</a:t>
-            </a:r>
-            <a:r>
-              <a:rPr lang="de-DE" dirty="0" err="1"/>
-              <a:t>nginx</a:t>
-            </a:r>
-            <a:r>
-              <a:rPr lang="de-DE" dirty="0"/>
-              <a:t> --</a:t>
-            </a:r>
-            <a:r>
-              <a:rPr lang="de-DE" dirty="0" err="1"/>
-              <a:t>replicas</a:t>
-            </a:r>
-            <a:r>
-              <a:rPr lang="de-DE" b="1" dirty="0"/>
-              <a:t>=</a:t>
-            </a:r>
-            <a:r>
-              <a:rPr lang="de-DE" dirty="0"/>
-              <a:t>2 </a:t>
-            </a:r>
-          </a:p>
-          <a:p>
-            <a:pPr marL="465750" lvl="1" indent="-285750">
-              <a:buFont typeface="Symbol" panose="05050102010706020507" pitchFamily="18" charset="2"/>
-              <a:buChar char="-"/>
-            </a:pPr>
-            <a:r>
-              <a:rPr lang="de-DE" dirty="0" err="1"/>
-              <a:t>kubectl</a:t>
-            </a:r>
-            <a:r>
-              <a:rPr lang="de-DE" dirty="0"/>
-              <a:t> </a:t>
-            </a:r>
-            <a:r>
-              <a:rPr lang="de-DE" dirty="0" err="1"/>
-              <a:t>expose</a:t>
-            </a:r>
-            <a:r>
-              <a:rPr lang="de-DE" dirty="0"/>
-              <a:t> </a:t>
-            </a:r>
-            <a:r>
-              <a:rPr lang="de-DE" dirty="0" err="1"/>
-              <a:t>deployment</a:t>
-            </a:r>
-            <a:r>
-              <a:rPr lang="de-DE" dirty="0"/>
-              <a:t> </a:t>
-            </a:r>
-            <a:r>
-              <a:rPr lang="de-DE" dirty="0" err="1"/>
-              <a:t>nginx</a:t>
-            </a:r>
-            <a:r>
-              <a:rPr lang="de-DE" dirty="0"/>
-              <a:t> --</a:t>
-            </a:r>
-            <a:r>
-              <a:rPr lang="de-DE" dirty="0" err="1"/>
-              <a:t>port</a:t>
-            </a:r>
-            <a:r>
-              <a:rPr lang="de-DE" b="1" dirty="0"/>
-              <a:t>=</a:t>
-            </a:r>
-            <a:r>
-              <a:rPr lang="de-DE" dirty="0"/>
-              <a:t>80</a:t>
-            </a:r>
-          </a:p>
-          <a:p>
-            <a:pPr marL="285750" indent="-285750">
-              <a:buFont typeface="Symbol" panose="05050102010706020507" pitchFamily="18" charset="2"/>
-              <a:buChar char="-"/>
-            </a:pPr>
-            <a:endParaRPr lang="de-DE" dirty="0"/>
-          </a:p>
-          <a:p>
-            <a:pPr marL="285750" indent="-285750">
-              <a:buFont typeface="Symbol" panose="05050102010706020507" pitchFamily="18" charset="2"/>
-              <a:buChar char="-"/>
-            </a:pPr>
-            <a:r>
-              <a:rPr lang="de-DE" dirty="0"/>
-              <a:t>Create a </a:t>
-            </a:r>
-            <a:r>
-              <a:rPr lang="de-DE" dirty="0" err="1"/>
-              <a:t>helper</a:t>
-            </a:r>
-            <a:r>
-              <a:rPr lang="de-DE" dirty="0"/>
-              <a:t> </a:t>
-            </a:r>
-            <a:r>
-              <a:rPr lang="de-DE" dirty="0" err="1"/>
-              <a:t>pod</a:t>
-            </a:r>
-            <a:r>
-              <a:rPr lang="de-DE" dirty="0"/>
-              <a:t>, </a:t>
-            </a:r>
-            <a:r>
-              <a:rPr lang="de-DE" dirty="0" err="1"/>
-              <a:t>logon</a:t>
-            </a:r>
-            <a:r>
-              <a:rPr lang="de-DE" dirty="0"/>
-              <a:t> </a:t>
-            </a:r>
-            <a:r>
-              <a:rPr lang="de-DE" dirty="0" err="1"/>
-              <a:t>to</a:t>
-            </a:r>
-            <a:r>
-              <a:rPr lang="de-DE" dirty="0"/>
-              <a:t> </a:t>
-            </a:r>
-            <a:r>
-              <a:rPr lang="de-DE" dirty="0" err="1"/>
-              <a:t>it</a:t>
-            </a:r>
-            <a:r>
-              <a:rPr lang="de-DE" dirty="0"/>
-              <a:t> and </a:t>
-            </a:r>
-            <a:r>
-              <a:rPr lang="de-DE" dirty="0" err="1"/>
-              <a:t>get</a:t>
-            </a:r>
-            <a:r>
-              <a:rPr lang="de-DE" dirty="0"/>
-              <a:t> </a:t>
-            </a:r>
-            <a:r>
-              <a:rPr lang="de-DE" dirty="0" err="1"/>
-              <a:t>the</a:t>
-            </a:r>
-            <a:r>
-              <a:rPr lang="de-DE" dirty="0"/>
-              <a:t> index.html </a:t>
-            </a:r>
-            <a:r>
-              <a:rPr lang="de-DE" dirty="0" err="1"/>
-              <a:t>page</a:t>
-            </a:r>
-            <a:r>
-              <a:rPr lang="de-DE" dirty="0"/>
-              <a:t> </a:t>
-            </a:r>
-            <a:r>
-              <a:rPr lang="de-DE" dirty="0" err="1"/>
-              <a:t>from</a:t>
-            </a:r>
-            <a:r>
-              <a:rPr lang="de-DE" dirty="0"/>
-              <a:t> </a:t>
-            </a:r>
-            <a:r>
-              <a:rPr lang="de-DE" dirty="0" err="1"/>
-              <a:t>the</a:t>
-            </a:r>
-            <a:r>
-              <a:rPr lang="de-DE" dirty="0"/>
-              <a:t> </a:t>
-            </a:r>
-            <a:r>
-              <a:rPr lang="de-DE" dirty="0" err="1"/>
-              <a:t>nginx</a:t>
-            </a:r>
-            <a:r>
-              <a:rPr lang="de-DE" dirty="0"/>
-              <a:t> backend.</a:t>
-            </a:r>
-          </a:p>
-          <a:p>
-            <a:pPr marL="465750" lvl="1" indent="-285750">
-              <a:buFont typeface="Symbol" panose="05050102010706020507" pitchFamily="18" charset="2"/>
-              <a:buChar char="-"/>
-            </a:pPr>
-            <a:r>
-              <a:rPr lang="de-DE" dirty="0" err="1"/>
-              <a:t>kubectl</a:t>
-            </a:r>
-            <a:r>
-              <a:rPr lang="de-DE" dirty="0"/>
-              <a:t> </a:t>
-            </a:r>
-            <a:r>
-              <a:rPr lang="de-DE" dirty="0" err="1"/>
-              <a:t>run</a:t>
-            </a:r>
-            <a:r>
-              <a:rPr lang="de-DE" dirty="0"/>
-              <a:t> </a:t>
-            </a:r>
-            <a:r>
-              <a:rPr lang="de-DE" dirty="0" err="1"/>
-              <a:t>connector</a:t>
-            </a:r>
-            <a:r>
-              <a:rPr lang="de-DE" dirty="0"/>
-              <a:t> --</a:t>
-            </a:r>
-            <a:r>
-              <a:rPr lang="de-DE" dirty="0" err="1"/>
-              <a:t>rm</a:t>
-            </a:r>
-            <a:r>
-              <a:rPr lang="de-DE" dirty="0"/>
-              <a:t> -</a:t>
-            </a:r>
-            <a:r>
-              <a:rPr lang="de-DE" dirty="0" err="1"/>
-              <a:t>ti</a:t>
-            </a:r>
-            <a:r>
-              <a:rPr lang="de-DE" dirty="0"/>
-              <a:t> --</a:t>
-            </a:r>
-            <a:r>
-              <a:rPr lang="de-DE" dirty="0" err="1"/>
-              <a:t>restart</a:t>
-            </a:r>
-            <a:r>
-              <a:rPr lang="de-DE" dirty="0"/>
-              <a:t>=Never --image</a:t>
-            </a:r>
-            <a:r>
-              <a:rPr lang="de-DE" b="1" dirty="0"/>
-              <a:t>=</a:t>
-            </a:r>
-            <a:r>
-              <a:rPr lang="de-DE" dirty="0"/>
-              <a:t>alpine:3.8</a:t>
-            </a:r>
-          </a:p>
-          <a:p>
-            <a:pPr marL="465750" lvl="1" indent="-285750">
-              <a:buFont typeface="Symbol" panose="05050102010706020507" pitchFamily="18" charset="2"/>
-              <a:buChar char="-"/>
-            </a:pPr>
-            <a:r>
-              <a:rPr lang="de-DE" dirty="0"/>
-              <a:t># </a:t>
-            </a:r>
-            <a:r>
-              <a:rPr lang="de-DE" dirty="0" err="1"/>
-              <a:t>wget</a:t>
-            </a:r>
-            <a:r>
-              <a:rPr lang="de-DE" dirty="0"/>
-              <a:t> --timeout=1 </a:t>
-            </a:r>
-            <a:r>
-              <a:rPr lang="de-DE" dirty="0" err="1"/>
-              <a:t>nginx</a:t>
-            </a:r>
-            <a:endParaRPr lang="de-DE" dirty="0"/>
-          </a:p>
-          <a:p>
-            <a:pPr marL="465750" lvl="1" indent="-285750">
-              <a:buFont typeface="Symbol" panose="05050102010706020507" pitchFamily="18" charset="2"/>
-              <a:buChar char="-"/>
-            </a:pPr>
-            <a:r>
-              <a:rPr lang="en-US" dirty="0"/>
-              <a:t>Remove the index.html page &amp; stay connected to the shell session</a:t>
-            </a:r>
-          </a:p>
-          <a:p>
-            <a:pPr marL="285750" indent="-285750">
-              <a:buFont typeface="Symbol" panose="05050102010706020507" pitchFamily="18" charset="2"/>
-              <a:buChar char="-"/>
-            </a:pPr>
             <a:endParaRPr lang="en-US" dirty="0"/>
           </a:p>
           <a:p>
-            <a:pPr marL="285750" indent="-285750">
-              <a:buFont typeface="Symbol" panose="05050102010706020507" pitchFamily="18" charset="2"/>
-              <a:buChar char="-"/>
-            </a:pPr>
-            <a:r>
-              <a:rPr lang="en-US" dirty="0"/>
-              <a:t>Create the network policy in a 2</a:t>
-            </a:r>
-            <a:r>
-              <a:rPr lang="en-US" baseline="30000" dirty="0"/>
-              <a:t>nd</a:t>
-            </a:r>
-            <a:r>
-              <a:rPr lang="en-US" dirty="0"/>
-              <a:t> shell:</a:t>
-            </a:r>
-          </a:p>
-          <a:p>
-            <a:pPr marL="465750" lvl="1" indent="-285750">
-              <a:buFont typeface="Symbol" panose="05050102010706020507" pitchFamily="18" charset="2"/>
-              <a:buChar char="-"/>
-            </a:pPr>
             <a:r>
               <a:rPr lang="en-US" dirty="0" err="1"/>
-              <a:t>kubectl</a:t>
+              <a:t>Kubectl</a:t>
             </a:r>
             <a:r>
               <a:rPr lang="en-US" dirty="0"/>
@@ -1867,162 +1602,26 @@
             <a:endParaRPr lang="en-US" dirty="0"/>
           </a:p>
           <a:p>
-            <a:pPr marL="465750" lvl="1" indent="-285750">
-              <a:buFont typeface="Symbol" panose="05050102010706020507" pitchFamily="18" charset="2"/>
-              <a:buChar char="-"/>
-            </a:pPr>
+            <a:r>
+              <a:rPr lang="en-US" dirty="0" err="1"/>
+              <a:t>Kubectl</a:t>
+            </a:r>
             <a:r>
               <a:rPr lang="en-US" dirty="0"/>
-              <a:t>Show the network policy definition and explain:</a:t>
-            </a:r>
-          </a:p>
-          <a:p>
-            <a:pPr marL="645750" lvl="2" indent="-285750">
-              <a:buFont typeface="Symbol" panose="05050102010706020507" pitchFamily="18" charset="2"/>
-              <a:buChar char="-"/>
-            </a:pPr>
+              <a:t> run ..</a:t>
+            </a:r>
+          </a:p>
+          <a:p>
+            <a:r>
+              <a:rPr lang="en-US" dirty="0" err="1"/>
+              <a:t>Kubectl</a:t>
+            </a:r>
             <a:r>
               <a:rPr lang="en-US" dirty="0"/>
-              <a:t>it’s implicitly a whitelisting</a:t>
-            </a:r>
-          </a:p>
-          <a:p>
-            <a:pPr marL="645750" lvl="2" indent="-285750">
-              <a:buFont typeface="Symbol" panose="05050102010706020507" pitchFamily="18" charset="2"/>
-              <a:buChar char="-"/>
-            </a:pPr>
-            <a:r>
-              <a:rPr lang="en-US" dirty="0"/>
-              <a:t>network policy can handle egress and ingress traffic. However the example is only of incoming (ingress) traffic.</a:t>
-            </a:r>
-          </a:p>
-          <a:p>
-            <a:pPr marL="645750" lvl="2" indent="-285750">
-              <a:buFont typeface="Symbol" panose="05050102010706020507" pitchFamily="18" charset="2"/>
-              <a:buChar char="-"/>
-            </a:pPr>
-            <a:r>
-              <a:rPr lang="en-US" dirty="0"/>
-              <a:t>The </a:t>
-            </a:r>
-            <a:r>
-              <a:rPr lang="en-US" dirty="0" err="1"/>
-              <a:t>cidr</a:t>
-            </a:r>
-            <a:r>
-              <a:rPr lang="en-US" dirty="0"/>
-              <a:t> block are required, if you want to access your service later from SAP networks. Otherwise all requested without the label (i.e. not cluster internal) will be blocked too.</a:t>
-            </a:r>
-          </a:p>
-          <a:p>
-            <a:pPr marL="465750" lvl="1" indent="-285750">
-              <a:buFont typeface="Symbol" panose="05050102010706020507" pitchFamily="18" charset="2"/>
-              <a:buChar char="-"/>
-            </a:pPr>
-            <a:endParaRPr lang="en-US" dirty="0"/>
-          </a:p>
-          <a:p>
-            <a:pPr marL="285750" indent="-285750">
-              <a:buFont typeface="Symbol" panose="05050102010706020507" pitchFamily="18" charset="2"/>
-              <a:buChar char="-"/>
-            </a:pPr>
-            <a:r>
-              <a:rPr lang="en-US" dirty="0"/>
-              <a:t>Switch back to the helper pod and re-run the </a:t>
-            </a:r>
-            <a:r>
-              <a:rPr lang="en-US" dirty="0" err="1"/>
-              <a:t>wget</a:t>
-            </a:r>
-            <a:r>
-              <a:rPr lang="en-US" dirty="0"/>
-              <a:t> command </a:t>
-            </a:r>
-            <a:r>
-              <a:rPr lang="en-US" dirty="0">
-                <a:sym typeface="Wingdings" panose="05000000000000000000" pitchFamily="2" charset="2"/>
-              </a:rPr>
-              <a:t> expected result: failure due to the missing label</a:t>
-            </a:r>
-            <a:endParaRPr lang="en-US" dirty="0"/>
-          </a:p>
-          <a:p>
-            <a:pPr marL="285750" indent="-285750">
-              <a:buFont typeface="Symbol" panose="05050102010706020507" pitchFamily="18" charset="2"/>
-              <a:buChar char="-"/>
-            </a:pPr>
-            <a:r>
-              <a:rPr lang="en-US" dirty="0"/>
-              <a:t>Label you helper pod accordingly (can be done from the 2</a:t>
-            </a:r>
-            <a:r>
-              <a:rPr lang="en-US" baseline="30000" dirty="0"/>
-              <a:t>nd</a:t>
-            </a:r>
-            <a:r>
-              <a:rPr lang="en-US" dirty="0"/>
-              <a:t> shell session, so stay connected to your helper pod)</a:t>
-            </a:r>
-          </a:p>
-          <a:p>
-            <a:pPr marL="465750" lvl="1" indent="-285750">
-              <a:buFont typeface="Symbol" panose="05050102010706020507" pitchFamily="18" charset="2"/>
-              <a:buChar char="-"/>
-            </a:pPr>
-            <a:r>
-              <a:rPr lang="en-US" dirty="0" err="1"/>
-              <a:t>kubectl</a:t>
-            </a:r>
-            <a:r>
-              <a:rPr lang="en-US" dirty="0"/>
-              <a:t> label pod connector access=true</a:t>
-            </a:r>
-          </a:p>
-          <a:p>
-            <a:pPr marL="285750" lvl="0" indent="-285750">
-              <a:buFont typeface="Symbol" panose="05050102010706020507" pitchFamily="18" charset="2"/>
-              <a:buChar char="-"/>
-            </a:pPr>
-            <a:endParaRPr lang="en-US" dirty="0"/>
-          </a:p>
-          <a:p>
-            <a:pPr marL="285750" lvl="0" indent="-285750">
-              <a:buFont typeface="Symbol" panose="05050102010706020507" pitchFamily="18" charset="2"/>
-              <a:buChar char="-"/>
-            </a:pPr>
-            <a:r>
-              <a:rPr lang="en-US" dirty="0"/>
-              <a:t>Re-run the </a:t>
-            </a:r>
-            <a:r>
-              <a:rPr lang="en-US" dirty="0" err="1"/>
-              <a:t>wget</a:t>
-            </a:r>
-            <a:r>
-              <a:rPr lang="en-US" dirty="0"/>
-              <a:t> command </a:t>
-            </a:r>
-            <a:r>
-              <a:rPr lang="en-US" dirty="0">
-                <a:sym typeface="Wingdings" panose="05000000000000000000" pitchFamily="2" charset="2"/>
-              </a:rPr>
-              <a:t> expected result: works again</a:t>
-            </a:r>
-          </a:p>
-          <a:p>
-            <a:pPr marL="285750" lvl="0" indent="-285750">
-              <a:buFont typeface="Symbol" panose="05050102010706020507" pitchFamily="18" charset="2"/>
-              <a:buChar char="-"/>
-            </a:pPr>
-            <a:endParaRPr lang="en-US" dirty="0">
-              <a:sym typeface="Wingdings" panose="05000000000000000000" pitchFamily="2" charset="2"/>
-            </a:endParaRPr>
-          </a:p>
-          <a:p>
-            <a:pPr marL="0" lvl="0" indent="0">
-              <a:buFont typeface="Symbol" panose="05050102010706020507" pitchFamily="18" charset="2"/>
-              <a:buNone/>
-            </a:pPr>
+              <a:t> run … -l access=true</a:t>
+            </a:r>
+          </a:p>
+          <a:p>
             <a:endParaRPr lang="en-US" dirty="0"/>
           </a:p>
         </p:txBody>
@@ -2043,18 +1642,18 @@
           <a:lstStyle/>
           <a:p>
             <a:fld id="{7D8C2C35-2B8A-446E-BEC0-FD36716C29AC}" type="slidenum">
-              <a:rPr lang="de-DE" smtClean="0"/>
+              <a:rPr lang="en-US" smtClean="0"/>
               <a:pPr/>
               <a:t>16</a:t>
             </a:fld>
-            <a:endParaRPr lang="de-DE" dirty="0"/>
+            <a:endParaRPr lang="en-US" dirty="0"/>
           </a:p>
         </p:txBody>
       </p:sp>
     </p:spTree>
     <p:extLst>
       <p:ext uri="{BB962C8B-B14F-4D97-AF65-F5344CB8AC3E}">
-        <p14:creationId xmlns:p14="http://schemas.microsoft.com/office/powerpoint/2010/main" val="2053658473"/>
+        <p14:creationId xmlns:p14="http://schemas.microsoft.com/office/powerpoint/2010/main" val="3747275599"/>
       </p:ext>
     </p:extLst>
   </p:cSld>
@@ -2105,9 +1704,579 @@
         </p:nvSpPr>
         <p:spPr/>
         <p:txBody>
-          <a:bodyPr/>
+          <a:bodyPr>
+            <a:normAutofit fontScale="92500" lnSpcReduction="20000"/>
+          </a:bodyPr>
           <a:lstStyle/>
           <a:p>
+            <a:r>
+              <a:rPr lang="de-DE" dirty="0"/>
+              <a:t>Demo:</a:t>
+            </a:r>
+          </a:p>
+          <a:p>
+            <a:pPr marL="285750" indent="-285750">
+              <a:buFont typeface="Symbol" panose="05050102010706020507" pitchFamily="18" charset="2"/>
+              <a:buChar char="-"/>
+            </a:pPr>
+            <a:r>
+              <a:rPr lang="de-DE" dirty="0"/>
+              <a:t>Create a </a:t>
+            </a:r>
+            <a:r>
+              <a:rPr lang="de-DE" dirty="0" err="1"/>
+              <a:t>deployment</a:t>
+            </a:r>
+            <a:r>
+              <a:rPr lang="de-DE" dirty="0"/>
+              <a:t> &amp; a </a:t>
+            </a:r>
+            <a:r>
+              <a:rPr lang="de-DE" dirty="0" err="1"/>
+              <a:t>corresponding</a:t>
+            </a:r>
+            <a:r>
+              <a:rPr lang="de-DE" dirty="0"/>
+              <a:t> </a:t>
+            </a:r>
+            <a:r>
+              <a:rPr lang="de-DE" dirty="0" err="1"/>
+              <a:t>service</a:t>
+            </a:r>
+            <a:r>
+              <a:rPr lang="de-DE" dirty="0"/>
+              <a:t> (</a:t>
+            </a:r>
+            <a:r>
+              <a:rPr lang="de-DE" dirty="0" err="1"/>
+              <a:t>if</a:t>
+            </a:r>
+            <a:r>
+              <a:rPr lang="de-DE" dirty="0"/>
+              <a:t> not </a:t>
+            </a:r>
+            <a:r>
+              <a:rPr lang="de-DE" dirty="0" err="1"/>
+              <a:t>yet</a:t>
+            </a:r>
+            <a:r>
+              <a:rPr lang="de-DE" dirty="0"/>
+              <a:t> </a:t>
+            </a:r>
+            <a:r>
+              <a:rPr lang="de-DE" dirty="0" err="1"/>
+              <a:t>done</a:t>
+            </a:r>
+            <a:r>
+              <a:rPr lang="de-DE" dirty="0"/>
+              <a:t>)</a:t>
+            </a:r>
+          </a:p>
+          <a:p>
+            <a:pPr marL="465750" lvl="1" indent="-285750">
+              <a:buFont typeface="Symbol" panose="05050102010706020507" pitchFamily="18" charset="2"/>
+              <a:buChar char="-"/>
+            </a:pPr>
+            <a:r>
+              <a:rPr lang="de-DE" dirty="0" err="1"/>
+              <a:t>kubectl</a:t>
+            </a:r>
+            <a:r>
+              <a:rPr lang="de-DE" dirty="0"/>
+              <a:t> </a:t>
+            </a:r>
+            <a:r>
+              <a:rPr lang="de-DE" dirty="0" err="1"/>
+              <a:t>run</a:t>
+            </a:r>
+            <a:r>
+              <a:rPr lang="de-DE" dirty="0"/>
+              <a:t> </a:t>
+            </a:r>
+            <a:r>
+              <a:rPr lang="de-DE" dirty="0" err="1"/>
+              <a:t>nginx</a:t>
+            </a:r>
+            <a:r>
+              <a:rPr lang="de-DE" dirty="0"/>
+              <a:t> --image</a:t>
+            </a:r>
+            <a:r>
+              <a:rPr lang="de-DE" b="1" dirty="0"/>
+              <a:t>=</a:t>
+            </a:r>
+            <a:r>
+              <a:rPr lang="de-DE" dirty="0" err="1"/>
+              <a:t>nginx</a:t>
+            </a:r>
+            <a:r>
+              <a:rPr lang="de-DE" dirty="0"/>
+              <a:t> --</a:t>
+            </a:r>
+            <a:r>
+              <a:rPr lang="de-DE" dirty="0" err="1"/>
+              <a:t>replicas</a:t>
+            </a:r>
+            <a:r>
+              <a:rPr lang="de-DE" b="1" dirty="0"/>
+              <a:t>=</a:t>
+            </a:r>
+            <a:r>
+              <a:rPr lang="de-DE" dirty="0"/>
+              <a:t>2 </a:t>
+            </a:r>
+          </a:p>
+          <a:p>
+            <a:pPr marL="465750" lvl="1" indent="-285750">
+              <a:buFont typeface="Symbol" panose="05050102010706020507" pitchFamily="18" charset="2"/>
+              <a:buChar char="-"/>
+            </a:pPr>
+            <a:r>
+              <a:rPr lang="de-DE" dirty="0" err="1"/>
+              <a:t>kubectl</a:t>
+            </a:r>
+            <a:r>
+              <a:rPr lang="de-DE" dirty="0"/>
+              <a:t> </a:t>
+            </a:r>
+            <a:r>
+              <a:rPr lang="de-DE" dirty="0" err="1"/>
+              <a:t>expose</a:t>
+            </a:r>
+            <a:r>
+              <a:rPr lang="de-DE" dirty="0"/>
+              <a:t> </a:t>
+            </a:r>
+            <a:r>
+              <a:rPr lang="de-DE" dirty="0" err="1"/>
+              <a:t>deployment</a:t>
+            </a:r>
+            <a:r>
+              <a:rPr lang="de-DE" dirty="0"/>
+              <a:t> </a:t>
+            </a:r>
+            <a:r>
+              <a:rPr lang="de-DE" dirty="0" err="1"/>
+              <a:t>nginx</a:t>
+            </a:r>
+            <a:r>
+              <a:rPr lang="de-DE" dirty="0"/>
+              <a:t> --</a:t>
+            </a:r>
+            <a:r>
+              <a:rPr lang="de-DE" dirty="0" err="1"/>
+              <a:t>port</a:t>
+            </a:r>
+            <a:r>
+              <a:rPr lang="de-DE" b="1" dirty="0"/>
+              <a:t>=</a:t>
+            </a:r>
+            <a:r>
+              <a:rPr lang="de-DE" dirty="0"/>
+              <a:t>80</a:t>
+            </a:r>
+          </a:p>
+          <a:p>
+            <a:pPr marL="285750" indent="-285750">
+              <a:buFont typeface="Symbol" panose="05050102010706020507" pitchFamily="18" charset="2"/>
+              <a:buChar char="-"/>
+            </a:pPr>
+            <a:endParaRPr lang="de-DE" dirty="0"/>
+          </a:p>
+          <a:p>
+            <a:pPr marL="285750" indent="-285750">
+              <a:buFont typeface="Symbol" panose="05050102010706020507" pitchFamily="18" charset="2"/>
+              <a:buChar char="-"/>
+            </a:pPr>
+            <a:r>
+              <a:rPr lang="de-DE" dirty="0"/>
+              <a:t>Create a </a:t>
+            </a:r>
+            <a:r>
+              <a:rPr lang="de-DE" dirty="0" err="1"/>
+              <a:t>helper</a:t>
+            </a:r>
+            <a:r>
+              <a:rPr lang="de-DE" dirty="0"/>
+              <a:t> </a:t>
+            </a:r>
+            <a:r>
+              <a:rPr lang="de-DE" dirty="0" err="1"/>
+              <a:t>pod</a:t>
+            </a:r>
+            <a:r>
+              <a:rPr lang="de-DE" dirty="0"/>
+              <a:t>, </a:t>
+            </a:r>
+            <a:r>
+              <a:rPr lang="de-DE" dirty="0" err="1"/>
+              <a:t>logon</a:t>
+            </a:r>
+            <a:r>
+              <a:rPr lang="de-DE" dirty="0"/>
+              <a:t> </a:t>
+            </a:r>
+            <a:r>
+              <a:rPr lang="de-DE" dirty="0" err="1"/>
+              <a:t>to</a:t>
+            </a:r>
+            <a:r>
+              <a:rPr lang="de-DE" dirty="0"/>
+              <a:t> </a:t>
+            </a:r>
+            <a:r>
+              <a:rPr lang="de-DE" dirty="0" err="1"/>
+              <a:t>it</a:t>
+            </a:r>
+            <a:r>
+              <a:rPr lang="de-DE" dirty="0"/>
+              <a:t> and </a:t>
+            </a:r>
+            <a:r>
+              <a:rPr lang="de-DE" dirty="0" err="1"/>
+              <a:t>get</a:t>
+            </a:r>
+            <a:r>
+              <a:rPr lang="de-DE" dirty="0"/>
+              <a:t> </a:t>
+            </a:r>
+            <a:r>
+              <a:rPr lang="de-DE" dirty="0" err="1"/>
+              <a:t>the</a:t>
+            </a:r>
+            <a:r>
+              <a:rPr lang="de-DE" dirty="0"/>
+              <a:t> index.html </a:t>
+            </a:r>
+            <a:r>
+              <a:rPr lang="de-DE" dirty="0" err="1"/>
+              <a:t>page</a:t>
+            </a:r>
+            <a:r>
+              <a:rPr lang="de-DE" dirty="0"/>
+              <a:t> </a:t>
+            </a:r>
+            <a:r>
+              <a:rPr lang="de-DE" dirty="0" err="1"/>
+              <a:t>from</a:t>
+            </a:r>
+            <a:r>
+              <a:rPr lang="de-DE" dirty="0"/>
+              <a:t> </a:t>
+            </a:r>
+            <a:r>
+              <a:rPr lang="de-DE" dirty="0" err="1"/>
+              <a:t>the</a:t>
+            </a:r>
+            <a:r>
+              <a:rPr lang="de-DE" dirty="0"/>
+              <a:t> </a:t>
+            </a:r>
+            <a:r>
+              <a:rPr lang="de-DE" dirty="0" err="1"/>
+              <a:t>nginx</a:t>
+            </a:r>
+            <a:r>
+              <a:rPr lang="de-DE" dirty="0"/>
+              <a:t> backend.</a:t>
+            </a:r>
+          </a:p>
+          <a:p>
+            <a:pPr marL="465750" lvl="1" indent="-285750">
+              <a:buFont typeface="Symbol" panose="05050102010706020507" pitchFamily="18" charset="2"/>
+              <a:buChar char="-"/>
+            </a:pPr>
+            <a:r>
+              <a:rPr lang="de-DE" dirty="0" err="1"/>
+              <a:t>kubectl</a:t>
+            </a:r>
+            <a:r>
+              <a:rPr lang="de-DE" dirty="0"/>
+              <a:t> </a:t>
+            </a:r>
+            <a:r>
+              <a:rPr lang="de-DE" dirty="0" err="1"/>
+              <a:t>run</a:t>
+            </a:r>
+            <a:r>
+              <a:rPr lang="de-DE" dirty="0"/>
+              <a:t> </a:t>
+            </a:r>
+            <a:r>
+              <a:rPr lang="de-DE" dirty="0" err="1"/>
+              <a:t>connector</a:t>
+            </a:r>
+            <a:r>
+              <a:rPr lang="de-DE" dirty="0"/>
+              <a:t> --</a:t>
+            </a:r>
+            <a:r>
+              <a:rPr lang="de-DE" dirty="0" err="1"/>
+              <a:t>rm</a:t>
+            </a:r>
+            <a:r>
+              <a:rPr lang="de-DE" dirty="0"/>
+              <a:t> -</a:t>
+            </a:r>
+            <a:r>
+              <a:rPr lang="de-DE" dirty="0" err="1"/>
+              <a:t>ti</a:t>
+            </a:r>
+            <a:r>
+              <a:rPr lang="de-DE" dirty="0"/>
+              <a:t> --</a:t>
+            </a:r>
+            <a:r>
+              <a:rPr lang="de-DE" dirty="0" err="1"/>
+              <a:t>restart</a:t>
+            </a:r>
+            <a:r>
+              <a:rPr lang="de-DE" dirty="0"/>
+              <a:t>=Never --image</a:t>
+            </a:r>
+            <a:r>
+              <a:rPr lang="de-DE" b="1" dirty="0"/>
+              <a:t>=</a:t>
+            </a:r>
+            <a:r>
+              <a:rPr lang="de-DE" dirty="0"/>
+              <a:t>alpine:3.8</a:t>
+            </a:r>
+          </a:p>
+          <a:p>
+            <a:pPr marL="465750" lvl="1" indent="-285750">
+              <a:buFont typeface="Symbol" panose="05050102010706020507" pitchFamily="18" charset="2"/>
+              <a:buChar char="-"/>
+            </a:pPr>
+            <a:r>
+              <a:rPr lang="de-DE" dirty="0"/>
+              <a:t># </a:t>
+            </a:r>
+            <a:r>
+              <a:rPr lang="de-DE" dirty="0" err="1"/>
+              <a:t>wget</a:t>
+            </a:r>
+            <a:r>
+              <a:rPr lang="de-DE" dirty="0"/>
+              <a:t> --timeout=1 </a:t>
+            </a:r>
+            <a:r>
+              <a:rPr lang="de-DE" dirty="0" err="1"/>
+              <a:t>nginx</a:t>
+            </a:r>
+            <a:endParaRPr lang="de-DE" dirty="0"/>
+          </a:p>
+          <a:p>
+            <a:pPr marL="465750" lvl="1" indent="-285750">
+              <a:buFont typeface="Symbol" panose="05050102010706020507" pitchFamily="18" charset="2"/>
+              <a:buChar char="-"/>
+            </a:pPr>
+            <a:r>
+              <a:rPr lang="en-US" dirty="0"/>
+              <a:t>Remove the index.html page &amp; stay connected to the shell session</a:t>
+            </a:r>
+          </a:p>
+          <a:p>
+            <a:pPr marL="285750" indent="-285750">
+              <a:buFont typeface="Symbol" panose="05050102010706020507" pitchFamily="18" charset="2"/>
+              <a:buChar char="-"/>
+            </a:pPr>
+            <a:endParaRPr lang="en-US" dirty="0"/>
+          </a:p>
+          <a:p>
+            <a:pPr marL="285750" indent="-285750">
+              <a:buFont typeface="Symbol" panose="05050102010706020507" pitchFamily="18" charset="2"/>
+              <a:buChar char="-"/>
+            </a:pPr>
+            <a:r>
+              <a:rPr lang="en-US" dirty="0"/>
+              <a:t>Create the network policy in a 2</a:t>
+            </a:r>
+            <a:r>
+              <a:rPr lang="en-US" baseline="30000" dirty="0"/>
+              <a:t>nd</a:t>
+            </a:r>
+            <a:r>
+              <a:rPr lang="en-US" dirty="0"/>
+              <a:t> shell:</a:t>
+            </a:r>
+          </a:p>
+          <a:p>
+            <a:pPr marL="465750" lvl="1" indent="-285750">
+              <a:buFont typeface="Symbol" panose="05050102010706020507" pitchFamily="18" charset="2"/>
+              <a:buChar char="-"/>
+            </a:pPr>
+            <a:r>
+              <a:rPr lang="en-US" dirty="0" err="1"/>
+              <a:t>kubectl</a:t>
+            </a:r>
+            <a:r>
+              <a:rPr lang="en-US" dirty="0"/>
+              <a:t> create –f network-</a:t>
+            </a:r>
+            <a:r>
+              <a:rPr lang="en-US" dirty="0" err="1"/>
+              <a:t>policy.yaml</a:t>
+            </a:r>
+            <a:endParaRPr lang="en-US" dirty="0"/>
+          </a:p>
+          <a:p>
+            <a:pPr marL="465750" lvl="1" indent="-285750">
+              <a:buFont typeface="Symbol" panose="05050102010706020507" pitchFamily="18" charset="2"/>
+              <a:buChar char="-"/>
+            </a:pPr>
+            <a:r>
+              <a:rPr lang="en-US" dirty="0"/>
+              <a:t>Show the network policy definition and explain:</a:t>
+            </a:r>
+          </a:p>
+          <a:p>
+            <a:pPr marL="645750" lvl="2" indent="-285750">
+              <a:buFont typeface="Symbol" panose="05050102010706020507" pitchFamily="18" charset="2"/>
+              <a:buChar char="-"/>
+            </a:pPr>
+            <a:r>
+              <a:rPr lang="en-US" dirty="0"/>
+              <a:t>it’s implicitly a whitelisting</a:t>
+            </a:r>
+          </a:p>
+          <a:p>
+            <a:pPr marL="645750" lvl="2" indent="-285750">
+              <a:buFont typeface="Symbol" panose="05050102010706020507" pitchFamily="18" charset="2"/>
+              <a:buChar char="-"/>
+            </a:pPr>
+            <a:r>
+              <a:rPr lang="en-US" dirty="0"/>
+              <a:t>network policy can handle egress and ingress traffic. However the example is only of incoming (ingress) traffic.</a:t>
+            </a:r>
+          </a:p>
+          <a:p>
+            <a:pPr marL="645750" lvl="2" indent="-285750">
+              <a:buFont typeface="Symbol" panose="05050102010706020507" pitchFamily="18" charset="2"/>
+              <a:buChar char="-"/>
+            </a:pPr>
+            <a:r>
+              <a:rPr lang="en-US" dirty="0"/>
+              <a:t>The </a:t>
+            </a:r>
+            <a:r>
+              <a:rPr lang="en-US" dirty="0" err="1"/>
+              <a:t>cidr</a:t>
+            </a:r>
+            <a:r>
+              <a:rPr lang="en-US" dirty="0"/>
+              <a:t> block are required, if you want to access your service later from SAP networks. Otherwise all requested without the label (i.e. not cluster internal) will be blocked too.</a:t>
+            </a:r>
+          </a:p>
+          <a:p>
+            <a:pPr marL="465750" lvl="1" indent="-285750">
+              <a:buFont typeface="Symbol" panose="05050102010706020507" pitchFamily="18" charset="2"/>
+              <a:buChar char="-"/>
+            </a:pPr>
+            <a:endParaRPr lang="en-US" dirty="0"/>
+          </a:p>
+          <a:p>
+            <a:pPr marL="285750" indent="-285750">
+              <a:buFont typeface="Symbol" panose="05050102010706020507" pitchFamily="18" charset="2"/>
+              <a:buChar char="-"/>
+            </a:pPr>
+            <a:r>
+              <a:rPr lang="en-US" dirty="0"/>
+              <a:t>Switch back to the helper pod and re-run the </a:t>
+            </a:r>
+            <a:r>
+              <a:rPr lang="en-US" dirty="0" err="1"/>
+              <a:t>wget</a:t>
+            </a:r>
+            <a:r>
+              <a:rPr lang="en-US" dirty="0"/>
+              <a:t> command </a:t>
+            </a:r>
+            <a:r>
+              <a:rPr lang="en-US" dirty="0">
+                <a:sym typeface="Wingdings" panose="05000000000000000000" pitchFamily="2" charset="2"/>
+              </a:rPr>
+              <a:t> expected result: failure due to the missing label</a:t>
+            </a:r>
+            <a:endParaRPr lang="en-US" dirty="0"/>
+          </a:p>
+          <a:p>
+            <a:pPr marL="285750" indent="-285750">
+              <a:buFont typeface="Symbol" panose="05050102010706020507" pitchFamily="18" charset="2"/>
+              <a:buChar char="-"/>
+            </a:pPr>
+            <a:r>
+              <a:rPr lang="en-US" dirty="0"/>
+              <a:t>Label you helper pod accordingly (can be done from the 2</a:t>
+            </a:r>
+            <a:r>
+              <a:rPr lang="en-US" baseline="30000" dirty="0"/>
+              <a:t>nd</a:t>
+            </a:r>
+            <a:r>
+              <a:rPr lang="en-US" dirty="0"/>
+              <a:t> shell session, so stay connected to your helper pod)</a:t>
+            </a:r>
+          </a:p>
+          <a:p>
+            <a:pPr marL="465750" lvl="1" indent="-285750">
+              <a:buFont typeface="Symbol" panose="05050102010706020507" pitchFamily="18" charset="2"/>
+              <a:buChar char="-"/>
+            </a:pPr>
+            <a:r>
+              <a:rPr lang="en-US" dirty="0" err="1"/>
+              <a:t>kubectl</a:t>
+            </a:r>
+            <a:r>
+              <a:rPr lang="en-US" dirty="0"/>
+              <a:t> label pod connector access=true</a:t>
+            </a:r>
+          </a:p>
+          <a:p>
+            <a:pPr marL="285750" lvl="0" indent="-285750">
+              <a:buFont typeface="Symbol" panose="05050102010706020507" pitchFamily="18" charset="2"/>
+              <a:buChar char="-"/>
+            </a:pPr>
+            <a:endParaRPr lang="en-US" dirty="0"/>
+          </a:p>
+          <a:p>
+            <a:pPr marL="285750" lvl="0" indent="-285750">
+              <a:buFont typeface="Symbol" panose="05050102010706020507" pitchFamily="18" charset="2"/>
+              <a:buChar char="-"/>
+            </a:pPr>
+            <a:r>
+              <a:rPr lang="en-US" dirty="0"/>
+              <a:t>Re-run the </a:t>
+            </a:r>
+            <a:r>
+              <a:rPr lang="en-US" dirty="0" err="1"/>
+              <a:t>wget</a:t>
+            </a:r>
+            <a:r>
+              <a:rPr lang="en-US" dirty="0"/>
+              <a:t> command </a:t>
+            </a:r>
+            <a:r>
+              <a:rPr lang="en-US" dirty="0">
+                <a:sym typeface="Wingdings" panose="05000000000000000000" pitchFamily="2" charset="2"/>
+              </a:rPr>
+              <a:t> expected result: works again</a:t>
+            </a:r>
+          </a:p>
+          <a:p>
+            <a:pPr marL="285750" lvl="0" indent="-285750">
+              <a:buFont typeface="Symbol" panose="05050102010706020507" pitchFamily="18" charset="2"/>
+              <a:buChar char="-"/>
+            </a:pPr>
+            <a:endParaRPr lang="en-US" dirty="0">
+              <a:sym typeface="Wingdings" panose="05000000000000000000" pitchFamily="2" charset="2"/>
+            </a:endParaRPr>
+          </a:p>
+          <a:p>
+            <a:pPr marL="0" lvl="0" indent="0">
+              <a:buFont typeface="Symbol" panose="05050102010706020507" pitchFamily="18" charset="2"/>
+              <a:buNone/>
+            </a:pPr>
             <a:endParaRPr lang="en-US" dirty="0"/>
           </a:p>
         </p:txBody>
@@ -2128,18 +2297,18 @@
           <a:lstStyle/>
           <a:p>
             <a:fld id="{7D8C2C35-2B8A-446E-BEC0-FD36716C29AC}" type="slidenum">
-              <a:rPr lang="en-US" smtClean="0"/>
+              <a:rPr lang="de-DE" smtClean="0"/>
               <a:pPr/>
-              <a:t>18</a:t>
+              <a:t>17</a:t>
             </a:fld>
-            <a:endParaRPr lang="en-US" dirty="0"/>
+            <a:endParaRPr lang="de-DE" dirty="0"/>
           </a:p>
         </p:txBody>
       </p:sp>
     </p:spTree>
     <p:extLst>
       <p:ext uri="{BB962C8B-B14F-4D97-AF65-F5344CB8AC3E}">
-        <p14:creationId xmlns:p14="http://schemas.microsoft.com/office/powerpoint/2010/main" val="1582342442"/>
+        <p14:creationId xmlns:p14="http://schemas.microsoft.com/office/powerpoint/2010/main" val="2053658473"/>
       </p:ext>
     </p:extLst>
   </p:cSld>
@@ -2213,18 +2382,18 @@
           <a:lstStyle/>
           <a:p>
             <a:fld id="{7D8C2C35-2B8A-446E-BEC0-FD36716C29AC}" type="slidenum">
-              <a:rPr lang="de-DE" smtClean="0"/>
+              <a:rPr lang="en-US" smtClean="0"/>
               <a:pPr/>
               <a:t>19</a:t>
             </a:fld>
-            <a:endParaRPr lang="de-DE" dirty="0"/>
+            <a:endParaRPr lang="en-US" dirty="0"/>
           </a:p>
         </p:txBody>
       </p:sp>
     </p:spTree>
     <p:extLst>
       <p:ext uri="{BB962C8B-B14F-4D97-AF65-F5344CB8AC3E}">
-        <p14:creationId xmlns:p14="http://schemas.microsoft.com/office/powerpoint/2010/main" val="3466716593"/>
+        <p14:creationId xmlns:p14="http://schemas.microsoft.com/office/powerpoint/2010/main" val="1582342442"/>
       </p:ext>
     </p:extLst>
   </p:cSld>
@@ -2309,7 +2478,7 @@
     </p:spTree>
     <p:extLst>
       <p:ext uri="{BB962C8B-B14F-4D97-AF65-F5344CB8AC3E}">
-        <p14:creationId xmlns:p14="http://schemas.microsoft.com/office/powerpoint/2010/main" val="157809321"/>
+        <p14:creationId xmlns:p14="http://schemas.microsoft.com/office/powerpoint/2010/main" val="3466716593"/>
       </p:ext>
     </p:extLst>
   </p:cSld>
@@ -2360,70 +2529,9 @@
         </p:nvSpPr>
         <p:spPr/>
         <p:txBody>
-          <a:bodyPr>
-            <a:normAutofit/>
-          </a:bodyPr>
+          <a:bodyPr/>
           <a:lstStyle/>
           <a:p>
-            <a:r>
-              <a:rPr lang="en-US" baseline="0" dirty="0"/>
-              <a:t>Optional demo: </a:t>
-            </a:r>
-          </a:p>
-          <a:p>
-            <a:r>
-              <a:rPr lang="en-US" baseline="0" dirty="0"/>
-              <a:t>To access the cluster’s dashboard, use the Gardener UI or port-forward the to dashboard pod (example: </a:t>
-            </a:r>
-            <a:r>
-              <a:rPr lang="en-US" baseline="0" dirty="0" err="1"/>
-              <a:t>kubectl</a:t>
-            </a:r>
-            <a:r>
-              <a:rPr lang="en-US" baseline="0" dirty="0"/>
-              <a:t> port-forward -n </a:t>
-            </a:r>
-            <a:r>
-              <a:rPr lang="en-US" baseline="0" dirty="0" err="1"/>
-              <a:t>kube</a:t>
-            </a:r>
-            <a:r>
-              <a:rPr lang="en-US" baseline="0" dirty="0"/>
-              <a:t>-system addons-kubernetes-dashboard-5486b968b7-zf62b 8443:8443)</a:t>
-            </a:r>
-          </a:p>
-          <a:p>
-            <a:endParaRPr lang="en-US" baseline="0" dirty="0"/>
-          </a:p>
-          <a:p>
-            <a:r>
-              <a:rPr lang="en-US" baseline="0" dirty="0"/>
-              <a:t>Demo the dashboard</a:t>
-            </a:r>
-          </a:p>
-          <a:p>
-            <a:r>
-              <a:rPr lang="en-US" baseline="0" dirty="0"/>
-              <a:t>- Show status info &amp; utilization of nodes</a:t>
-            </a:r>
-          </a:p>
-          <a:p>
-            <a:r>
-              <a:rPr lang="en-US" dirty="0"/>
-              <a:t>- Show deployments</a:t>
-            </a:r>
-            <a:r>
-              <a:rPr lang="en-US" baseline="0" dirty="0"/>
-              <a:t> </a:t>
-            </a:r>
-            <a:r>
-              <a:rPr lang="en-US" dirty="0"/>
-              <a:t>&amp; services and how to create a new</a:t>
-            </a:r>
-            <a:r>
-              <a:rPr lang="en-US" baseline="0" dirty="0"/>
-              <a:t> deployment</a:t>
-            </a:r>
             <a:endParaRPr lang="en-US" dirty="0"/>
           </a:p>
         </p:txBody>
@@ -2455,7 +2563,7 @@
     </p:spTree>
     <p:extLst>
       <p:ext uri="{BB962C8B-B14F-4D97-AF65-F5344CB8AC3E}">
-        <p14:creationId xmlns:p14="http://schemas.microsoft.com/office/powerpoint/2010/main" val="3052625252"/>
+        <p14:creationId xmlns:p14="http://schemas.microsoft.com/office/powerpoint/2010/main" val="157809321"/>
       </p:ext>
     </p:extLst>
   </p:cSld>
@@ -2674,41 +2782,69 @@
         </p:nvSpPr>
         <p:spPr/>
         <p:txBody>
-          <a:bodyPr/>
+          <a:bodyPr>
+            <a:normAutofit/>
+          </a:bodyPr>
           <a:lstStyle/>
           <a:p>
             <a:r>
+              <a:rPr lang="en-US" baseline="0" dirty="0"/>
+              <a:t>Optional demo: </a:t>
+            </a:r>
+          </a:p>
+          <a:p>
+            <a:r>
+              <a:rPr lang="en-US" baseline="0" dirty="0"/>
+              <a:t>To access the cluster’s dashboard, use the Gardener UI or port-forward the to dashboard pod (example: </a:t>
+            </a:r>
+            <a:r>
+              <a:rPr lang="en-US" baseline="0" dirty="0" err="1"/>
+              <a:t>kubectl</a:t>
+            </a:r>
+            <a:r>
+              <a:rPr lang="en-US" baseline="0" dirty="0"/>
+              <a:t> port-forward -n </a:t>
+            </a:r>
+            <a:r>
+              <a:rPr lang="en-US" baseline="0" dirty="0" err="1"/>
+              <a:t>kube</a:t>
+            </a:r>
+            <a:r>
+              <a:rPr lang="en-US" baseline="0" dirty="0"/>
+              <a:t>-system addons-kubernetes-dashboard-5486b968b7-zf62b 8443:8443)</a:t>
+            </a:r>
+          </a:p>
+          <a:p>
+            <a:endParaRPr lang="en-US" baseline="0" dirty="0"/>
+          </a:p>
+          <a:p>
+            <a:r>
+              <a:rPr lang="en-US" baseline="0" dirty="0"/>
+              <a:t>Demo the dashboard</a:t>
+            </a:r>
+          </a:p>
+          <a:p>
+            <a:r>
+              <a:rPr lang="en-US" baseline="0" dirty="0"/>
+              <a:t>- Show status info &amp; utilization of nodes</a:t>
+            </a:r>
+          </a:p>
+          <a:p>
+            <a:r>
               <a:rPr lang="en-US" dirty="0"/>
-              <a:t>Gardener is SAP’s solution for managed </a:t>
-            </a:r>
-            <a:r>
-              <a:rPr lang="en-US" dirty="0" err="1"/>
-              <a:t>kubernetes</a:t>
+              <a:t>- Show deployments</a:t>
+            </a:r>
+            <a:r>
+              <a:rPr lang="en-US" baseline="0" dirty="0"/>
+              <a:t> </a:t>
             </a:r>
             <a:r>
               <a:rPr lang="en-US" dirty="0"/>
-              <a:t> cluster. It is open source &amp; completely available on </a:t>
-            </a:r>
-            <a:r>
-              <a:rPr lang="en-US" dirty="0" err="1"/>
-              <a:t>github</a:t>
-            </a:r>
-            <a:r>
-              <a:rPr lang="en-US" dirty="0"/>
-              <a:t>: https://github.com/gardener/gardener/ </a:t>
-            </a:r>
-          </a:p>
-          <a:p>
-            <a:endParaRPr lang="en-US" dirty="0"/>
-          </a:p>
-          <a:p>
-            <a:r>
-              <a:rPr lang="en-US" dirty="0"/>
-              <a:t>Show internal landing page: https://github.wdf.sap.corp/pages/kubernetes/gardener/ including blog </a:t>
-            </a:r>
-            <a:r>
-              <a:rPr lang="en-US"/>
-              <a:t>&amp; help section</a:t>
+              <a:t>&amp; services and how to create a new</a:t>
+            </a:r>
+            <a:r>
+              <a:rPr lang="en-US" baseline="0" dirty="0"/>
+              <a:t> deployment</a:t>
             </a:r>
             <a:endParaRPr lang="en-US" dirty="0"/>
           </a:p>
@@ -2741,7 +2877,7 @@
     </p:spTree>
     <p:extLst>
       <p:ext uri="{BB962C8B-B14F-4D97-AF65-F5344CB8AC3E}">
-        <p14:creationId xmlns:p14="http://schemas.microsoft.com/office/powerpoint/2010/main" val="3611099769"/>
+        <p14:creationId xmlns:p14="http://schemas.microsoft.com/office/powerpoint/2010/main" val="3052625252"/>
       </p:ext>
     </p:extLst>
   </p:cSld>
@@ -2797,8 +2933,38 @@
           <a:p>
             <a:r>
               <a:rPr lang="en-US" dirty="0"/>
-              <a:t>Setting up lots of small clusters individually leads to resource waste. The control plane / master needs to be high available but the resources reserved for fail-over usually idle.</a:t>
-            </a:r>
+              <a:t>Gardener is SAP’s solution for managed </a:t>
+            </a:r>
+            <a:r>
+              <a:rPr lang="en-US" dirty="0" err="1"/>
+              <a:t>kubernetes</a:t>
+            </a:r>
+            <a:r>
+              <a:rPr lang="en-US" dirty="0"/>
+              <a:t> cluster. It is open source &amp; completely available on </a:t>
+            </a:r>
+            <a:r>
+              <a:rPr lang="en-US" dirty="0" err="1"/>
+              <a:t>github</a:t>
+            </a:r>
+            <a:r>
+              <a:rPr lang="en-US" dirty="0"/>
+              <a:t>: https://github.com/gardener/gardener/ </a:t>
+            </a:r>
+          </a:p>
+          <a:p>
+            <a:endParaRPr lang="en-US" dirty="0"/>
+          </a:p>
+          <a:p>
+            <a:r>
+              <a:rPr lang="en-US" dirty="0"/>
+              <a:t>Show internal landing page: https://github.wdf.sap.corp/pages/kubernetes/gardener/ including blog </a:t>
+            </a:r>
+            <a:r>
+              <a:rPr lang="en-US"/>
+              <a:t>&amp; help section</a:t>
+            </a:r>
+            <a:endParaRPr lang="en-US" dirty="0"/>
           </a:p>
         </p:txBody>
       </p:sp>
@@ -2818,18 +2984,18 @@
           <a:lstStyle/>
           <a:p>
             <a:fld id="{7D8C2C35-2B8A-446E-BEC0-FD36716C29AC}" type="slidenum">
-              <a:rPr lang="en-US" smtClean="0"/>
+              <a:rPr lang="de-DE" smtClean="0"/>
               <a:pPr/>
               <a:t>23</a:t>
             </a:fld>
-            <a:endParaRPr lang="en-US" dirty="0"/>
+            <a:endParaRPr lang="de-DE" dirty="0"/>
           </a:p>
         </p:txBody>
       </p:sp>
     </p:spTree>
     <p:extLst>
       <p:ext uri="{BB962C8B-B14F-4D97-AF65-F5344CB8AC3E}">
-        <p14:creationId xmlns:p14="http://schemas.microsoft.com/office/powerpoint/2010/main" val="1487314377"/>
+        <p14:creationId xmlns:p14="http://schemas.microsoft.com/office/powerpoint/2010/main" val="3611099769"/>
       </p:ext>
     </p:extLst>
   </p:cSld>
@@ -2885,13 +3051,8 @@
           <a:p>
             <a:r>
               <a:rPr lang="en-US" dirty="0"/>
-              <a:t>Solution: Gardener runs the control plane / master components of many “worker” clusters in a </a:t>
-            </a:r>
-            <a:r>
-              <a:rPr lang="en-US"/>
-              <a:t>separate cluster</a:t>
-            </a:r>
-            <a:endParaRPr lang="en-US" dirty="0"/>
+              <a:t>Setting up lots of small clusters individually leads to resource waste. The control plane / master needs to be high available but the resources reserved for fail-over usually idle.</a:t>
+            </a:r>
           </a:p>
         </p:txBody>
       </p:sp>
@@ -2911,9 +3072,102 @@
           <a:lstStyle/>
           <a:p>
             <a:fld id="{7D8C2C35-2B8A-446E-BEC0-FD36716C29AC}" type="slidenum">
+              <a:rPr lang="en-US" smtClean="0"/>
+              <a:pPr/>
+              <a:t>24</a:t>
+            </a:fld>
+            <a:endParaRPr lang="en-US" dirty="0"/>
+          </a:p>
+        </p:txBody>
+      </p:sp>
+    </p:spTree>
+    <p:extLst>
+      <p:ext uri="{BB962C8B-B14F-4D97-AF65-F5344CB8AC3E}">
+        <p14:creationId xmlns:p14="http://schemas.microsoft.com/office/powerpoint/2010/main" val="1487314377"/>
+      </p:ext>
+    </p:extLst>
+  </p:cSld>
+  <p:clrMapOvr>
+    <a:masterClrMapping/>
+  </p:clrMapOvr>
+</p:notes>
+</file>
+
+<file path=ppt/notesSlides/notesSlide23.xml><?xml version="1.0" encoding="utf-8"?>
+<p:notes xmlns:a="http://schemas.openxmlformats.org/drawingml/2006/main" xmlns:r="http://schemas.openxmlformats.org/officeDocument/2006/relationships" xmlns:p="http://schemas.openxmlformats.org/presentationml/2006/main">
+  <p:cSld>
+    <p:spTree>
+      <p:nvGrpSpPr>
+        <p:cNvPr id="1" name=""/>
+        <p:cNvGrpSpPr/>
+        <p:nvPr/>
+      </p:nvGrpSpPr>
+      <p:grpSpPr>
+        <a:xfrm>
+          <a:off x="0" y="0"/>
+          <a:ext cx="0" cy="0"/>
+          <a:chOff x="0" y="0"/>
+          <a:chExt cx="0" cy="0"/>
+        </a:xfrm>
+      </p:grpSpPr>
+      <p:sp>
+        <p:nvSpPr>
+          <p:cNvPr id="2" name="Slide Image Placeholder 1"/>
+          <p:cNvSpPr>
+            <a:spLocks noGrp="1" noRot="1" noChangeAspect="1"/>
+          </p:cNvSpPr>
+          <p:nvPr>
+            <p:ph type="sldImg"/>
+          </p:nvPr>
+        </p:nvSpPr>
+        <p:spPr/>
+      </p:sp>
+      <p:sp>
+        <p:nvSpPr>
+          <p:cNvPr id="3" name="Notes Placeholder 2"/>
+          <p:cNvSpPr>
+            <a:spLocks noGrp="1"/>
+          </p:cNvSpPr>
+          <p:nvPr>
+            <p:ph type="body" idx="1"/>
+          </p:nvPr>
+        </p:nvSpPr>
+        <p:spPr/>
+        <p:txBody>
+          <a:bodyPr/>
+          <a:lstStyle/>
+          <a:p>
+            <a:r>
+              <a:rPr lang="en-US" dirty="0"/>
+              <a:t>Solution: Gardener runs the control plane / master components of many “worker” clusters in a </a:t>
+            </a:r>
+            <a:r>
+              <a:rPr lang="en-US"/>
+              <a:t>separate cluster</a:t>
+            </a:r>
+            <a:endParaRPr lang="en-US" dirty="0"/>
+          </a:p>
+        </p:txBody>
+      </p:sp>
+      <p:sp>
+        <p:nvSpPr>
+          <p:cNvPr id="4" name="Slide Number Placeholder 3"/>
+          <p:cNvSpPr>
+            <a:spLocks noGrp="1"/>
+          </p:cNvSpPr>
+          <p:nvPr>
+            <p:ph type="sldNum" sz="quarter" idx="10"/>
+          </p:nvPr>
+        </p:nvSpPr>
+        <p:spPr/>
+        <p:txBody>
+          <a:bodyPr/>
+          <a:lstStyle/>
+          <a:p>
+            <a:fld id="{7D8C2C35-2B8A-446E-BEC0-FD36716C29AC}" type="slidenum">
               <a:rPr lang="de-DE" smtClean="0"/>
               <a:pPr/>
-              <a:t>24</a:t>
+              <a:t>25</a:t>
             </a:fld>
             <a:endParaRPr lang="de-DE" dirty="0"/>
           </a:p>
@@ -2932,7 +3186,7 @@
 </p:notes>
 </file>
 
-<file path=ppt/notesSlides/notesSlide23.xml><?xml version="1.0" encoding="utf-8"?>
+<file path=ppt/notesSlides/notesSlide24.xml><?xml version="1.0" encoding="utf-8"?>
 <p:notes xmlns:a="http://schemas.openxmlformats.org/drawingml/2006/main" xmlns:r="http://schemas.openxmlformats.org/officeDocument/2006/relationships" xmlns:p="http://schemas.openxmlformats.org/presentationml/2006/main">
   <p:cSld>
     <p:spTree>
@@ -2967,7 +3221,7 @@
             <a:fld id="{7D8C2C35-2B8A-446E-BEC0-FD36716C29AC}" type="slidenum">
               <a:rPr lang="en-US" smtClean="0"/>
               <a:pPr/>
-              <a:t>25</a:t>
+              <a:t>26</a:t>
             </a:fld>
             <a:endParaRPr lang="en-US" dirty="0"/>
           </a:p>
@@ -18896,6 +19150,94 @@
       </p:grpSpPr>
       <p:sp>
         <p:nvSpPr>
+          <p:cNvPr id="2" name="Title 1">
+            <a:extLst>
+              <a:ext uri="{FF2B5EF4-FFF2-40B4-BE49-F238E27FC236}">
+                <a16:creationId xmlns:a16="http://schemas.microsoft.com/office/drawing/2014/main" id="{2D4BD4BF-5C0E-4BE1-A99C-25DBDC85D9CD}"/>
+              </a:ext>
+            </a:extLst>
+          </p:cNvPr>
+          <p:cNvSpPr>
+            <a:spLocks noGrp="1"/>
+          </p:cNvSpPr>
+          <p:nvPr>
+            <p:ph type="title"/>
+          </p:nvPr>
+        </p:nvSpPr>
+        <p:spPr/>
+        <p:txBody>
+          <a:bodyPr/>
+          <a:lstStyle/>
+          <a:p>
+            <a:r>
+              <a:rPr lang="en-US" dirty="0"/>
+              <a:t>Optional Demo</a:t>
+            </a:r>
+          </a:p>
+        </p:txBody>
+      </p:sp>
+      <p:pic>
+        <p:nvPicPr>
+          <p:cNvPr id="18" name="Picture 17">
+            <a:extLst>
+              <a:ext uri="{FF2B5EF4-FFF2-40B4-BE49-F238E27FC236}">
+                <a16:creationId xmlns:a16="http://schemas.microsoft.com/office/drawing/2014/main" id="{FC355B51-9D60-4DBB-9EF1-08294FF8959E}"/>
+              </a:ext>
+            </a:extLst>
+          </p:cNvPr>
+          <p:cNvPicPr>
+            <a:picLocks noChangeAspect="1"/>
+          </p:cNvPicPr>
+          <p:nvPr/>
+        </p:nvPicPr>
+        <p:blipFill>
+          <a:blip r:embed="rId3"/>
+          <a:stretch>
+            <a:fillRect/>
+          </a:stretch>
+        </p:blipFill>
+        <p:spPr>
+          <a:xfrm>
+            <a:off x="3849419" y="1181180"/>
+            <a:ext cx="4495640" cy="4495640"/>
+          </a:xfrm>
+          <a:prstGeom prst="rect">
+            <a:avLst/>
+          </a:prstGeom>
+        </p:spPr>
+      </p:pic>
+    </p:spTree>
+    <p:extLst>
+      <p:ext uri="{BB962C8B-B14F-4D97-AF65-F5344CB8AC3E}">
+        <p14:creationId xmlns:p14="http://schemas.microsoft.com/office/powerpoint/2010/main" val="1414088338"/>
+      </p:ext>
+    </p:extLst>
+  </p:cSld>
+  <p:clrMapOvr>
+    <a:masterClrMapping/>
+  </p:clrMapOvr>
+</p:sld>
+</file>
+
+<file path=ppt/slides/slide13.xml><?xml version="1.0" encoding="utf-8"?>
+<p:sld xmlns:a="http://schemas.openxmlformats.org/drawingml/2006/main" xmlns:r="http://schemas.openxmlformats.org/officeDocument/2006/relationships" xmlns:p="http://schemas.openxmlformats.org/presentationml/2006/main">
+  <p:cSld>
+    <p:spTree>
+      <p:nvGrpSpPr>
+        <p:cNvPr id="1" name=""/>
+        <p:cNvGrpSpPr/>
+        <p:nvPr/>
+      </p:nvGrpSpPr>
+      <p:grpSpPr>
+        <a:xfrm>
+          <a:off x="0" y="0"/>
+          <a:ext cx="0" cy="0"/>
+          <a:chOff x="0" y="0"/>
+          <a:chExt cx="0" cy="0"/>
+        </a:xfrm>
+      </p:grpSpPr>
+      <p:sp>
+        <p:nvSpPr>
           <p:cNvPr id="5" name="Text Placeholder 4"/>
           <p:cNvSpPr>
             <a:spLocks noGrp="1"/>
@@ -19019,7 +19361,7 @@
 </p:sld>
 </file>
 
-<file path=ppt/slides/slide13.xml><?xml version="1.0" encoding="utf-8"?>
+<file path=ppt/slides/slide14.xml><?xml version="1.0" encoding="utf-8"?>
 <p:sld xmlns:a="http://schemas.openxmlformats.org/drawingml/2006/main" xmlns:r="http://schemas.openxmlformats.org/officeDocument/2006/relationships" xmlns:p="http://schemas.openxmlformats.org/presentationml/2006/main">
   <p:cSld>
     <p:spTree>
@@ -19983,7 +20325,7 @@
 </p:sld>
 </file>
 
-<file path=ppt/slides/slide14.xml><?xml version="1.0" encoding="utf-8"?>
+<file path=ppt/slides/slide15.xml><?xml version="1.0" encoding="utf-8"?>
 <p:sld xmlns:a="http://schemas.openxmlformats.org/drawingml/2006/main" xmlns:r="http://schemas.openxmlformats.org/officeDocument/2006/relationships" xmlns:p="http://schemas.openxmlformats.org/presentationml/2006/main">
   <p:cSld>
     <p:spTree>
@@ -21066,7 +21408,7 @@
 </p:sld>
 </file>
 
-<file path=ppt/slides/slide15.xml><?xml version="1.0" encoding="utf-8"?>
+<file path=ppt/slides/slide16.xml><?xml version="1.0" encoding="utf-8"?>
 <p:sld xmlns:a="http://schemas.openxmlformats.org/drawingml/2006/main" xmlns:r="http://schemas.openxmlformats.org/officeDocument/2006/relationships" xmlns:p="http://schemas.openxmlformats.org/presentationml/2006/main" show="0">
   <p:cSld>
     <p:spTree>
@@ -22169,7 +22511,7 @@
 </p:sld>
 </file>
 
-<file path=ppt/slides/slide16.xml><?xml version="1.0" encoding="utf-8"?>
+<file path=ppt/slides/slide17.xml><?xml version="1.0" encoding="utf-8"?>
 <p:sld xmlns:a="http://schemas.openxmlformats.org/drawingml/2006/main" xmlns:r="http://schemas.openxmlformats.org/officeDocument/2006/relationships" xmlns:p="http://schemas.openxmlformats.org/presentationml/2006/main">
   <p:cSld>
     <p:spTree>
@@ -22257,7 +22599,7 @@
 </p:sld>
 </file>
 
-<file path=ppt/slides/slide17.xml><?xml version="1.0" encoding="utf-8"?>
+<file path=ppt/slides/slide18.xml><?xml version="1.0" encoding="utf-8"?>
 <p:sld xmlns:a="http://schemas.openxmlformats.org/drawingml/2006/main" xmlns:r="http://schemas.openxmlformats.org/officeDocument/2006/relationships" xmlns:p="http://schemas.openxmlformats.org/presentationml/2006/main">
   <p:cSld>
     <p:spTree>
@@ -23480,7 +23822,7 @@
 </p:sld>
 </file>
 
-<file path=ppt/slides/slide18.xml><?xml version="1.0" encoding="utf-8"?>
+<file path=ppt/slides/slide19.xml><?xml version="1.0" encoding="utf-8"?>
 <p:sld xmlns:a="http://schemas.openxmlformats.org/drawingml/2006/main" xmlns:r="http://schemas.openxmlformats.org/officeDocument/2006/relationships" xmlns:p="http://schemas.openxmlformats.org/presentationml/2006/main">
   <p:cSld>
     <p:spTree>
@@ -23613,138 +23955,6 @@
     <p:extLst>
       <p:ext uri="{BB962C8B-B14F-4D97-AF65-F5344CB8AC3E}">
         <p14:creationId xmlns:p14="http://schemas.microsoft.com/office/powerpoint/2010/main" val="3023893567"/>
-      </p:ext>
-    </p:extLst>
-  </p:cSld>
-  <p:clrMapOvr>
-    <a:masterClrMapping/>
-  </p:clrMapOvr>
-</p:sld>
-</file>
-
-<file path=ppt/slides/slide19.xml><?xml version="1.0" encoding="utf-8"?>
-<p:sld xmlns:a="http://schemas.openxmlformats.org/drawingml/2006/main" xmlns:r="http://schemas.openxmlformats.org/officeDocument/2006/relationships" xmlns:p="http://schemas.openxmlformats.org/presentationml/2006/main">
-  <p:cSld>
-    <p:spTree>
-      <p:nvGrpSpPr>
-        <p:cNvPr id="1" name=""/>
-        <p:cNvGrpSpPr/>
-        <p:nvPr/>
-      </p:nvGrpSpPr>
-      <p:grpSpPr>
-        <a:xfrm>
-          <a:off x="0" y="0"/>
-          <a:ext cx="0" cy="0"/>
-          <a:chOff x="0" y="0"/>
-          <a:chExt cx="0" cy="0"/>
-        </a:xfrm>
-      </p:grpSpPr>
-      <p:sp>
-        <p:nvSpPr>
-          <p:cNvPr id="3" name="Title 2"/>
-          <p:cNvSpPr>
-            <a:spLocks noGrp="1"/>
-          </p:cNvSpPr>
-          <p:nvPr>
-            <p:ph type="title"/>
-          </p:nvPr>
-        </p:nvSpPr>
-        <p:spPr/>
-        <p:txBody>
-          <a:bodyPr/>
-          <a:lstStyle/>
-          <a:p>
-            <a:r>
-              <a:rPr lang="en-US" dirty="0"/>
-              <a:t>Sometimes working with </a:t>
-            </a:r>
-            <a:r>
-              <a:rPr lang="en-US" dirty="0" err="1"/>
-              <a:t>kubernetes</a:t>
-            </a:r>
-            <a:r>
-              <a:rPr lang="en-US" dirty="0"/>
-              <a:t> is like …</a:t>
-            </a:r>
-          </a:p>
-        </p:txBody>
-      </p:sp>
-      <p:pic>
-        <p:nvPicPr>
-          <p:cNvPr id="1028" name="Picture 4" descr="The Important Field"/>
-          <p:cNvPicPr>
-            <a:picLocks noChangeAspect="1" noChangeArrowheads="1"/>
-          </p:cNvPicPr>
-          <p:nvPr/>
-        </p:nvPicPr>
-        <p:blipFill>
-          <a:blip r:embed="rId3">
-            <a:extLst>
-              <a:ext uri="{28A0092B-C50C-407E-A947-70E740481C1C}">
-                <a14:useLocalDpi xmlns:a14="http://schemas.microsoft.com/office/drawing/2010/main" val="0"/>
-              </a:ext>
-            </a:extLst>
-          </a:blip>
-          <a:srcRect/>
-          <a:stretch>
-            <a:fillRect/>
-          </a:stretch>
-        </p:blipFill>
-        <p:spPr bwMode="auto">
-          <a:xfrm>
-            <a:off x="1258388" y="1370845"/>
-            <a:ext cx="9753039" cy="4239116"/>
-          </a:xfrm>
-          <a:prstGeom prst="rect">
-            <a:avLst/>
-          </a:prstGeom>
-          <a:noFill/>
-          <a:extLst>
-            <a:ext uri="{909E8E84-426E-40DD-AFC4-6F175D3DCCD1}">
-              <a14:hiddenFill xmlns:a14="http://schemas.microsoft.com/office/drawing/2010/main">
-                <a:solidFill>
-                  <a:srgbClr val="FFFFFF"/>
-                </a:solidFill>
-              </a14:hiddenFill>
-            </a:ext>
-          </a:extLst>
-        </p:spPr>
-      </p:pic>
-      <p:sp>
-        <p:nvSpPr>
-          <p:cNvPr id="5" name="Rectangle 4"/>
-          <p:cNvSpPr/>
-          <p:nvPr/>
-        </p:nvSpPr>
-        <p:spPr>
-          <a:xfrm>
-            <a:off x="4732922" y="5691976"/>
-            <a:ext cx="2803973" cy="415498"/>
-          </a:xfrm>
-          <a:prstGeom prst="rect">
-            <a:avLst/>
-          </a:prstGeom>
-        </p:spPr>
-        <p:txBody>
-          <a:bodyPr wrap="none">
-            <a:spAutoFit/>
-          </a:bodyPr>
-          <a:lstStyle/>
-          <a:p>
-            <a:r>
-              <a:rPr lang="en-US" dirty="0">
-                <a:hlinkClick r:id="rId4"/>
-              </a:rPr>
-              <a:t>https://xkcd.com/970/</a:t>
-            </a:r>
-            <a:endParaRPr lang="en-US" dirty="0"/>
-          </a:p>
-        </p:txBody>
-      </p:sp>
-    </p:spTree>
-    <p:extLst>
-      <p:ext uri="{BB962C8B-B14F-4D97-AF65-F5344CB8AC3E}">
-        <p14:creationId xmlns:p14="http://schemas.microsoft.com/office/powerpoint/2010/main" val="822933932"/>
       </p:ext>
     </p:extLst>
   </p:cSld>
@@ -24443,6 +24653,138 @@
           <a:p>
             <a:r>
               <a:rPr lang="en-US" dirty="0"/>
+              <a:t>Sometimes working with </a:t>
+            </a:r>
+            <a:r>
+              <a:rPr lang="en-US" dirty="0" err="1"/>
+              <a:t>kubernetes</a:t>
+            </a:r>
+            <a:r>
+              <a:rPr lang="en-US" dirty="0"/>
+              <a:t> is like …</a:t>
+            </a:r>
+          </a:p>
+        </p:txBody>
+      </p:sp>
+      <p:pic>
+        <p:nvPicPr>
+          <p:cNvPr id="1028" name="Picture 4" descr="The Important Field"/>
+          <p:cNvPicPr>
+            <a:picLocks noChangeAspect="1" noChangeArrowheads="1"/>
+          </p:cNvPicPr>
+          <p:nvPr/>
+        </p:nvPicPr>
+        <p:blipFill>
+          <a:blip r:embed="rId3">
+            <a:extLst>
+              <a:ext uri="{28A0092B-C50C-407E-A947-70E740481C1C}">
+                <a14:useLocalDpi xmlns:a14="http://schemas.microsoft.com/office/drawing/2010/main" val="0"/>
+              </a:ext>
+            </a:extLst>
+          </a:blip>
+          <a:srcRect/>
+          <a:stretch>
+            <a:fillRect/>
+          </a:stretch>
+        </p:blipFill>
+        <p:spPr bwMode="auto">
+          <a:xfrm>
+            <a:off x="1258388" y="1370845"/>
+            <a:ext cx="9753039" cy="4239116"/>
+          </a:xfrm>
+          <a:prstGeom prst="rect">
+            <a:avLst/>
+          </a:prstGeom>
+          <a:noFill/>
+          <a:extLst>
+            <a:ext uri="{909E8E84-426E-40DD-AFC4-6F175D3DCCD1}">
+              <a14:hiddenFill xmlns:a14="http://schemas.microsoft.com/office/drawing/2010/main">
+                <a:solidFill>
+                  <a:srgbClr val="FFFFFF"/>
+                </a:solidFill>
+              </a14:hiddenFill>
+            </a:ext>
+          </a:extLst>
+        </p:spPr>
+      </p:pic>
+      <p:sp>
+        <p:nvSpPr>
+          <p:cNvPr id="5" name="Rectangle 4"/>
+          <p:cNvSpPr/>
+          <p:nvPr/>
+        </p:nvSpPr>
+        <p:spPr>
+          <a:xfrm>
+            <a:off x="4732922" y="5691976"/>
+            <a:ext cx="2803973" cy="415498"/>
+          </a:xfrm>
+          <a:prstGeom prst="rect">
+            <a:avLst/>
+          </a:prstGeom>
+        </p:spPr>
+        <p:txBody>
+          <a:bodyPr wrap="none">
+            <a:spAutoFit/>
+          </a:bodyPr>
+          <a:lstStyle/>
+          <a:p>
+            <a:r>
+              <a:rPr lang="en-US" dirty="0">
+                <a:hlinkClick r:id="rId4"/>
+              </a:rPr>
+              <a:t>https://xkcd.com/970/</a:t>
+            </a:r>
+            <a:endParaRPr lang="en-US" dirty="0"/>
+          </a:p>
+        </p:txBody>
+      </p:sp>
+    </p:spTree>
+    <p:extLst>
+      <p:ext uri="{BB962C8B-B14F-4D97-AF65-F5344CB8AC3E}">
+        <p14:creationId xmlns:p14="http://schemas.microsoft.com/office/powerpoint/2010/main" val="822933932"/>
+      </p:ext>
+    </p:extLst>
+  </p:cSld>
+  <p:clrMapOvr>
+    <a:masterClrMapping/>
+  </p:clrMapOvr>
+</p:sld>
+</file>
+
+<file path=ppt/slides/slide21.xml><?xml version="1.0" encoding="utf-8"?>
+<p:sld xmlns:a="http://schemas.openxmlformats.org/drawingml/2006/main" xmlns:r="http://schemas.openxmlformats.org/officeDocument/2006/relationships" xmlns:p="http://schemas.openxmlformats.org/presentationml/2006/main">
+  <p:cSld>
+    <p:spTree>
+      <p:nvGrpSpPr>
+        <p:cNvPr id="1" name=""/>
+        <p:cNvGrpSpPr/>
+        <p:nvPr/>
+      </p:nvGrpSpPr>
+      <p:grpSpPr>
+        <a:xfrm>
+          <a:off x="0" y="0"/>
+          <a:ext cx="0" cy="0"/>
+          <a:chOff x="0" y="0"/>
+          <a:chExt cx="0" cy="0"/>
+        </a:xfrm>
+      </p:grpSpPr>
+      <p:sp>
+        <p:nvSpPr>
+          <p:cNvPr id="3" name="Title 2"/>
+          <p:cNvSpPr>
+            <a:spLocks noGrp="1"/>
+          </p:cNvSpPr>
+          <p:nvPr>
+            <p:ph type="title"/>
+          </p:nvPr>
+        </p:nvSpPr>
+        <p:spPr/>
+        <p:txBody>
+          <a:bodyPr/>
+          <a:lstStyle/>
+          <a:p>
+            <a:r>
+              <a:rPr lang="en-US" dirty="0"/>
               <a:t> K8s Dashboard</a:t>
             </a:r>
           </a:p>
@@ -24485,7 +24827,7 @@
 </p:sld>
 </file>
 
-<file path=ppt/slides/slide21.xml><?xml version="1.0" encoding="utf-8"?>
+<file path=ppt/slides/slide22.xml><?xml version="1.0" encoding="utf-8"?>
 <p:sld xmlns:a="http://schemas.openxmlformats.org/drawingml/2006/main" xmlns:r="http://schemas.openxmlformats.org/officeDocument/2006/relationships" xmlns:p="http://schemas.openxmlformats.org/presentationml/2006/main">
   <p:cSld>
     <p:spTree>
@@ -24574,7 +24916,7 @@
 </p:sld>
 </file>
 
-<file path=ppt/slides/slide22.xml><?xml version="1.0" encoding="utf-8"?>
+<file path=ppt/slides/slide23.xml><?xml version="1.0" encoding="utf-8"?>
 <p:sld xmlns:a="http://schemas.openxmlformats.org/drawingml/2006/main" xmlns:r="http://schemas.openxmlformats.org/officeDocument/2006/relationships" xmlns:p="http://schemas.openxmlformats.org/presentationml/2006/main">
   <p:cSld>
     <p:spTree>
@@ -25242,7 +25584,7 @@
 </p:sld>
 </file>
 
-<file path=ppt/slides/slide23.xml><?xml version="1.0" encoding="utf-8"?>
+<file path=ppt/slides/slide24.xml><?xml version="1.0" encoding="utf-8"?>
 <p:sld xmlns:a="http://schemas.openxmlformats.org/drawingml/2006/main" xmlns:r="http://schemas.openxmlformats.org/officeDocument/2006/relationships" xmlns:p="http://schemas.openxmlformats.org/presentationml/2006/main">
   <p:cSld>
     <p:spTree>
@@ -27365,7 +27707,7 @@
 </p:sld>
 </file>
 
-<file path=ppt/slides/slide24.xml><?xml version="1.0" encoding="utf-8"?>
+<file path=ppt/slides/slide25.xml><?xml version="1.0" encoding="utf-8"?>
 <p:sld xmlns:a="http://schemas.openxmlformats.org/drawingml/2006/main" xmlns:r="http://schemas.openxmlformats.org/officeDocument/2006/relationships" xmlns:p="http://schemas.openxmlformats.org/presentationml/2006/main">
   <p:cSld>
     <p:spTree>
@@ -31340,7 +31682,7 @@
 </p:sld>
 </file>
 
-<file path=ppt/slides/slide25.xml><?xml version="1.0" encoding="utf-8"?>
+<file path=ppt/slides/slide26.xml><?xml version="1.0" encoding="utf-8"?>
 <p:sld xmlns:a="http://schemas.openxmlformats.org/drawingml/2006/main" xmlns:r="http://schemas.openxmlformats.org/officeDocument/2006/relationships" xmlns:p="http://schemas.openxmlformats.org/presentationml/2006/main" show="0">
   <p:cSld>
     <p:spTree>

</xml_diff>

<commit_message>
additional slides/links on Gardener/ K8s CaaS
</commit_message>
<xml_diff>
--- a/kubernetes/11_administration.pptx
+++ b/kubernetes/11_administration.pptx
@@ -5,10 +5,10 @@
     <p:sldMasterId id="2147483733" r:id="rId1"/>
   </p:sldMasterIdLst>
   <p:notesMasterIdLst>
-    <p:notesMasterId r:id="rId27"/>
+    <p:notesMasterId r:id="rId30"/>
   </p:notesMasterIdLst>
   <p:handoutMasterIdLst>
-    <p:handoutMasterId r:id="rId28"/>
+    <p:handoutMasterId r:id="rId31"/>
   </p:handoutMasterIdLst>
   <p:sldIdLst>
     <p:sldId id="433" r:id="rId2"/>
@@ -35,7 +35,10 @@
     <p:sldId id="449" r:id="rId23"/>
     <p:sldId id="460" r:id="rId24"/>
     <p:sldId id="461" r:id="rId25"/>
-    <p:sldId id="265" r:id="rId26"/>
+    <p:sldId id="474" r:id="rId26"/>
+    <p:sldId id="472" r:id="rId27"/>
+    <p:sldId id="473" r:id="rId28"/>
+    <p:sldId id="265" r:id="rId29"/>
   </p:sldIdLst>
   <p:sldSz cx="12195175" cy="6858000"/>
   <p:notesSz cx="6858000" cy="9144000"/>
@@ -2704,13 +2707,21 @@
           <a:p>
             <a:r>
               <a:rPr lang="en-US" dirty="0"/>
-              <a:t>Show internal landing page: https://github.wdf.sap.corp/pages/kubernetes/gardener/ including blog </a:t>
-            </a:r>
+              <a:t>Show internal landing page: https://github.wdf.sap.corp/pages/kubernetes/gardener/ including blog &amp; help section</a:t>
+            </a:r>
+          </a:p>
+          <a:p>
+            <a:endParaRPr lang="en-US" dirty="0"/>
+          </a:p>
+          <a:p>
             <a:r>
               <a:rPr lang="en-US"/>
-              <a:t>&amp; help section</a:t>
-            </a:r>
-            <a:endParaRPr lang="en-US" dirty="0"/>
+              <a:t>Jam Group Kubernetes </a:t>
+            </a:r>
+            <a:r>
+              <a:rPr lang="en-US" dirty="0"/>
+              <a:t>Clusters as a Service in SAP Cloud Platform: https://jam4.sapjam.com/groups/Niq7TSBxLlzgb3nroBZJVx/overview_page/e9uqTDxXBRFbk7FJXEA4Cd</a:t>
+            </a:r>
           </a:p>
         </p:txBody>
       </p:sp>
@@ -2951,6 +2962,37 @@
       </p:grpSpPr>
       <p:sp>
         <p:nvSpPr>
+          <p:cNvPr id="2" name="Slide Image Placeholder 1"/>
+          <p:cNvSpPr>
+            <a:spLocks noGrp="1" noRot="1" noChangeAspect="1"/>
+          </p:cNvSpPr>
+          <p:nvPr>
+            <p:ph type="sldImg"/>
+          </p:nvPr>
+        </p:nvSpPr>
+        <p:spPr/>
+      </p:sp>
+      <p:sp>
+        <p:nvSpPr>
+          <p:cNvPr id="3" name="Notes Placeholder 2"/>
+          <p:cNvSpPr>
+            <a:spLocks noGrp="1"/>
+          </p:cNvSpPr>
+          <p:nvPr>
+            <p:ph type="body" idx="1"/>
+          </p:nvPr>
+        </p:nvSpPr>
+        <p:spPr/>
+        <p:txBody>
+          <a:bodyPr/>
+          <a:lstStyle/>
+          <a:p>
+            <a:endParaRPr lang="de-DE" dirty="0"/>
+          </a:p>
+        </p:txBody>
+      </p:sp>
+      <p:sp>
+        <p:nvSpPr>
           <p:cNvPr id="4" name="Slide Number Placeholder 3"/>
           <p:cNvSpPr>
             <a:spLocks noGrp="1"/>
@@ -2965,9 +3007,236 @@
           <a:lstStyle/>
           <a:p>
             <a:fld id="{7D8C2C35-2B8A-446E-BEC0-FD36716C29AC}" type="slidenum">
+              <a:rPr lang="de-DE" smtClean="0"/>
+              <a:pPr/>
+              <a:t>25</a:t>
+            </a:fld>
+            <a:endParaRPr lang="de-DE" dirty="0"/>
+          </a:p>
+        </p:txBody>
+      </p:sp>
+    </p:spTree>
+    <p:extLst>
+      <p:ext uri="{BB962C8B-B14F-4D97-AF65-F5344CB8AC3E}">
+        <p14:creationId xmlns:p14="http://schemas.microsoft.com/office/powerpoint/2010/main" val="1785805150"/>
+      </p:ext>
+    </p:extLst>
+  </p:cSld>
+  <p:clrMapOvr>
+    <a:masterClrMapping/>
+  </p:clrMapOvr>
+</p:notes>
+</file>
+
+<file path=ppt/notesSlides/notesSlide24.xml><?xml version="1.0" encoding="utf-8"?>
+<p:notes xmlns:a="http://schemas.openxmlformats.org/drawingml/2006/main" xmlns:r="http://schemas.openxmlformats.org/officeDocument/2006/relationships" xmlns:p="http://schemas.openxmlformats.org/presentationml/2006/main">
+  <p:cSld>
+    <p:spTree>
+      <p:nvGrpSpPr>
+        <p:cNvPr id="1" name=""/>
+        <p:cNvGrpSpPr/>
+        <p:nvPr/>
+      </p:nvGrpSpPr>
+      <p:grpSpPr>
+        <a:xfrm>
+          <a:off x="0" y="0"/>
+          <a:ext cx="0" cy="0"/>
+          <a:chOff x="0" y="0"/>
+          <a:chExt cx="0" cy="0"/>
+        </a:xfrm>
+      </p:grpSpPr>
+      <p:sp>
+        <p:nvSpPr>
+          <p:cNvPr id="2" name="Slide Image Placeholder 1"/>
+          <p:cNvSpPr>
+            <a:spLocks noGrp="1" noRot="1" noChangeAspect="1"/>
+          </p:cNvSpPr>
+          <p:nvPr>
+            <p:ph type="sldImg"/>
+          </p:nvPr>
+        </p:nvSpPr>
+        <p:spPr/>
+      </p:sp>
+      <p:sp>
+        <p:nvSpPr>
+          <p:cNvPr id="3" name="Notes Placeholder 2"/>
+          <p:cNvSpPr>
+            <a:spLocks noGrp="1"/>
+          </p:cNvSpPr>
+          <p:nvPr>
+            <p:ph type="body" idx="1"/>
+          </p:nvPr>
+        </p:nvSpPr>
+        <p:spPr/>
+        <p:txBody>
+          <a:bodyPr/>
+          <a:lstStyle/>
+          <a:p>
+            <a:endParaRPr lang="en-US" dirty="0"/>
+          </a:p>
+        </p:txBody>
+      </p:sp>
+      <p:sp>
+        <p:nvSpPr>
+          <p:cNvPr id="4" name="Slide Number Placeholder 3"/>
+          <p:cNvSpPr>
+            <a:spLocks noGrp="1"/>
+          </p:cNvSpPr>
+          <p:nvPr>
+            <p:ph type="sldNum" sz="quarter" idx="10"/>
+          </p:nvPr>
+        </p:nvSpPr>
+        <p:spPr/>
+        <p:txBody>
+          <a:bodyPr/>
+          <a:lstStyle/>
+          <a:p>
+            <a:fld id="{7D8C2C35-2B8A-446E-BEC0-FD36716C29AC}" type="slidenum">
+              <a:rPr lang="de-DE" smtClean="0"/>
+              <a:pPr/>
+              <a:t>26</a:t>
+            </a:fld>
+            <a:endParaRPr lang="de-DE" dirty="0"/>
+          </a:p>
+        </p:txBody>
+      </p:sp>
+    </p:spTree>
+    <p:extLst>
+      <p:ext uri="{BB962C8B-B14F-4D97-AF65-F5344CB8AC3E}">
+        <p14:creationId xmlns:p14="http://schemas.microsoft.com/office/powerpoint/2010/main" val="1413328071"/>
+      </p:ext>
+    </p:extLst>
+  </p:cSld>
+  <p:clrMapOvr>
+    <a:masterClrMapping/>
+  </p:clrMapOvr>
+</p:notes>
+</file>
+
+<file path=ppt/notesSlides/notesSlide25.xml><?xml version="1.0" encoding="utf-8"?>
+<p:notes xmlns:a="http://schemas.openxmlformats.org/drawingml/2006/main" xmlns:r="http://schemas.openxmlformats.org/officeDocument/2006/relationships" xmlns:p="http://schemas.openxmlformats.org/presentationml/2006/main">
+  <p:cSld>
+    <p:spTree>
+      <p:nvGrpSpPr>
+        <p:cNvPr id="1" name=""/>
+        <p:cNvGrpSpPr/>
+        <p:nvPr/>
+      </p:nvGrpSpPr>
+      <p:grpSpPr>
+        <a:xfrm>
+          <a:off x="0" y="0"/>
+          <a:ext cx="0" cy="0"/>
+          <a:chOff x="0" y="0"/>
+          <a:chExt cx="0" cy="0"/>
+        </a:xfrm>
+      </p:grpSpPr>
+      <p:sp>
+        <p:nvSpPr>
+          <p:cNvPr id="2" name="Slide Image Placeholder 1"/>
+          <p:cNvSpPr>
+            <a:spLocks noGrp="1" noRot="1" noChangeAspect="1"/>
+          </p:cNvSpPr>
+          <p:nvPr>
+            <p:ph type="sldImg"/>
+          </p:nvPr>
+        </p:nvSpPr>
+        <p:spPr/>
+      </p:sp>
+      <p:sp>
+        <p:nvSpPr>
+          <p:cNvPr id="3" name="Notes Placeholder 2"/>
+          <p:cNvSpPr>
+            <a:spLocks noGrp="1"/>
+          </p:cNvSpPr>
+          <p:nvPr>
+            <p:ph type="body" idx="1"/>
+          </p:nvPr>
+        </p:nvSpPr>
+        <p:spPr/>
+        <p:txBody>
+          <a:bodyPr/>
+          <a:lstStyle/>
+          <a:p>
+            <a:r>
+              <a:rPr lang="en-US" dirty="0"/>
+              <a:t>https://jam4.sapjam.com/groups/Niq7TSBxLlzgb3nroBZJVx/overview_page/e9uqTDxXBRFbk7FJXEA4Cd</a:t>
+            </a:r>
+          </a:p>
+        </p:txBody>
+      </p:sp>
+      <p:sp>
+        <p:nvSpPr>
+          <p:cNvPr id="4" name="Slide Number Placeholder 3"/>
+          <p:cNvSpPr>
+            <a:spLocks noGrp="1"/>
+          </p:cNvSpPr>
+          <p:nvPr>
+            <p:ph type="sldNum" sz="quarter" idx="10"/>
+          </p:nvPr>
+        </p:nvSpPr>
+        <p:spPr/>
+        <p:txBody>
+          <a:bodyPr/>
+          <a:lstStyle/>
+          <a:p>
+            <a:fld id="{7D8C2C35-2B8A-446E-BEC0-FD36716C29AC}" type="slidenum">
+              <a:rPr lang="de-DE" smtClean="0"/>
+              <a:pPr/>
+              <a:t>27</a:t>
+            </a:fld>
+            <a:endParaRPr lang="de-DE" dirty="0"/>
+          </a:p>
+        </p:txBody>
+      </p:sp>
+    </p:spTree>
+    <p:extLst>
+      <p:ext uri="{BB962C8B-B14F-4D97-AF65-F5344CB8AC3E}">
+        <p14:creationId xmlns:p14="http://schemas.microsoft.com/office/powerpoint/2010/main" val="2237772025"/>
+      </p:ext>
+    </p:extLst>
+  </p:cSld>
+  <p:clrMapOvr>
+    <a:masterClrMapping/>
+  </p:clrMapOvr>
+</p:notes>
+</file>
+
+<file path=ppt/notesSlides/notesSlide26.xml><?xml version="1.0" encoding="utf-8"?>
+<p:notes xmlns:a="http://schemas.openxmlformats.org/drawingml/2006/main" xmlns:r="http://schemas.openxmlformats.org/officeDocument/2006/relationships" xmlns:p="http://schemas.openxmlformats.org/presentationml/2006/main">
+  <p:cSld>
+    <p:spTree>
+      <p:nvGrpSpPr>
+        <p:cNvPr id="1" name=""/>
+        <p:cNvGrpSpPr/>
+        <p:nvPr/>
+      </p:nvGrpSpPr>
+      <p:grpSpPr>
+        <a:xfrm>
+          <a:off x="0" y="0"/>
+          <a:ext cx="0" cy="0"/>
+          <a:chOff x="0" y="0"/>
+          <a:chExt cx="0" cy="0"/>
+        </a:xfrm>
+      </p:grpSpPr>
+      <p:sp>
+        <p:nvSpPr>
+          <p:cNvPr id="4" name="Slide Number Placeholder 3"/>
+          <p:cNvSpPr>
+            <a:spLocks noGrp="1"/>
+          </p:cNvSpPr>
+          <p:nvPr>
+            <p:ph type="sldNum" sz="quarter" idx="10"/>
+          </p:nvPr>
+        </p:nvSpPr>
+        <p:spPr/>
+        <p:txBody>
+          <a:bodyPr/>
+          <a:lstStyle/>
+          <a:p>
+            <a:fld id="{7D8C2C35-2B8A-446E-BEC0-FD36716C29AC}" type="slidenum">
               <a:rPr lang="en-US" smtClean="0"/>
               <a:pPr/>
-              <a:t>25</a:t>
+              <a:t>28</a:t>
             </a:fld>
             <a:endParaRPr lang="en-US" dirty="0"/>
           </a:p>
@@ -31320,6 +31589,426 @@
 </file>
 
 <file path=ppt/slides/slide25.xml><?xml version="1.0" encoding="utf-8"?>
+<p:sld xmlns:a="http://schemas.openxmlformats.org/drawingml/2006/main" xmlns:r="http://schemas.openxmlformats.org/officeDocument/2006/relationships" xmlns:p="http://schemas.openxmlformats.org/presentationml/2006/main">
+  <p:cSld>
+    <p:spTree>
+      <p:nvGrpSpPr>
+        <p:cNvPr id="1" name=""/>
+        <p:cNvGrpSpPr/>
+        <p:nvPr/>
+      </p:nvGrpSpPr>
+      <p:grpSpPr>
+        <a:xfrm>
+          <a:off x="0" y="0"/>
+          <a:ext cx="0" cy="0"/>
+          <a:chOff x="0" y="0"/>
+          <a:chExt cx="0" cy="0"/>
+        </a:xfrm>
+      </p:grpSpPr>
+      <p:sp>
+        <p:nvSpPr>
+          <p:cNvPr id="3" name="Title 2">
+            <a:extLst>
+              <a:ext uri="{FF2B5EF4-FFF2-40B4-BE49-F238E27FC236}">
+                <a16:creationId xmlns:a16="http://schemas.microsoft.com/office/drawing/2014/main" id="{339290FA-2FB3-46AF-A98A-CEAC5B76446E}"/>
+              </a:ext>
+            </a:extLst>
+          </p:cNvPr>
+          <p:cNvSpPr>
+            <a:spLocks noGrp="1"/>
+          </p:cNvSpPr>
+          <p:nvPr>
+            <p:ph type="ctrTitle"/>
+          </p:nvPr>
+        </p:nvSpPr>
+        <p:spPr/>
+        <p:txBody>
+          <a:bodyPr/>
+          <a:lstStyle/>
+          <a:p>
+            <a:r>
+              <a:rPr lang="de-DE" dirty="0"/>
+              <a:t>Appendix</a:t>
+            </a:r>
+          </a:p>
+        </p:txBody>
+      </p:sp>
+    </p:spTree>
+    <p:extLst>
+      <p:ext uri="{BB962C8B-B14F-4D97-AF65-F5344CB8AC3E}">
+        <p14:creationId xmlns:p14="http://schemas.microsoft.com/office/powerpoint/2010/main" val="1879866351"/>
+      </p:ext>
+    </p:extLst>
+  </p:cSld>
+  <p:clrMapOvr>
+    <a:masterClrMapping/>
+  </p:clrMapOvr>
+</p:sld>
+</file>
+
+<file path=ppt/slides/slide26.xml><?xml version="1.0" encoding="utf-8"?>
+<p:sld xmlns:a="http://schemas.openxmlformats.org/drawingml/2006/main" xmlns:r="http://schemas.openxmlformats.org/officeDocument/2006/relationships" xmlns:p="http://schemas.openxmlformats.org/presentationml/2006/main">
+  <p:cSld>
+    <p:spTree>
+      <p:nvGrpSpPr>
+        <p:cNvPr id="1" name=""/>
+        <p:cNvGrpSpPr/>
+        <p:nvPr/>
+      </p:nvGrpSpPr>
+      <p:grpSpPr>
+        <a:xfrm>
+          <a:off x="0" y="0"/>
+          <a:ext cx="0" cy="0"/>
+          <a:chOff x="0" y="0"/>
+          <a:chExt cx="0" cy="0"/>
+        </a:xfrm>
+      </p:grpSpPr>
+      <p:sp>
+        <p:nvSpPr>
+          <p:cNvPr id="2" name="Title 1"/>
+          <p:cNvSpPr>
+            <a:spLocks noGrp="1"/>
+          </p:cNvSpPr>
+          <p:nvPr>
+            <p:ph type="title"/>
+          </p:nvPr>
+        </p:nvSpPr>
+        <p:spPr>
+          <a:xfrm>
+            <a:off x="504001" y="504000"/>
+            <a:ext cx="5840279" cy="369332"/>
+          </a:xfrm>
+        </p:spPr>
+        <p:txBody>
+          <a:bodyPr/>
+          <a:lstStyle/>
+          <a:p>
+            <a:r>
+              <a:rPr lang="en-US" dirty="0">
+                <a:solidFill>
+                  <a:srgbClr val="09ABFF"/>
+                </a:solidFill>
+              </a:rPr>
+              <a:t>The Gardener: Technical landscape</a:t>
+            </a:r>
+            <a:endParaRPr lang="en-GB" dirty="0"/>
+          </a:p>
+        </p:txBody>
+      </p:sp>
+      <p:pic>
+        <p:nvPicPr>
+          <p:cNvPr id="6" name="Picture 5">
+            <a:extLst>
+              <a:ext uri="{FF2B5EF4-FFF2-40B4-BE49-F238E27FC236}">
+                <a16:creationId xmlns:a16="http://schemas.microsoft.com/office/drawing/2014/main" id="{68F36224-0F3F-4D3F-A57A-95E8849F38A1}"/>
+              </a:ext>
+            </a:extLst>
+          </p:cNvPr>
+          <p:cNvPicPr>
+            <a:picLocks noChangeAspect="1"/>
+          </p:cNvPicPr>
+          <p:nvPr/>
+        </p:nvPicPr>
+        <p:blipFill>
+          <a:blip r:embed="rId3"/>
+          <a:stretch>
+            <a:fillRect/>
+          </a:stretch>
+        </p:blipFill>
+        <p:spPr>
+          <a:xfrm>
+            <a:off x="504001" y="1090011"/>
+            <a:ext cx="10932795" cy="5377815"/>
+          </a:xfrm>
+          <a:prstGeom prst="rect">
+            <a:avLst/>
+          </a:prstGeom>
+        </p:spPr>
+      </p:pic>
+      <p:sp>
+        <p:nvSpPr>
+          <p:cNvPr id="7" name="Rectangle 6">
+            <a:extLst>
+              <a:ext uri="{FF2B5EF4-FFF2-40B4-BE49-F238E27FC236}">
+                <a16:creationId xmlns:a16="http://schemas.microsoft.com/office/drawing/2014/main" id="{F227F697-5E4F-4972-A519-722C34E148A8}"/>
+              </a:ext>
+            </a:extLst>
+          </p:cNvPr>
+          <p:cNvSpPr/>
+          <p:nvPr/>
+        </p:nvSpPr>
+        <p:spPr>
+          <a:xfrm>
+            <a:off x="8028491" y="504000"/>
+            <a:ext cx="3408305" cy="276999"/>
+          </a:xfrm>
+          <a:prstGeom prst="rect">
+            <a:avLst/>
+          </a:prstGeom>
+        </p:spPr>
+        <p:txBody>
+          <a:bodyPr wrap="none">
+            <a:spAutoFit/>
+          </a:bodyPr>
+          <a:lstStyle/>
+          <a:p>
+            <a:r>
+              <a:rPr lang="de-DE" sz="1200" dirty="0">
+                <a:hlinkClick r:id="rId4"/>
+              </a:rPr>
+              <a:t>https://kubernetes.io/blog/2018/05/17/gardener/</a:t>
+            </a:r>
+            <a:endParaRPr lang="de-DE" sz="1200" dirty="0"/>
+          </a:p>
+        </p:txBody>
+      </p:sp>
+    </p:spTree>
+    <p:extLst>
+      <p:ext uri="{BB962C8B-B14F-4D97-AF65-F5344CB8AC3E}">
+        <p14:creationId xmlns:p14="http://schemas.microsoft.com/office/powerpoint/2010/main" val="2481577014"/>
+      </p:ext>
+    </p:extLst>
+  </p:cSld>
+  <p:clrMapOvr>
+    <a:masterClrMapping/>
+  </p:clrMapOvr>
+</p:sld>
+</file>
+
+<file path=ppt/slides/slide27.xml><?xml version="1.0" encoding="utf-8"?>
+<p:sld xmlns:a="http://schemas.openxmlformats.org/drawingml/2006/main" xmlns:r="http://schemas.openxmlformats.org/officeDocument/2006/relationships" xmlns:p="http://schemas.openxmlformats.org/presentationml/2006/main">
+  <p:cSld>
+    <p:spTree>
+      <p:nvGrpSpPr>
+        <p:cNvPr id="1" name=""/>
+        <p:cNvGrpSpPr/>
+        <p:nvPr/>
+      </p:nvGrpSpPr>
+      <p:grpSpPr>
+        <a:xfrm>
+          <a:off x="0" y="0"/>
+          <a:ext cx="0" cy="0"/>
+          <a:chOff x="0" y="0"/>
+          <a:chExt cx="0" cy="0"/>
+        </a:xfrm>
+      </p:grpSpPr>
+      <p:sp>
+        <p:nvSpPr>
+          <p:cNvPr id="2" name="Title 1"/>
+          <p:cNvSpPr>
+            <a:spLocks noGrp="1"/>
+          </p:cNvSpPr>
+          <p:nvPr>
+            <p:ph type="title"/>
+          </p:nvPr>
+        </p:nvSpPr>
+        <p:spPr/>
+        <p:txBody>
+          <a:bodyPr/>
+          <a:lstStyle/>
+          <a:p>
+            <a:r>
+              <a:rPr lang="en-US" dirty="0"/>
+              <a:t>Wherefrom can I get a cluster?</a:t>
+            </a:r>
+          </a:p>
+        </p:txBody>
+      </p:sp>
+      <p:pic>
+        <p:nvPicPr>
+          <p:cNvPr id="6" name="Picture 5">
+            <a:extLst>
+              <a:ext uri="{FF2B5EF4-FFF2-40B4-BE49-F238E27FC236}">
+                <a16:creationId xmlns:a16="http://schemas.microsoft.com/office/drawing/2014/main" id="{4D51B190-A21E-4DF4-BA5A-DCDB4A632252}"/>
+              </a:ext>
+            </a:extLst>
+          </p:cNvPr>
+          <p:cNvPicPr>
+            <a:picLocks noChangeAspect="1"/>
+          </p:cNvPicPr>
+          <p:nvPr/>
+        </p:nvPicPr>
+        <p:blipFill>
+          <a:blip r:embed="rId3"/>
+          <a:stretch>
+            <a:fillRect/>
+          </a:stretch>
+        </p:blipFill>
+        <p:spPr>
+          <a:xfrm>
+            <a:off x="194098" y="1159035"/>
+            <a:ext cx="10907143" cy="4962857"/>
+          </a:xfrm>
+          <a:prstGeom prst="rect">
+            <a:avLst/>
+          </a:prstGeom>
+        </p:spPr>
+      </p:pic>
+      <p:pic>
+        <p:nvPicPr>
+          <p:cNvPr id="5" name="Picture 4">
+            <a:extLst>
+              <a:ext uri="{FF2B5EF4-FFF2-40B4-BE49-F238E27FC236}">
+                <a16:creationId xmlns:a16="http://schemas.microsoft.com/office/drawing/2014/main" id="{695BC615-DFDD-4B5A-8E0B-E9031239678D}"/>
+              </a:ext>
+            </a:extLst>
+          </p:cNvPr>
+          <p:cNvPicPr>
+            <a:picLocks noChangeAspect="1"/>
+          </p:cNvPicPr>
+          <p:nvPr/>
+        </p:nvPicPr>
+        <p:blipFill>
+          <a:blip r:embed="rId4"/>
+          <a:stretch>
+            <a:fillRect/>
+          </a:stretch>
+        </p:blipFill>
+        <p:spPr>
+          <a:xfrm>
+            <a:off x="2309649" y="1546643"/>
+            <a:ext cx="9691428" cy="4860952"/>
+          </a:xfrm>
+          <a:prstGeom prst="rect">
+            <a:avLst/>
+          </a:prstGeom>
+        </p:spPr>
+      </p:pic>
+    </p:spTree>
+    <p:extLst>
+      <p:ext uri="{BB962C8B-B14F-4D97-AF65-F5344CB8AC3E}">
+        <p14:creationId xmlns:p14="http://schemas.microsoft.com/office/powerpoint/2010/main" val="210032650"/>
+      </p:ext>
+    </p:extLst>
+  </p:cSld>
+  <p:clrMapOvr>
+    <a:masterClrMapping/>
+  </p:clrMapOvr>
+  <p:timing>
+    <p:tnLst>
+      <p:par>
+        <p:cTn id="1" dur="indefinite" restart="never" nodeType="tmRoot">
+          <p:childTnLst>
+            <p:seq concurrent="1" nextAc="seek">
+              <p:cTn id="2" dur="indefinite" nodeType="mainSeq">
+                <p:childTnLst>
+                  <p:par>
+                    <p:cTn id="3" fill="hold">
+                      <p:stCondLst>
+                        <p:cond delay="indefinite"/>
+                      </p:stCondLst>
+                      <p:childTnLst>
+                        <p:par>
+                          <p:cTn id="4" fill="hold">
+                            <p:stCondLst>
+                              <p:cond delay="0"/>
+                            </p:stCondLst>
+                            <p:childTnLst>
+                              <p:par>
+                                <p:cTn id="5" presetID="2" presetClass="entr" presetSubtype="4" fill="hold" nodeType="clickEffect">
+                                  <p:stCondLst>
+                                    <p:cond delay="0"/>
+                                  </p:stCondLst>
+                                  <p:childTnLst>
+                                    <p:set>
+                                      <p:cBhvr>
+                                        <p:cTn id="6" dur="1" fill="hold">
+                                          <p:stCondLst>
+                                            <p:cond delay="0"/>
+                                          </p:stCondLst>
+                                        </p:cTn>
+                                        <p:tgtEl>
+                                          <p:spTgt spid="5"/>
+                                        </p:tgtEl>
+                                        <p:attrNameLst>
+                                          <p:attrName>style.visibility</p:attrName>
+                                        </p:attrNameLst>
+                                      </p:cBhvr>
+                                      <p:to>
+                                        <p:strVal val="visible"/>
+                                      </p:to>
+                                    </p:set>
+                                    <p:anim calcmode="lin" valueType="num">
+                                      <p:cBhvr additive="base">
+                                        <p:cTn id="7" dur="500" fill="hold"/>
+                                        <p:tgtEl>
+                                          <p:spTgt spid="5"/>
+                                        </p:tgtEl>
+                                        <p:attrNameLst>
+                                          <p:attrName>ppt_x</p:attrName>
+                                        </p:attrNameLst>
+                                      </p:cBhvr>
+                                      <p:tavLst>
+                                        <p:tav tm="0">
+                                          <p:val>
+                                            <p:strVal val="#ppt_x"/>
+                                          </p:val>
+                                        </p:tav>
+                                        <p:tav tm="100000">
+                                          <p:val>
+                                            <p:strVal val="#ppt_x"/>
+                                          </p:val>
+                                        </p:tav>
+                                      </p:tavLst>
+                                    </p:anim>
+                                    <p:anim calcmode="lin" valueType="num">
+                                      <p:cBhvr additive="base">
+                                        <p:cTn id="8" dur="500" fill="hold"/>
+                                        <p:tgtEl>
+                                          <p:spTgt spid="5"/>
+                                        </p:tgtEl>
+                                        <p:attrNameLst>
+                                          <p:attrName>ppt_y</p:attrName>
+                                        </p:attrNameLst>
+                                      </p:cBhvr>
+                                      <p:tavLst>
+                                        <p:tav tm="0">
+                                          <p:val>
+                                            <p:strVal val="1+#ppt_h/2"/>
+                                          </p:val>
+                                        </p:tav>
+                                        <p:tav tm="100000">
+                                          <p:val>
+                                            <p:strVal val="#ppt_y"/>
+                                          </p:val>
+                                        </p:tav>
+                                      </p:tavLst>
+                                    </p:anim>
+                                  </p:childTnLst>
+                                </p:cTn>
+                              </p:par>
+                            </p:childTnLst>
+                          </p:cTn>
+                        </p:par>
+                      </p:childTnLst>
+                    </p:cTn>
+                  </p:par>
+                </p:childTnLst>
+              </p:cTn>
+              <p:prevCondLst>
+                <p:cond evt="onPrev" delay="0">
+                  <p:tgtEl>
+                    <p:sldTgt/>
+                  </p:tgtEl>
+                </p:cond>
+              </p:prevCondLst>
+              <p:nextCondLst>
+                <p:cond evt="onNext" delay="0">
+                  <p:tgtEl>
+                    <p:sldTgt/>
+                  </p:tgtEl>
+                </p:cond>
+              </p:nextCondLst>
+            </p:seq>
+          </p:childTnLst>
+        </p:cTn>
+      </p:par>
+    </p:tnLst>
+  </p:timing>
+</p:sld>
+</file>
+
+<file path=ppt/slides/slide28.xml><?xml version="1.0" encoding="utf-8"?>
 <p:sld xmlns:a="http://schemas.openxmlformats.org/drawingml/2006/main" xmlns:r="http://schemas.openxmlformats.org/officeDocument/2006/relationships" xmlns:p="http://schemas.openxmlformats.org/presentationml/2006/main" show="0">
   <p:cSld>
     <p:spTree>

</xml_diff>

<commit_message>
fix #159 - update rbac demo description
</commit_message>
<xml_diff>
--- a/kubernetes/11_administration.pptx
+++ b/kubernetes/11_administration.pptx
@@ -4344,7 +4344,7 @@
         <p:spPr/>
         <p:txBody>
           <a:bodyPr>
-            <a:normAutofit fontScale="92500" lnSpcReduction="20000"/>
+            <a:normAutofit fontScale="85000" lnSpcReduction="10000"/>
           </a:bodyPr>
           <a:lstStyle/>
           <a:p>
@@ -4590,6 +4590,40 @@
             </a:pPr>
             <a:r>
               <a:rPr lang="en-US" dirty="0"/>
+              <a:t>Before you switch the </a:t>
+            </a:r>
+            <a:r>
+              <a:rPr lang="en-US" dirty="0" err="1"/>
+              <a:t>kubeconfig</a:t>
+            </a:r>
+            <a:r>
+              <a:rPr lang="en-US" dirty="0"/>
+              <a:t> context, check, if the secret </a:t>
+            </a:r>
+            <a:r>
+              <a:rPr lang="en-US"/>
+              <a:t>“admin-access” </a:t>
+            </a:r>
+            <a:r>
+              <a:rPr lang="en-US" dirty="0"/>
+              <a:t>described in file 07c_demo_secret.yaml is present in your namespace. If not, re-create it (</a:t>
+            </a:r>
+            <a:r>
+              <a:rPr lang="en-US" dirty="0" err="1"/>
+              <a:t>kubectl</a:t>
+            </a:r>
+            <a:r>
+              <a:rPr lang="en-US" dirty="0"/>
+              <a:t> create –f 07c_demo_secret.yaml)</a:t>
+            </a:r>
+          </a:p>
+          <a:p>
+            <a:pPr marL="465750" lvl="1" indent="-285750">
+              <a:buFontTx/>
+              <a:buChar char="-"/>
+            </a:pPr>
+            <a:r>
+              <a:rPr lang="en-US" dirty="0"/>
               <a:t>In the demo folder, run the script 11b_rbac-demo-shell.sh</a:t>
             </a:r>
           </a:p>
@@ -4643,7 +4677,7 @@
             </a:pPr>
             <a:r>
               <a:rPr lang="en-US" dirty="0"/>
-              <a:t>Create the secret pod with "</a:t>
+              <a:t>Create a pod using the secret “admin-access” with "</a:t>
             </a:r>
             <a:r>
               <a:rPr lang="en-US" dirty="0" err="1"/>

</xml_diff>